<commit_message>
rename 'Controlled Portability' to 'Feature Portability Control'
also light update of the introduction of this new functionality
</commit_message>
<xml_diff>
--- a/KernelDeveloperGuide/pptx/controlled_portability.pptx
+++ b/KernelDeveloperGuide/pptx/controlled_portability.pptx
@@ -219,7 +219,7 @@
               <a:rPr lang="fr-FR" smtClean="0">
                 <a:latin typeface="Calibri Regular" charset="0"/>
               </a:rPr>
-              <a:t>vendredi 4 mars 2022</a:t>
+              <a:t>mercredi 9 mars 2022</a:t>
             </a:fld>
             <a:endParaRPr lang="en-US" dirty="0">
               <a:latin typeface="Calibri Regular" charset="0"/>
@@ -397,7 +397,7 @@
           <a:p>
             <a:fld id="{885721CF-495B-2B41-A23A-4D3221F80235}" type="datetime2">
               <a:rPr lang="fr-FR" smtClean="0"/>
-              <a:t>vendredi 4 mars 2022</a:t>
+              <a:t>mercredi 9 mars 2022</a:t>
             </a:fld>
             <a:endParaRPr lang="en-US" dirty="0"/>
           </a:p>
@@ -1273,7 +1273,7 @@
           <p:cNvPr id="7" name="Text Placeholder 2">
             <a:extLst>
               <a:ext uri="{FF2B5EF4-FFF2-40B4-BE49-F238E27FC236}">
-                <a16:creationId xmlns:a16="http://schemas.microsoft.com/office/drawing/2014/main" xmlns="" id="{EE9EA528-AAC2-D34E-8538-0A0AAD80AD96}"/>
+                <a16:creationId xmlns="" xmlns:a16="http://schemas.microsoft.com/office/drawing/2014/main" id="{EE9EA528-AAC2-D34E-8538-0A0AAD80AD96}"/>
               </a:ext>
             </a:extLst>
           </p:cNvPr>
@@ -1359,7 +1359,7 @@
           <p:cNvPr id="10" name="Content Placeholder 3">
             <a:extLst>
               <a:ext uri="{FF2B5EF4-FFF2-40B4-BE49-F238E27FC236}">
-                <a16:creationId xmlns:a16="http://schemas.microsoft.com/office/drawing/2014/main" xmlns="" id="{DAF8326C-6710-4047-962C-1C0A0F78FFB5}"/>
+                <a16:creationId xmlns="" xmlns:a16="http://schemas.microsoft.com/office/drawing/2014/main" id="{DAF8326C-6710-4047-962C-1C0A0F78FFB5}"/>
               </a:ext>
             </a:extLst>
           </p:cNvPr>
@@ -2052,7 +2052,7 @@
           <p:cNvPr id="7" name="Text Placeholder 2">
             <a:extLst>
               <a:ext uri="{FF2B5EF4-FFF2-40B4-BE49-F238E27FC236}">
-                <a16:creationId xmlns:a16="http://schemas.microsoft.com/office/drawing/2014/main" xmlns="" id="{BADF2A12-0EA6-EC4F-864C-2E94AC36ADCE}"/>
+                <a16:creationId xmlns="" xmlns:a16="http://schemas.microsoft.com/office/drawing/2014/main" id="{BADF2A12-0EA6-EC4F-864C-2E94AC36ADCE}"/>
               </a:ext>
             </a:extLst>
           </p:cNvPr>
@@ -2877,7 +2877,7 @@
           <p:cNvPr id="7" name="Content Placeholder 3">
             <a:extLst>
               <a:ext uri="{FF2B5EF4-FFF2-40B4-BE49-F238E27FC236}">
-                <a16:creationId xmlns:a16="http://schemas.microsoft.com/office/drawing/2014/main" xmlns="" id="{2E4978A6-AF2C-644A-9245-7D0BA4E8B6CE}"/>
+                <a16:creationId xmlns="" xmlns:a16="http://schemas.microsoft.com/office/drawing/2014/main" id="{2E4978A6-AF2C-644A-9245-7D0BA4E8B6CE}"/>
               </a:ext>
             </a:extLst>
           </p:cNvPr>
@@ -3274,7 +3274,7 @@
           <p:cNvPr id="7" name="Text Placeholder 2">
             <a:extLst>
               <a:ext uri="{FF2B5EF4-FFF2-40B4-BE49-F238E27FC236}">
-                <a16:creationId xmlns:a16="http://schemas.microsoft.com/office/drawing/2014/main" xmlns="" id="{BADF2A12-0EA6-EC4F-864C-2E94AC36ADCE}"/>
+                <a16:creationId xmlns="" xmlns:a16="http://schemas.microsoft.com/office/drawing/2014/main" id="{BADF2A12-0EA6-EC4F-864C-2E94AC36ADCE}"/>
               </a:ext>
             </a:extLst>
           </p:cNvPr>
@@ -4226,7 +4226,7 @@
           <p:cNvPr id="13" name="Rectangle 12">
             <a:extLst>
               <a:ext uri="{FF2B5EF4-FFF2-40B4-BE49-F238E27FC236}">
-                <a16:creationId xmlns:a16="http://schemas.microsoft.com/office/drawing/2014/main" xmlns="" id="{200F2B4F-ED74-D84B-A5FF-644A79E13221}"/>
+                <a16:creationId xmlns="" xmlns:a16="http://schemas.microsoft.com/office/drawing/2014/main" id="{200F2B4F-ED74-D84B-A5FF-644A79E13221}"/>
               </a:ext>
             </a:extLst>
           </p:cNvPr>
@@ -4466,7 +4466,7 @@
           <p:cNvPr id="14" name="Footer Placeholder 5">
             <a:extLst>
               <a:ext uri="{FF2B5EF4-FFF2-40B4-BE49-F238E27FC236}">
-                <a16:creationId xmlns:a16="http://schemas.microsoft.com/office/drawing/2014/main" xmlns="" id="{9D0AEA00-A11E-E447-A27D-E3693067A9E6}"/>
+                <a16:creationId xmlns="" xmlns:a16="http://schemas.microsoft.com/office/drawing/2014/main" id="{9D0AEA00-A11E-E447-A27D-E3693067A9E6}"/>
               </a:ext>
             </a:extLst>
           </p:cNvPr>
@@ -4514,7 +4514,7 @@
           <p:cNvPr id="16" name="Picture 2" descr="C:\Users\cmorineau\Marketing-Private\Marcom\Graphics\Artwork_Corp\Logos\Logo-microej-grey-h50.png">
             <a:extLst>
               <a:ext uri="{FF2B5EF4-FFF2-40B4-BE49-F238E27FC236}">
-                <a16:creationId xmlns:a16="http://schemas.microsoft.com/office/drawing/2014/main" xmlns="" id="{75E7AEDB-C69E-AA4C-96BC-8D040A4C81DB}"/>
+                <a16:creationId xmlns="" xmlns:a16="http://schemas.microsoft.com/office/drawing/2014/main" id="{75E7AEDB-C69E-AA4C-96BC-8D040A4C81DB}"/>
               </a:ext>
             </a:extLst>
           </p:cNvPr>
@@ -4682,7 +4682,7 @@
           <p:cNvPr id="11" name="Picture 10">
             <a:extLst>
               <a:ext uri="{FF2B5EF4-FFF2-40B4-BE49-F238E27FC236}">
-                <a16:creationId xmlns:a16="http://schemas.microsoft.com/office/drawing/2014/main" xmlns="" id="{21EA2856-E9E7-8D44-8863-70888E0D7F19}"/>
+                <a16:creationId xmlns="" xmlns:a16="http://schemas.microsoft.com/office/drawing/2014/main" id="{21EA2856-E9E7-8D44-8863-70888E0D7F19}"/>
               </a:ext>
             </a:extLst>
           </p:cNvPr>
@@ -4718,7 +4718,7 @@
           <p:cNvPr id="15" name="Title Placeholder 1">
             <a:extLst>
               <a:ext uri="{FF2B5EF4-FFF2-40B4-BE49-F238E27FC236}">
-                <a16:creationId xmlns:a16="http://schemas.microsoft.com/office/drawing/2014/main" xmlns="" id="{ED4F756F-313C-9A45-AA9F-4637139720F4}"/>
+                <a16:creationId xmlns="" xmlns:a16="http://schemas.microsoft.com/office/drawing/2014/main" id="{ED4F756F-313C-9A45-AA9F-4637139720F4}"/>
               </a:ext>
             </a:extLst>
           </p:cNvPr>
@@ -4773,7 +4773,7 @@
           <p:cNvPr id="16" name="Picture 15">
             <a:extLst>
               <a:ext uri="{FF2B5EF4-FFF2-40B4-BE49-F238E27FC236}">
-                <a16:creationId xmlns:a16="http://schemas.microsoft.com/office/drawing/2014/main" xmlns="" id="{A9288502-3773-1F4B-A16F-58C59F5FD419}"/>
+                <a16:creationId xmlns="" xmlns:a16="http://schemas.microsoft.com/office/drawing/2014/main" id="{A9288502-3773-1F4B-A16F-58C59F5FD419}"/>
               </a:ext>
             </a:extLst>
           </p:cNvPr>
@@ -4809,7 +4809,7 @@
           <p:cNvPr id="32" name="Straight Connector 31">
             <a:extLst>
               <a:ext uri="{FF2B5EF4-FFF2-40B4-BE49-F238E27FC236}">
-                <a16:creationId xmlns:a16="http://schemas.microsoft.com/office/drawing/2014/main" xmlns="" id="{158023E0-65D2-F849-83D8-A55E2AC6BB63}"/>
+                <a16:creationId xmlns="" xmlns:a16="http://schemas.microsoft.com/office/drawing/2014/main" id="{158023E0-65D2-F849-83D8-A55E2AC6BB63}"/>
               </a:ext>
             </a:extLst>
           </p:cNvPr>
@@ -4847,7 +4847,7 @@
           <p:cNvPr id="36" name="Straight Connector 35">
             <a:extLst>
               <a:ext uri="{FF2B5EF4-FFF2-40B4-BE49-F238E27FC236}">
-                <a16:creationId xmlns:a16="http://schemas.microsoft.com/office/drawing/2014/main" xmlns="" id="{1C61BB10-90B1-A04F-AB02-727027D1950C}"/>
+                <a16:creationId xmlns="" xmlns:a16="http://schemas.microsoft.com/office/drawing/2014/main" id="{1C61BB10-90B1-A04F-AB02-727027D1950C}"/>
               </a:ext>
             </a:extLst>
           </p:cNvPr>
@@ -4890,7 +4890,7 @@
           <p:cNvPr id="37" name="Content Placeholder 3">
             <a:extLst>
               <a:ext uri="{FF2B5EF4-FFF2-40B4-BE49-F238E27FC236}">
-                <a16:creationId xmlns:a16="http://schemas.microsoft.com/office/drawing/2014/main" xmlns="" id="{E6FA2AB0-B1DC-CE4F-BA00-6F224EAE5B8E}"/>
+                <a16:creationId xmlns="" xmlns:a16="http://schemas.microsoft.com/office/drawing/2014/main" id="{E6FA2AB0-B1DC-CE4F-BA00-6F224EAE5B8E}"/>
               </a:ext>
             </a:extLst>
           </p:cNvPr>
@@ -4986,7 +4986,7 @@
           <p:cNvPr id="17" name="Content Placeholder 3">
             <a:extLst>
               <a:ext uri="{FF2B5EF4-FFF2-40B4-BE49-F238E27FC236}">
-                <a16:creationId xmlns:a16="http://schemas.microsoft.com/office/drawing/2014/main" xmlns="" id="{A143064D-45EC-0A4F-88C5-9640D09D7651}"/>
+                <a16:creationId xmlns="" xmlns:a16="http://schemas.microsoft.com/office/drawing/2014/main" id="{A143064D-45EC-0A4F-88C5-9640D09D7651}"/>
               </a:ext>
             </a:extLst>
           </p:cNvPr>
@@ -5587,7 +5587,7 @@
           <p:cNvPr id="8" name="Rectangle 7">
             <a:extLst>
               <a:ext uri="{FF2B5EF4-FFF2-40B4-BE49-F238E27FC236}">
-                <a16:creationId xmlns:a16="http://schemas.microsoft.com/office/drawing/2014/main" xmlns="" id="{6524FE37-B1D2-9A48-8EE1-B9816DBDEF3D}"/>
+                <a16:creationId xmlns="" xmlns:a16="http://schemas.microsoft.com/office/drawing/2014/main" id="{6524FE37-B1D2-9A48-8EE1-B9816DBDEF3D}"/>
               </a:ext>
             </a:extLst>
           </p:cNvPr>
@@ -5626,7 +5626,7 @@
           <p:cNvPr id="9" name="TextBox 8">
             <a:extLst>
               <a:ext uri="{FF2B5EF4-FFF2-40B4-BE49-F238E27FC236}">
-                <a16:creationId xmlns:a16="http://schemas.microsoft.com/office/drawing/2014/main" xmlns="" id="{46ADA988-EDE2-EB43-9964-F5CB85382BA1}"/>
+                <a16:creationId xmlns="" xmlns:a16="http://schemas.microsoft.com/office/drawing/2014/main" id="{46ADA988-EDE2-EB43-9964-F5CB85382BA1}"/>
               </a:ext>
             </a:extLst>
           </p:cNvPr>
@@ -5865,7 +5865,7 @@
           <p:cNvPr id="12" name="Straight Connector 11">
             <a:extLst>
               <a:ext uri="{FF2B5EF4-FFF2-40B4-BE49-F238E27FC236}">
-                <a16:creationId xmlns:a16="http://schemas.microsoft.com/office/drawing/2014/main" xmlns="" id="{80782101-745C-B64C-BF8C-0612C8A826F4}"/>
+                <a16:creationId xmlns="" xmlns:a16="http://schemas.microsoft.com/office/drawing/2014/main" id="{80782101-745C-B64C-BF8C-0612C8A826F4}"/>
               </a:ext>
             </a:extLst>
           </p:cNvPr>
@@ -6021,7 +6021,7 @@
           <p:cNvPr id="11" name="Rectangle 10">
             <a:extLst>
               <a:ext uri="{FF2B5EF4-FFF2-40B4-BE49-F238E27FC236}">
-                <a16:creationId xmlns:a16="http://schemas.microsoft.com/office/drawing/2014/main" xmlns="" id="{1A60FEF2-2730-8045-B797-AEA6DA2ED07B}"/>
+                <a16:creationId xmlns="" xmlns:a16="http://schemas.microsoft.com/office/drawing/2014/main" id="{1A60FEF2-2730-8045-B797-AEA6DA2ED07B}"/>
               </a:ext>
             </a:extLst>
           </p:cNvPr>
@@ -6057,7 +6057,7 @@
           <p:cNvPr id="12" name="Straight Connector 11">
             <a:extLst>
               <a:ext uri="{FF2B5EF4-FFF2-40B4-BE49-F238E27FC236}">
-                <a16:creationId xmlns:a16="http://schemas.microsoft.com/office/drawing/2014/main" xmlns="" id="{9FC44B9B-3ED3-CD4D-A4B4-670F9A0707A7}"/>
+                <a16:creationId xmlns="" xmlns:a16="http://schemas.microsoft.com/office/drawing/2014/main" id="{9FC44B9B-3ED3-CD4D-A4B4-670F9A0707A7}"/>
               </a:ext>
             </a:extLst>
           </p:cNvPr>
@@ -6093,7 +6093,7 @@
           <p:cNvPr id="13" name="Rectangle 12">
             <a:extLst>
               <a:ext uri="{FF2B5EF4-FFF2-40B4-BE49-F238E27FC236}">
-                <a16:creationId xmlns:a16="http://schemas.microsoft.com/office/drawing/2014/main" xmlns="" id="{A8E9047D-CEE7-1041-9CD2-438580517A8B}"/>
+                <a16:creationId xmlns="" xmlns:a16="http://schemas.microsoft.com/office/drawing/2014/main" id="{A8E9047D-CEE7-1041-9CD2-438580517A8B}"/>
               </a:ext>
             </a:extLst>
           </p:cNvPr>
@@ -6129,7 +6129,7 @@
           <p:cNvPr id="14" name="Straight Connector 13">
             <a:extLst>
               <a:ext uri="{FF2B5EF4-FFF2-40B4-BE49-F238E27FC236}">
-                <a16:creationId xmlns:a16="http://schemas.microsoft.com/office/drawing/2014/main" xmlns="" id="{A080B88E-5B35-9C42-B51A-25732C333881}"/>
+                <a16:creationId xmlns="" xmlns:a16="http://schemas.microsoft.com/office/drawing/2014/main" id="{A080B88E-5B35-9C42-B51A-25732C333881}"/>
               </a:ext>
             </a:extLst>
           </p:cNvPr>
@@ -6165,7 +6165,7 @@
           <p:cNvPr id="16" name="TextBox 15">
             <a:extLst>
               <a:ext uri="{FF2B5EF4-FFF2-40B4-BE49-F238E27FC236}">
-                <a16:creationId xmlns:a16="http://schemas.microsoft.com/office/drawing/2014/main" xmlns="" id="{B2BB3227-C774-FD42-B9A5-3508452E6A71}"/>
+                <a16:creationId xmlns="" xmlns:a16="http://schemas.microsoft.com/office/drawing/2014/main" id="{B2BB3227-C774-FD42-B9A5-3508452E6A71}"/>
               </a:ext>
             </a:extLst>
           </p:cNvPr>
@@ -6465,7 +6465,7 @@
           <p:cNvPr id="86" name="Rectangle 85">
             <a:extLst>
               <a:ext uri="{FF2B5EF4-FFF2-40B4-BE49-F238E27FC236}">
-                <a16:creationId xmlns:a16="http://schemas.microsoft.com/office/drawing/2014/main" xmlns="" id="{EDB109D6-5BF6-5E42-A1C1-45B238B41A7E}"/>
+                <a16:creationId xmlns="" xmlns:a16="http://schemas.microsoft.com/office/drawing/2014/main" id="{EDB109D6-5BF6-5E42-A1C1-45B238B41A7E}"/>
               </a:ext>
             </a:extLst>
           </p:cNvPr>
@@ -6527,7 +6527,7 @@
           <p:cNvPr id="45" name="Rectangle 1">
             <a:extLst>
               <a:ext uri="{FF2B5EF4-FFF2-40B4-BE49-F238E27FC236}">
-                <a16:creationId xmlns:a16="http://schemas.microsoft.com/office/drawing/2014/main" xmlns="" id="{7F24C5F6-F280-EE49-BEC1-D93D2617D356}"/>
+                <a16:creationId xmlns="" xmlns:a16="http://schemas.microsoft.com/office/drawing/2014/main" id="{7F24C5F6-F280-EE49-BEC1-D93D2617D356}"/>
               </a:ext>
             </a:extLst>
           </p:cNvPr>
@@ -6776,7 +6776,7 @@
           <p:cNvPr id="89" name="Rectangle 88">
             <a:extLst>
               <a:ext uri="{FF2B5EF4-FFF2-40B4-BE49-F238E27FC236}">
-                <a16:creationId xmlns:a16="http://schemas.microsoft.com/office/drawing/2014/main" xmlns="" id="{EFCB9C4D-5246-B743-853A-FA66CEE7DE4D}"/>
+                <a16:creationId xmlns="" xmlns:a16="http://schemas.microsoft.com/office/drawing/2014/main" id="{EFCB9C4D-5246-B743-853A-FA66CEE7DE4D}"/>
               </a:ext>
             </a:extLst>
           </p:cNvPr>
@@ -6828,7 +6828,7 @@
           <p:cNvPr id="93" name="Triangle 92">
             <a:extLst>
               <a:ext uri="{FF2B5EF4-FFF2-40B4-BE49-F238E27FC236}">
-                <a16:creationId xmlns:a16="http://schemas.microsoft.com/office/drawing/2014/main" xmlns="" id="{0D72A147-C32E-C540-8F80-59F865637BB1}"/>
+                <a16:creationId xmlns="" xmlns:a16="http://schemas.microsoft.com/office/drawing/2014/main" id="{0D72A147-C32E-C540-8F80-59F865637BB1}"/>
               </a:ext>
             </a:extLst>
           </p:cNvPr>
@@ -6883,7 +6883,7 @@
             <a:hlinkClick r:id="rId2"/>
             <a:extLst>
               <a:ext uri="{FF2B5EF4-FFF2-40B4-BE49-F238E27FC236}">
-                <a16:creationId xmlns:a16="http://schemas.microsoft.com/office/drawing/2014/main" xmlns="" id="{0A03D419-B4E4-A341-8258-BAF4FC5373B4}"/>
+                <a16:creationId xmlns="" xmlns:a16="http://schemas.microsoft.com/office/drawing/2014/main" id="{0A03D419-B4E4-A341-8258-BAF4FC5373B4}"/>
               </a:ext>
             </a:extLst>
           </p:cNvPr>
@@ -6946,7 +6946,7 @@
           <p:cNvPr id="95" name="Group 94">
             <a:extLst>
               <a:ext uri="{FF2B5EF4-FFF2-40B4-BE49-F238E27FC236}">
-                <a16:creationId xmlns:a16="http://schemas.microsoft.com/office/drawing/2014/main" xmlns="" id="{89E75E57-B1BB-1043-92B1-2837059A39CF}"/>
+                <a16:creationId xmlns="" xmlns:a16="http://schemas.microsoft.com/office/drawing/2014/main" id="{89E75E57-B1BB-1043-92B1-2837059A39CF}"/>
               </a:ext>
             </a:extLst>
           </p:cNvPr>
@@ -6966,7 +6966,7 @@
             <p:cNvPr id="96" name="Rounded Rectangle 95">
               <a:extLst>
                 <a:ext uri="{FF2B5EF4-FFF2-40B4-BE49-F238E27FC236}">
-                  <a16:creationId xmlns:a16="http://schemas.microsoft.com/office/drawing/2014/main" xmlns="" id="{C571F53C-F9A8-D34F-89E9-D59834F26F2A}"/>
+                  <a16:creationId xmlns="" xmlns:a16="http://schemas.microsoft.com/office/drawing/2014/main" id="{C571F53C-F9A8-D34F-89E9-D59834F26F2A}"/>
                 </a:ext>
               </a:extLst>
             </p:cNvPr>
@@ -7019,7 +7019,7 @@
               <a:hlinkClick r:id="rId3"/>
               <a:extLst>
                 <a:ext uri="{FF2B5EF4-FFF2-40B4-BE49-F238E27FC236}">
-                  <a16:creationId xmlns:a16="http://schemas.microsoft.com/office/drawing/2014/main" xmlns="" id="{BCCC18FD-7037-504F-B7DD-009E93D5CFC5}"/>
+                  <a16:creationId xmlns="" xmlns:a16="http://schemas.microsoft.com/office/drawing/2014/main" id="{BCCC18FD-7037-504F-B7DD-009E93D5CFC5}"/>
                 </a:ext>
               </a:extLst>
             </p:cNvPr>
@@ -7071,7 +7071,7 @@
             <a:hlinkClick r:id="rId3"/>
             <a:extLst>
               <a:ext uri="{FF2B5EF4-FFF2-40B4-BE49-F238E27FC236}">
-                <a16:creationId xmlns:a16="http://schemas.microsoft.com/office/drawing/2014/main" xmlns="" id="{31AA4A0D-C979-ED41-9053-191689A53F33}"/>
+                <a16:creationId xmlns="" xmlns:a16="http://schemas.microsoft.com/office/drawing/2014/main" id="{31AA4A0D-C979-ED41-9053-191689A53F33}"/>
               </a:ext>
             </a:extLst>
           </p:cNvPr>
@@ -7134,7 +7134,7 @@
           <p:cNvPr id="105" name="Group 104">
             <a:extLst>
               <a:ext uri="{FF2B5EF4-FFF2-40B4-BE49-F238E27FC236}">
-                <a16:creationId xmlns:a16="http://schemas.microsoft.com/office/drawing/2014/main" xmlns="" id="{7BF00640-0851-4A4E-8179-1BD384D8F525}"/>
+                <a16:creationId xmlns="" xmlns:a16="http://schemas.microsoft.com/office/drawing/2014/main" id="{7BF00640-0851-4A4E-8179-1BD384D8F525}"/>
               </a:ext>
             </a:extLst>
           </p:cNvPr>
@@ -7154,7 +7154,7 @@
             <p:cNvPr id="106" name="Rounded Rectangle 105">
               <a:extLst>
                 <a:ext uri="{FF2B5EF4-FFF2-40B4-BE49-F238E27FC236}">
-                  <a16:creationId xmlns:a16="http://schemas.microsoft.com/office/drawing/2014/main" xmlns="" id="{5AA2B150-5004-364C-910A-A392CD7A853A}"/>
+                  <a16:creationId xmlns="" xmlns:a16="http://schemas.microsoft.com/office/drawing/2014/main" id="{5AA2B150-5004-364C-910A-A392CD7A853A}"/>
                 </a:ext>
               </a:extLst>
             </p:cNvPr>
@@ -7207,7 +7207,7 @@
               <a:hlinkClick r:id="rId3"/>
               <a:extLst>
                 <a:ext uri="{FF2B5EF4-FFF2-40B4-BE49-F238E27FC236}">
-                  <a16:creationId xmlns:a16="http://schemas.microsoft.com/office/drawing/2014/main" xmlns="" id="{91AD4506-A6D6-124C-97E7-7D3DF0EBA900}"/>
+                  <a16:creationId xmlns="" xmlns:a16="http://schemas.microsoft.com/office/drawing/2014/main" id="{91AD4506-A6D6-124C-97E7-7D3DF0EBA900}"/>
                 </a:ext>
               </a:extLst>
             </p:cNvPr>
@@ -7266,7 +7266,7 @@
           <p:cNvPr id="122" name="Picture 121">
             <a:extLst>
               <a:ext uri="{FF2B5EF4-FFF2-40B4-BE49-F238E27FC236}">
-                <a16:creationId xmlns:a16="http://schemas.microsoft.com/office/drawing/2014/main" xmlns="" id="{B221A555-3C2F-E94D-96E4-6FC85564B891}"/>
+                <a16:creationId xmlns="" xmlns:a16="http://schemas.microsoft.com/office/drawing/2014/main" id="{B221A555-3C2F-E94D-96E4-6FC85564B891}"/>
               </a:ext>
             </a:extLst>
           </p:cNvPr>
@@ -7302,7 +7302,7 @@
           <p:cNvPr id="129" name="Title 24">
             <a:extLst>
               <a:ext uri="{FF2B5EF4-FFF2-40B4-BE49-F238E27FC236}">
-                <a16:creationId xmlns:a16="http://schemas.microsoft.com/office/drawing/2014/main" xmlns="" id="{C9C5C095-FA83-CE44-8BA2-FB0F4CF430D7}"/>
+                <a16:creationId xmlns="" xmlns:a16="http://schemas.microsoft.com/office/drawing/2014/main" id="{C9C5C095-FA83-CE44-8BA2-FB0F4CF430D7}"/>
               </a:ext>
             </a:extLst>
           </p:cNvPr>
@@ -7362,7 +7362,7 @@
           <p:cNvPr id="134" name="Picture 133">
             <a:extLst>
               <a:ext uri="{FF2B5EF4-FFF2-40B4-BE49-F238E27FC236}">
-                <a16:creationId xmlns:a16="http://schemas.microsoft.com/office/drawing/2014/main" xmlns="" id="{0E8E09F9-EF0B-4C47-B695-BE4EBAFCE677}"/>
+                <a16:creationId xmlns="" xmlns:a16="http://schemas.microsoft.com/office/drawing/2014/main" id="{0E8E09F9-EF0B-4C47-B695-BE4EBAFCE677}"/>
               </a:ext>
             </a:extLst>
           </p:cNvPr>
@@ -7397,7 +7397,7 @@
           <p:cNvPr id="135" name="Straight Connector 134">
             <a:extLst>
               <a:ext uri="{FF2B5EF4-FFF2-40B4-BE49-F238E27FC236}">
-                <a16:creationId xmlns:a16="http://schemas.microsoft.com/office/drawing/2014/main" xmlns="" id="{FF6AB179-2926-4D40-A4DD-8BB1E9EAEA7D}"/>
+                <a16:creationId xmlns="" xmlns:a16="http://schemas.microsoft.com/office/drawing/2014/main" id="{FF6AB179-2926-4D40-A4DD-8BB1E9EAEA7D}"/>
               </a:ext>
             </a:extLst>
           </p:cNvPr>
@@ -7438,7 +7438,7 @@
           <p:cNvPr id="41" name="Content Placeholder 52">
             <a:extLst>
               <a:ext uri="{FF2B5EF4-FFF2-40B4-BE49-F238E27FC236}">
-                <a16:creationId xmlns:a16="http://schemas.microsoft.com/office/drawing/2014/main" xmlns="" id="{03870E7E-5F8D-F64D-B6CF-AC70B18948A2}"/>
+                <a16:creationId xmlns="" xmlns:a16="http://schemas.microsoft.com/office/drawing/2014/main" id="{03870E7E-5F8D-F64D-B6CF-AC70B18948A2}"/>
               </a:ext>
             </a:extLst>
           </p:cNvPr>
@@ -7688,7 +7688,7 @@
           <p:cNvPr id="42" name="Content Placeholder 52">
             <a:extLst>
               <a:ext uri="{FF2B5EF4-FFF2-40B4-BE49-F238E27FC236}">
-                <a16:creationId xmlns:a16="http://schemas.microsoft.com/office/drawing/2014/main" xmlns="" id="{95FE5B9D-9272-3841-9EE5-9D5A046A1FF7}"/>
+                <a16:creationId xmlns="" xmlns:a16="http://schemas.microsoft.com/office/drawing/2014/main" id="{95FE5B9D-9272-3841-9EE5-9D5A046A1FF7}"/>
               </a:ext>
             </a:extLst>
           </p:cNvPr>
@@ -7924,7 +7924,7 @@
           <p:cNvPr id="43" name="Content Placeholder 52">
             <a:extLst>
               <a:ext uri="{FF2B5EF4-FFF2-40B4-BE49-F238E27FC236}">
-                <a16:creationId xmlns:a16="http://schemas.microsoft.com/office/drawing/2014/main" xmlns="" id="{8C3392A2-7BEC-C643-A397-ACB0C15BDDE1}"/>
+                <a16:creationId xmlns="" xmlns:a16="http://schemas.microsoft.com/office/drawing/2014/main" id="{8C3392A2-7BEC-C643-A397-ACB0C15BDDE1}"/>
               </a:ext>
             </a:extLst>
           </p:cNvPr>
@@ -8159,7 +8159,7 @@
           <p:cNvPr id="44" name="Content Placeholder 52">
             <a:extLst>
               <a:ext uri="{FF2B5EF4-FFF2-40B4-BE49-F238E27FC236}">
-                <a16:creationId xmlns:a16="http://schemas.microsoft.com/office/drawing/2014/main" xmlns="" id="{5BF202D4-4239-7E4F-93CD-8E57B0E44847}"/>
+                <a16:creationId xmlns="" xmlns:a16="http://schemas.microsoft.com/office/drawing/2014/main" id="{5BF202D4-4239-7E4F-93CD-8E57B0E44847}"/>
               </a:ext>
             </a:extLst>
           </p:cNvPr>
@@ -8403,7 +8403,7 @@
           <p:cNvPr id="46" name="Content Placeholder 52">
             <a:extLst>
               <a:ext uri="{FF2B5EF4-FFF2-40B4-BE49-F238E27FC236}">
-                <a16:creationId xmlns:a16="http://schemas.microsoft.com/office/drawing/2014/main" xmlns="" id="{16FDB233-B738-8D4E-B43F-750A1A983DE9}"/>
+                <a16:creationId xmlns="" xmlns:a16="http://schemas.microsoft.com/office/drawing/2014/main" id="{16FDB233-B738-8D4E-B43F-750A1A983DE9}"/>
               </a:ext>
             </a:extLst>
           </p:cNvPr>
@@ -8639,7 +8639,7 @@
           <p:cNvPr id="47" name="Picture 46">
             <a:extLst>
               <a:ext uri="{FF2B5EF4-FFF2-40B4-BE49-F238E27FC236}">
-                <a16:creationId xmlns:a16="http://schemas.microsoft.com/office/drawing/2014/main" xmlns="" id="{E394D0E0-025D-644F-82A2-ED215AC1B381}"/>
+                <a16:creationId xmlns="" xmlns:a16="http://schemas.microsoft.com/office/drawing/2014/main" id="{E394D0E0-025D-644F-82A2-ED215AC1B381}"/>
               </a:ext>
             </a:extLst>
           </p:cNvPr>
@@ -8675,7 +8675,7 @@
           <p:cNvPr id="48" name="Picture 47">
             <a:extLst>
               <a:ext uri="{FF2B5EF4-FFF2-40B4-BE49-F238E27FC236}">
-                <a16:creationId xmlns:a16="http://schemas.microsoft.com/office/drawing/2014/main" xmlns="" id="{35E0AA7F-0EA4-224A-92F8-C9A9D5B1B802}"/>
+                <a16:creationId xmlns="" xmlns:a16="http://schemas.microsoft.com/office/drawing/2014/main" id="{35E0AA7F-0EA4-224A-92F8-C9A9D5B1B802}"/>
               </a:ext>
             </a:extLst>
           </p:cNvPr>
@@ -8711,7 +8711,7 @@
           <p:cNvPr id="49" name="Picture 48">
             <a:extLst>
               <a:ext uri="{FF2B5EF4-FFF2-40B4-BE49-F238E27FC236}">
-                <a16:creationId xmlns:a16="http://schemas.microsoft.com/office/drawing/2014/main" xmlns="" id="{A48092AC-915B-524D-9672-FE0826E130E7}"/>
+                <a16:creationId xmlns="" xmlns:a16="http://schemas.microsoft.com/office/drawing/2014/main" id="{A48092AC-915B-524D-9672-FE0826E130E7}"/>
               </a:ext>
             </a:extLst>
           </p:cNvPr>
@@ -8747,7 +8747,7 @@
           <p:cNvPr id="51" name="Picture 50">
             <a:extLst>
               <a:ext uri="{FF2B5EF4-FFF2-40B4-BE49-F238E27FC236}">
-                <a16:creationId xmlns:a16="http://schemas.microsoft.com/office/drawing/2014/main" xmlns="" id="{27E440A9-1FB1-A44A-8917-F3A839BAF906}"/>
+                <a16:creationId xmlns="" xmlns:a16="http://schemas.microsoft.com/office/drawing/2014/main" id="{27E440A9-1FB1-A44A-8917-F3A839BAF906}"/>
               </a:ext>
             </a:extLst>
           </p:cNvPr>
@@ -8783,7 +8783,7 @@
           <p:cNvPr id="52" name="Picture 51">
             <a:extLst>
               <a:ext uri="{FF2B5EF4-FFF2-40B4-BE49-F238E27FC236}">
-                <a16:creationId xmlns:a16="http://schemas.microsoft.com/office/drawing/2014/main" xmlns="" id="{FFFF220F-F683-2F48-A73D-6A41401B0D05}"/>
+                <a16:creationId xmlns="" xmlns:a16="http://schemas.microsoft.com/office/drawing/2014/main" id="{FFFF220F-F683-2F48-A73D-6A41401B0D05}"/>
               </a:ext>
             </a:extLst>
           </p:cNvPr>
@@ -8819,7 +8819,7 @@
           <p:cNvPr id="53" name="Picture 52">
             <a:extLst>
               <a:ext uri="{FF2B5EF4-FFF2-40B4-BE49-F238E27FC236}">
-                <a16:creationId xmlns:a16="http://schemas.microsoft.com/office/drawing/2014/main" xmlns="" id="{FC96BF3C-2C18-7E4E-AADA-8075C799317A}"/>
+                <a16:creationId xmlns="" xmlns:a16="http://schemas.microsoft.com/office/drawing/2014/main" id="{FC96BF3C-2C18-7E4E-AADA-8075C799317A}"/>
               </a:ext>
             </a:extLst>
           </p:cNvPr>
@@ -8855,7 +8855,7 @@
           <p:cNvPr id="54" name="Content Placeholder 52">
             <a:extLst>
               <a:ext uri="{FF2B5EF4-FFF2-40B4-BE49-F238E27FC236}">
-                <a16:creationId xmlns:a16="http://schemas.microsoft.com/office/drawing/2014/main" xmlns="" id="{8184E9DC-A05F-994B-8D0E-6F0964DE93A1}"/>
+                <a16:creationId xmlns="" xmlns:a16="http://schemas.microsoft.com/office/drawing/2014/main" id="{8184E9DC-A05F-994B-8D0E-6F0964DE93A1}"/>
               </a:ext>
             </a:extLst>
           </p:cNvPr>
@@ -9120,7 +9120,7 @@
           <p:cNvPr id="37" name="Content Placeholder 52">
             <a:extLst>
               <a:ext uri="{FF2B5EF4-FFF2-40B4-BE49-F238E27FC236}">
-                <a16:creationId xmlns:a16="http://schemas.microsoft.com/office/drawing/2014/main" xmlns="" id="{A1F29D74-7F07-D84E-B102-930FD141E5B9}"/>
+                <a16:creationId xmlns="" xmlns:a16="http://schemas.microsoft.com/office/drawing/2014/main" id="{A1F29D74-7F07-D84E-B102-930FD141E5B9}"/>
               </a:ext>
             </a:extLst>
           </p:cNvPr>
@@ -9356,7 +9356,7 @@
           <p:cNvPr id="38" name="Picture 37">
             <a:extLst>
               <a:ext uri="{FF2B5EF4-FFF2-40B4-BE49-F238E27FC236}">
-                <a16:creationId xmlns:a16="http://schemas.microsoft.com/office/drawing/2014/main" xmlns="" id="{B4EE7BA3-3882-054B-9C71-4C6C9D45BBC3}"/>
+                <a16:creationId xmlns="" xmlns:a16="http://schemas.microsoft.com/office/drawing/2014/main" id="{B4EE7BA3-3882-054B-9C71-4C6C9D45BBC3}"/>
               </a:ext>
             </a:extLst>
           </p:cNvPr>
@@ -9393,7 +9393,7 @@
             <a:hlinkClick r:id="rId3"/>
             <a:extLst>
               <a:ext uri="{FF2B5EF4-FFF2-40B4-BE49-F238E27FC236}">
-                <a16:creationId xmlns:a16="http://schemas.microsoft.com/office/drawing/2014/main" xmlns="" id="{8ECC0D63-20D7-0343-86D0-A87AE2BB8F87}"/>
+                <a16:creationId xmlns="" xmlns:a16="http://schemas.microsoft.com/office/drawing/2014/main" id="{8ECC0D63-20D7-0343-86D0-A87AE2BB8F87}"/>
               </a:ext>
             </a:extLst>
           </p:cNvPr>
@@ -9452,7 +9452,7 @@
             <a:hlinkClick r:id="rId2"/>
             <a:extLst>
               <a:ext uri="{FF2B5EF4-FFF2-40B4-BE49-F238E27FC236}">
-                <a16:creationId xmlns:a16="http://schemas.microsoft.com/office/drawing/2014/main" xmlns="" id="{B01DB6F7-4A56-E648-8CE4-FB8C132141F4}"/>
+                <a16:creationId xmlns="" xmlns:a16="http://schemas.microsoft.com/office/drawing/2014/main" id="{B01DB6F7-4A56-E648-8CE4-FB8C132141F4}"/>
               </a:ext>
             </a:extLst>
           </p:cNvPr>
@@ -9540,7 +9540,7 @@
           <p:cNvPr id="86" name="Rectangle 85">
             <a:extLst>
               <a:ext uri="{FF2B5EF4-FFF2-40B4-BE49-F238E27FC236}">
-                <a16:creationId xmlns:a16="http://schemas.microsoft.com/office/drawing/2014/main" xmlns="" id="{EDB109D6-5BF6-5E42-A1C1-45B238B41A7E}"/>
+                <a16:creationId xmlns="" xmlns:a16="http://schemas.microsoft.com/office/drawing/2014/main" id="{EDB109D6-5BF6-5E42-A1C1-45B238B41A7E}"/>
               </a:ext>
             </a:extLst>
           </p:cNvPr>
@@ -9602,7 +9602,7 @@
           <p:cNvPr id="131" name="Rectangle 1">
             <a:extLst>
               <a:ext uri="{FF2B5EF4-FFF2-40B4-BE49-F238E27FC236}">
-                <a16:creationId xmlns:a16="http://schemas.microsoft.com/office/drawing/2014/main" xmlns="" id="{D03E41E1-380E-DF4A-8F15-AB2EAE2322B9}"/>
+                <a16:creationId xmlns="" xmlns:a16="http://schemas.microsoft.com/office/drawing/2014/main" id="{D03E41E1-380E-DF4A-8F15-AB2EAE2322B9}"/>
               </a:ext>
             </a:extLst>
           </p:cNvPr>
@@ -9851,7 +9851,7 @@
           <p:cNvPr id="89" name="Rectangle 88">
             <a:extLst>
               <a:ext uri="{FF2B5EF4-FFF2-40B4-BE49-F238E27FC236}">
-                <a16:creationId xmlns:a16="http://schemas.microsoft.com/office/drawing/2014/main" xmlns="" id="{EFCB9C4D-5246-B743-853A-FA66CEE7DE4D}"/>
+                <a16:creationId xmlns="" xmlns:a16="http://schemas.microsoft.com/office/drawing/2014/main" id="{EFCB9C4D-5246-B743-853A-FA66CEE7DE4D}"/>
               </a:ext>
             </a:extLst>
           </p:cNvPr>
@@ -9903,7 +9903,7 @@
           <p:cNvPr id="93" name="Triangle 92">
             <a:extLst>
               <a:ext uri="{FF2B5EF4-FFF2-40B4-BE49-F238E27FC236}">
-                <a16:creationId xmlns:a16="http://schemas.microsoft.com/office/drawing/2014/main" xmlns="" id="{0D72A147-C32E-C540-8F80-59F865637BB1}"/>
+                <a16:creationId xmlns="" xmlns:a16="http://schemas.microsoft.com/office/drawing/2014/main" id="{0D72A147-C32E-C540-8F80-59F865637BB1}"/>
               </a:ext>
             </a:extLst>
           </p:cNvPr>
@@ -9958,7 +9958,7 @@
             <a:hlinkClick r:id="rId2"/>
             <a:extLst>
               <a:ext uri="{FF2B5EF4-FFF2-40B4-BE49-F238E27FC236}">
-                <a16:creationId xmlns:a16="http://schemas.microsoft.com/office/drawing/2014/main" xmlns="" id="{0A03D419-B4E4-A341-8258-BAF4FC5373B4}"/>
+                <a16:creationId xmlns="" xmlns:a16="http://schemas.microsoft.com/office/drawing/2014/main" id="{0A03D419-B4E4-A341-8258-BAF4FC5373B4}"/>
               </a:ext>
             </a:extLst>
           </p:cNvPr>
@@ -10021,7 +10021,7 @@
           <p:cNvPr id="95" name="Group 94">
             <a:extLst>
               <a:ext uri="{FF2B5EF4-FFF2-40B4-BE49-F238E27FC236}">
-                <a16:creationId xmlns:a16="http://schemas.microsoft.com/office/drawing/2014/main" xmlns="" id="{89E75E57-B1BB-1043-92B1-2837059A39CF}"/>
+                <a16:creationId xmlns="" xmlns:a16="http://schemas.microsoft.com/office/drawing/2014/main" id="{89E75E57-B1BB-1043-92B1-2837059A39CF}"/>
               </a:ext>
             </a:extLst>
           </p:cNvPr>
@@ -10041,7 +10041,7 @@
             <p:cNvPr id="96" name="Rounded Rectangle 95">
               <a:extLst>
                 <a:ext uri="{FF2B5EF4-FFF2-40B4-BE49-F238E27FC236}">
-                  <a16:creationId xmlns:a16="http://schemas.microsoft.com/office/drawing/2014/main" xmlns="" id="{C571F53C-F9A8-D34F-89E9-D59834F26F2A}"/>
+                  <a16:creationId xmlns="" xmlns:a16="http://schemas.microsoft.com/office/drawing/2014/main" id="{C571F53C-F9A8-D34F-89E9-D59834F26F2A}"/>
                 </a:ext>
               </a:extLst>
             </p:cNvPr>
@@ -10094,7 +10094,7 @@
               <a:hlinkClick r:id="rId3"/>
               <a:extLst>
                 <a:ext uri="{FF2B5EF4-FFF2-40B4-BE49-F238E27FC236}">
-                  <a16:creationId xmlns:a16="http://schemas.microsoft.com/office/drawing/2014/main" xmlns="" id="{BCCC18FD-7037-504F-B7DD-009E93D5CFC5}"/>
+                  <a16:creationId xmlns="" xmlns:a16="http://schemas.microsoft.com/office/drawing/2014/main" id="{BCCC18FD-7037-504F-B7DD-009E93D5CFC5}"/>
                 </a:ext>
               </a:extLst>
             </p:cNvPr>
@@ -10146,7 +10146,7 @@
             <a:hlinkClick r:id="rId3"/>
             <a:extLst>
               <a:ext uri="{FF2B5EF4-FFF2-40B4-BE49-F238E27FC236}">
-                <a16:creationId xmlns:a16="http://schemas.microsoft.com/office/drawing/2014/main" xmlns="" id="{31AA4A0D-C979-ED41-9053-191689A53F33}"/>
+                <a16:creationId xmlns="" xmlns:a16="http://schemas.microsoft.com/office/drawing/2014/main" id="{31AA4A0D-C979-ED41-9053-191689A53F33}"/>
               </a:ext>
             </a:extLst>
           </p:cNvPr>
@@ -10209,7 +10209,7 @@
           <p:cNvPr id="105" name="Group 104">
             <a:extLst>
               <a:ext uri="{FF2B5EF4-FFF2-40B4-BE49-F238E27FC236}">
-                <a16:creationId xmlns:a16="http://schemas.microsoft.com/office/drawing/2014/main" xmlns="" id="{7BF00640-0851-4A4E-8179-1BD384D8F525}"/>
+                <a16:creationId xmlns="" xmlns:a16="http://schemas.microsoft.com/office/drawing/2014/main" id="{7BF00640-0851-4A4E-8179-1BD384D8F525}"/>
               </a:ext>
             </a:extLst>
           </p:cNvPr>
@@ -10229,7 +10229,7 @@
             <p:cNvPr id="106" name="Rounded Rectangle 105">
               <a:extLst>
                 <a:ext uri="{FF2B5EF4-FFF2-40B4-BE49-F238E27FC236}">
-                  <a16:creationId xmlns:a16="http://schemas.microsoft.com/office/drawing/2014/main" xmlns="" id="{5AA2B150-5004-364C-910A-A392CD7A853A}"/>
+                  <a16:creationId xmlns="" xmlns:a16="http://schemas.microsoft.com/office/drawing/2014/main" id="{5AA2B150-5004-364C-910A-A392CD7A853A}"/>
                 </a:ext>
               </a:extLst>
             </p:cNvPr>
@@ -10282,7 +10282,7 @@
               <a:hlinkClick r:id="rId3"/>
               <a:extLst>
                 <a:ext uri="{FF2B5EF4-FFF2-40B4-BE49-F238E27FC236}">
-                  <a16:creationId xmlns:a16="http://schemas.microsoft.com/office/drawing/2014/main" xmlns="" id="{91AD4506-A6D6-124C-97E7-7D3DF0EBA900}"/>
+                  <a16:creationId xmlns="" xmlns:a16="http://schemas.microsoft.com/office/drawing/2014/main" id="{91AD4506-A6D6-124C-97E7-7D3DF0EBA900}"/>
                 </a:ext>
               </a:extLst>
             </p:cNvPr>
@@ -10341,7 +10341,7 @@
           <p:cNvPr id="122" name="Picture 121">
             <a:extLst>
               <a:ext uri="{FF2B5EF4-FFF2-40B4-BE49-F238E27FC236}">
-                <a16:creationId xmlns:a16="http://schemas.microsoft.com/office/drawing/2014/main" xmlns="" id="{B221A555-3C2F-E94D-96E4-6FC85564B891}"/>
+                <a16:creationId xmlns="" xmlns:a16="http://schemas.microsoft.com/office/drawing/2014/main" id="{B221A555-3C2F-E94D-96E4-6FC85564B891}"/>
               </a:ext>
             </a:extLst>
           </p:cNvPr>
@@ -10377,7 +10377,7 @@
           <p:cNvPr id="129" name="Title 24">
             <a:extLst>
               <a:ext uri="{FF2B5EF4-FFF2-40B4-BE49-F238E27FC236}">
-                <a16:creationId xmlns:a16="http://schemas.microsoft.com/office/drawing/2014/main" xmlns="" id="{C9C5C095-FA83-CE44-8BA2-FB0F4CF430D7}"/>
+                <a16:creationId xmlns="" xmlns:a16="http://schemas.microsoft.com/office/drawing/2014/main" id="{C9C5C095-FA83-CE44-8BA2-FB0F4CF430D7}"/>
               </a:ext>
             </a:extLst>
           </p:cNvPr>
@@ -10437,7 +10437,7 @@
           <p:cNvPr id="135" name="Straight Connector 134">
             <a:extLst>
               <a:ext uri="{FF2B5EF4-FFF2-40B4-BE49-F238E27FC236}">
-                <a16:creationId xmlns:a16="http://schemas.microsoft.com/office/drawing/2014/main" xmlns="" id="{FF6AB179-2926-4D40-A4DD-8BB1E9EAEA7D}"/>
+                <a16:creationId xmlns="" xmlns:a16="http://schemas.microsoft.com/office/drawing/2014/main" id="{FF6AB179-2926-4D40-A4DD-8BB1E9EAEA7D}"/>
               </a:ext>
             </a:extLst>
           </p:cNvPr>
@@ -10478,7 +10478,7 @@
           <p:cNvPr id="41" name="Content Placeholder 52">
             <a:extLst>
               <a:ext uri="{FF2B5EF4-FFF2-40B4-BE49-F238E27FC236}">
-                <a16:creationId xmlns:a16="http://schemas.microsoft.com/office/drawing/2014/main" xmlns="" id="{03870E7E-5F8D-F64D-B6CF-AC70B18948A2}"/>
+                <a16:creationId xmlns="" xmlns:a16="http://schemas.microsoft.com/office/drawing/2014/main" id="{03870E7E-5F8D-F64D-B6CF-AC70B18948A2}"/>
               </a:ext>
             </a:extLst>
           </p:cNvPr>
@@ -10728,7 +10728,7 @@
           <p:cNvPr id="42" name="Content Placeholder 52">
             <a:extLst>
               <a:ext uri="{FF2B5EF4-FFF2-40B4-BE49-F238E27FC236}">
-                <a16:creationId xmlns:a16="http://schemas.microsoft.com/office/drawing/2014/main" xmlns="" id="{95FE5B9D-9272-3841-9EE5-9D5A046A1FF7}"/>
+                <a16:creationId xmlns="" xmlns:a16="http://schemas.microsoft.com/office/drawing/2014/main" id="{95FE5B9D-9272-3841-9EE5-9D5A046A1FF7}"/>
               </a:ext>
             </a:extLst>
           </p:cNvPr>
@@ -10964,7 +10964,7 @@
           <p:cNvPr id="43" name="Content Placeholder 52">
             <a:extLst>
               <a:ext uri="{FF2B5EF4-FFF2-40B4-BE49-F238E27FC236}">
-                <a16:creationId xmlns:a16="http://schemas.microsoft.com/office/drawing/2014/main" xmlns="" id="{8C3392A2-7BEC-C643-A397-ACB0C15BDDE1}"/>
+                <a16:creationId xmlns="" xmlns:a16="http://schemas.microsoft.com/office/drawing/2014/main" id="{8C3392A2-7BEC-C643-A397-ACB0C15BDDE1}"/>
               </a:ext>
             </a:extLst>
           </p:cNvPr>
@@ -11199,7 +11199,7 @@
           <p:cNvPr id="44" name="Content Placeholder 52">
             <a:extLst>
               <a:ext uri="{FF2B5EF4-FFF2-40B4-BE49-F238E27FC236}">
-                <a16:creationId xmlns:a16="http://schemas.microsoft.com/office/drawing/2014/main" xmlns="" id="{5BF202D4-4239-7E4F-93CD-8E57B0E44847}"/>
+                <a16:creationId xmlns="" xmlns:a16="http://schemas.microsoft.com/office/drawing/2014/main" id="{5BF202D4-4239-7E4F-93CD-8E57B0E44847}"/>
               </a:ext>
             </a:extLst>
           </p:cNvPr>
@@ -11443,7 +11443,7 @@
           <p:cNvPr id="46" name="Content Placeholder 52">
             <a:extLst>
               <a:ext uri="{FF2B5EF4-FFF2-40B4-BE49-F238E27FC236}">
-                <a16:creationId xmlns:a16="http://schemas.microsoft.com/office/drawing/2014/main" xmlns="" id="{16FDB233-B738-8D4E-B43F-750A1A983DE9}"/>
+                <a16:creationId xmlns="" xmlns:a16="http://schemas.microsoft.com/office/drawing/2014/main" id="{16FDB233-B738-8D4E-B43F-750A1A983DE9}"/>
               </a:ext>
             </a:extLst>
           </p:cNvPr>
@@ -11679,7 +11679,7 @@
           <p:cNvPr id="47" name="Picture 46">
             <a:extLst>
               <a:ext uri="{FF2B5EF4-FFF2-40B4-BE49-F238E27FC236}">
-                <a16:creationId xmlns:a16="http://schemas.microsoft.com/office/drawing/2014/main" xmlns="" id="{E394D0E0-025D-644F-82A2-ED215AC1B381}"/>
+                <a16:creationId xmlns="" xmlns:a16="http://schemas.microsoft.com/office/drawing/2014/main" id="{E394D0E0-025D-644F-82A2-ED215AC1B381}"/>
               </a:ext>
             </a:extLst>
           </p:cNvPr>
@@ -11715,7 +11715,7 @@
           <p:cNvPr id="48" name="Picture 47">
             <a:extLst>
               <a:ext uri="{FF2B5EF4-FFF2-40B4-BE49-F238E27FC236}">
-                <a16:creationId xmlns:a16="http://schemas.microsoft.com/office/drawing/2014/main" xmlns="" id="{35E0AA7F-0EA4-224A-92F8-C9A9D5B1B802}"/>
+                <a16:creationId xmlns="" xmlns:a16="http://schemas.microsoft.com/office/drawing/2014/main" id="{35E0AA7F-0EA4-224A-92F8-C9A9D5B1B802}"/>
               </a:ext>
             </a:extLst>
           </p:cNvPr>
@@ -11751,7 +11751,7 @@
           <p:cNvPr id="49" name="Picture 48">
             <a:extLst>
               <a:ext uri="{FF2B5EF4-FFF2-40B4-BE49-F238E27FC236}">
-                <a16:creationId xmlns:a16="http://schemas.microsoft.com/office/drawing/2014/main" xmlns="" id="{A48092AC-915B-524D-9672-FE0826E130E7}"/>
+                <a16:creationId xmlns="" xmlns:a16="http://schemas.microsoft.com/office/drawing/2014/main" id="{A48092AC-915B-524D-9672-FE0826E130E7}"/>
               </a:ext>
             </a:extLst>
           </p:cNvPr>
@@ -11787,7 +11787,7 @@
           <p:cNvPr id="51" name="Picture 50">
             <a:extLst>
               <a:ext uri="{FF2B5EF4-FFF2-40B4-BE49-F238E27FC236}">
-                <a16:creationId xmlns:a16="http://schemas.microsoft.com/office/drawing/2014/main" xmlns="" id="{27E440A9-1FB1-A44A-8917-F3A839BAF906}"/>
+                <a16:creationId xmlns="" xmlns:a16="http://schemas.microsoft.com/office/drawing/2014/main" id="{27E440A9-1FB1-A44A-8917-F3A839BAF906}"/>
               </a:ext>
             </a:extLst>
           </p:cNvPr>
@@ -11823,7 +11823,7 @@
           <p:cNvPr id="52" name="Picture 51">
             <a:extLst>
               <a:ext uri="{FF2B5EF4-FFF2-40B4-BE49-F238E27FC236}">
-                <a16:creationId xmlns:a16="http://schemas.microsoft.com/office/drawing/2014/main" xmlns="" id="{FFFF220F-F683-2F48-A73D-6A41401B0D05}"/>
+                <a16:creationId xmlns="" xmlns:a16="http://schemas.microsoft.com/office/drawing/2014/main" id="{FFFF220F-F683-2F48-A73D-6A41401B0D05}"/>
               </a:ext>
             </a:extLst>
           </p:cNvPr>
@@ -11859,7 +11859,7 @@
           <p:cNvPr id="53" name="Picture 52">
             <a:extLst>
               <a:ext uri="{FF2B5EF4-FFF2-40B4-BE49-F238E27FC236}">
-                <a16:creationId xmlns:a16="http://schemas.microsoft.com/office/drawing/2014/main" xmlns="" id="{FC96BF3C-2C18-7E4E-AADA-8075C799317A}"/>
+                <a16:creationId xmlns="" xmlns:a16="http://schemas.microsoft.com/office/drawing/2014/main" id="{FC96BF3C-2C18-7E4E-AADA-8075C799317A}"/>
               </a:ext>
             </a:extLst>
           </p:cNvPr>
@@ -11895,7 +11895,7 @@
           <p:cNvPr id="54" name="Content Placeholder 52">
             <a:extLst>
               <a:ext uri="{FF2B5EF4-FFF2-40B4-BE49-F238E27FC236}">
-                <a16:creationId xmlns:a16="http://schemas.microsoft.com/office/drawing/2014/main" xmlns="" id="{8184E9DC-A05F-994B-8D0E-6F0964DE93A1}"/>
+                <a16:creationId xmlns="" xmlns:a16="http://schemas.microsoft.com/office/drawing/2014/main" id="{8184E9DC-A05F-994B-8D0E-6F0964DE93A1}"/>
               </a:ext>
             </a:extLst>
           </p:cNvPr>
@@ -12160,7 +12160,7 @@
           <p:cNvPr id="37" name="Content Placeholder 52">
             <a:extLst>
               <a:ext uri="{FF2B5EF4-FFF2-40B4-BE49-F238E27FC236}">
-                <a16:creationId xmlns:a16="http://schemas.microsoft.com/office/drawing/2014/main" xmlns="" id="{A1F29D74-7F07-D84E-B102-930FD141E5B9}"/>
+                <a16:creationId xmlns="" xmlns:a16="http://schemas.microsoft.com/office/drawing/2014/main" id="{A1F29D74-7F07-D84E-B102-930FD141E5B9}"/>
               </a:ext>
             </a:extLst>
           </p:cNvPr>
@@ -12396,7 +12396,7 @@
           <p:cNvPr id="38" name="Picture 37">
             <a:extLst>
               <a:ext uri="{FF2B5EF4-FFF2-40B4-BE49-F238E27FC236}">
-                <a16:creationId xmlns:a16="http://schemas.microsoft.com/office/drawing/2014/main" xmlns="" id="{B4EE7BA3-3882-054B-9C71-4C6C9D45BBC3}"/>
+                <a16:creationId xmlns="" xmlns:a16="http://schemas.microsoft.com/office/drawing/2014/main" id="{B4EE7BA3-3882-054B-9C71-4C6C9D45BBC3}"/>
               </a:ext>
             </a:extLst>
           </p:cNvPr>
@@ -12432,7 +12432,7 @@
           <p:cNvPr id="63" name="Hexagon 5">
             <a:extLst>
               <a:ext uri="{FF2B5EF4-FFF2-40B4-BE49-F238E27FC236}">
-                <a16:creationId xmlns:a16="http://schemas.microsoft.com/office/drawing/2014/main" xmlns="" id="{364503C3-2EEB-304D-8F5A-656CAD26AC38}"/>
+                <a16:creationId xmlns="" xmlns:a16="http://schemas.microsoft.com/office/drawing/2014/main" id="{364503C3-2EEB-304D-8F5A-656CAD26AC38}"/>
               </a:ext>
             </a:extLst>
           </p:cNvPr>
@@ -12702,7 +12702,7 @@
           <p:cNvPr id="64" name="Picture 63">
             <a:extLst>
               <a:ext uri="{FF2B5EF4-FFF2-40B4-BE49-F238E27FC236}">
-                <a16:creationId xmlns:a16="http://schemas.microsoft.com/office/drawing/2014/main" xmlns="" id="{6241EA04-8B95-A04D-BFAA-ECA5355B2F83}"/>
+                <a16:creationId xmlns="" xmlns:a16="http://schemas.microsoft.com/office/drawing/2014/main" id="{6241EA04-8B95-A04D-BFAA-ECA5355B2F83}"/>
               </a:ext>
             </a:extLst>
           </p:cNvPr>
@@ -12739,7 +12739,7 @@
             <a:hlinkClick r:id="rId12"/>
             <a:extLst>
               <a:ext uri="{FF2B5EF4-FFF2-40B4-BE49-F238E27FC236}">
-                <a16:creationId xmlns:a16="http://schemas.microsoft.com/office/drawing/2014/main" xmlns="" id="{242972D4-E45D-4C48-98B1-E9B8928925A8}"/>
+                <a16:creationId xmlns="" xmlns:a16="http://schemas.microsoft.com/office/drawing/2014/main" id="{242972D4-E45D-4C48-98B1-E9B8928925A8}"/>
               </a:ext>
             </a:extLst>
           </p:cNvPr>
@@ -12802,7 +12802,7 @@
           <p:cNvPr id="68" name="Content Placeholder 52">
             <a:extLst>
               <a:ext uri="{FF2B5EF4-FFF2-40B4-BE49-F238E27FC236}">
-                <a16:creationId xmlns:a16="http://schemas.microsoft.com/office/drawing/2014/main" xmlns="" id="{B59D4673-E8B1-2C49-81BA-06195A220AB1}"/>
+                <a16:creationId xmlns="" xmlns:a16="http://schemas.microsoft.com/office/drawing/2014/main" id="{B59D4673-E8B1-2C49-81BA-06195A220AB1}"/>
               </a:ext>
             </a:extLst>
           </p:cNvPr>
@@ -13008,7 +13008,7 @@
             <a:hlinkClick r:id="rId12"/>
             <a:extLst>
               <a:ext uri="{FF2B5EF4-FFF2-40B4-BE49-F238E27FC236}">
-                <a16:creationId xmlns:a16="http://schemas.microsoft.com/office/drawing/2014/main" xmlns="" id="{E8323CE4-5234-8142-9DE4-A809DB291451}"/>
+                <a16:creationId xmlns="" xmlns:a16="http://schemas.microsoft.com/office/drawing/2014/main" id="{E8323CE4-5234-8142-9DE4-A809DB291451}"/>
               </a:ext>
             </a:extLst>
           </p:cNvPr>
@@ -13067,7 +13067,7 @@
             <a:hlinkClick r:id="rId3"/>
             <a:extLst>
               <a:ext uri="{FF2B5EF4-FFF2-40B4-BE49-F238E27FC236}">
-                <a16:creationId xmlns:a16="http://schemas.microsoft.com/office/drawing/2014/main" xmlns="" id="{6C78789D-668C-3346-9A82-AE9B686AF055}"/>
+                <a16:creationId xmlns="" xmlns:a16="http://schemas.microsoft.com/office/drawing/2014/main" id="{6C78789D-668C-3346-9A82-AE9B686AF055}"/>
               </a:ext>
             </a:extLst>
           </p:cNvPr>
@@ -13126,7 +13126,7 @@
             <a:hlinkClick r:id="rId2"/>
             <a:extLst>
               <a:ext uri="{FF2B5EF4-FFF2-40B4-BE49-F238E27FC236}">
-                <a16:creationId xmlns:a16="http://schemas.microsoft.com/office/drawing/2014/main" xmlns="" id="{B054C5B9-06BF-FE44-99FF-F2FA5C20AC60}"/>
+                <a16:creationId xmlns="" xmlns:a16="http://schemas.microsoft.com/office/drawing/2014/main" id="{B054C5B9-06BF-FE44-99FF-F2FA5C20AC60}"/>
               </a:ext>
             </a:extLst>
           </p:cNvPr>
@@ -15289,7 +15289,7 @@
           <p:cNvPr id="14" name="Slide Number Placeholder 5">
             <a:extLst>
               <a:ext uri="{FF2B5EF4-FFF2-40B4-BE49-F238E27FC236}">
-                <a16:creationId xmlns:a16="http://schemas.microsoft.com/office/drawing/2014/main" xmlns="" id="{D6A5EA0A-9DA9-564F-8F7D-CF263DB84C39}"/>
+                <a16:creationId xmlns="" xmlns:a16="http://schemas.microsoft.com/office/drawing/2014/main" id="{D6A5EA0A-9DA9-564F-8F7D-CF263DB84C39}"/>
               </a:ext>
             </a:extLst>
           </p:cNvPr>
@@ -15427,7 +15427,7 @@
           <p:cNvPr id="21" name="Straight Connector 20">
             <a:extLst>
               <a:ext uri="{FF2B5EF4-FFF2-40B4-BE49-F238E27FC236}">
-                <a16:creationId xmlns:a16="http://schemas.microsoft.com/office/drawing/2014/main" xmlns="" id="{F4443C96-B82D-F449-A71B-02134B6BB207}"/>
+                <a16:creationId xmlns="" xmlns:a16="http://schemas.microsoft.com/office/drawing/2014/main" id="{F4443C96-B82D-F449-A71B-02134B6BB207}"/>
               </a:ext>
             </a:extLst>
           </p:cNvPr>
@@ -15513,7 +15513,7 @@
           <p:cNvPr id="6" name="Picture 5">
             <a:extLst>
               <a:ext uri="{FF2B5EF4-FFF2-40B4-BE49-F238E27FC236}">
-                <a16:creationId xmlns:a16="http://schemas.microsoft.com/office/drawing/2014/main" xmlns="" id="{FFB611C2-DDCE-7F48-9E56-C0AF82F39DC1}"/>
+                <a16:creationId xmlns="" xmlns:a16="http://schemas.microsoft.com/office/drawing/2014/main" id="{FFB611C2-DDCE-7F48-9E56-C0AF82F39DC1}"/>
               </a:ext>
             </a:extLst>
           </p:cNvPr>
@@ -17933,7 +17933,7 @@
           <p:cNvPr id="4" name="Date Placeholder 3">
             <a:extLst>
               <a:ext uri="{FF2B5EF4-FFF2-40B4-BE49-F238E27FC236}">
-                <a16:creationId xmlns:a16="http://schemas.microsoft.com/office/drawing/2014/main" xmlns="" id="{5B11DD0F-109E-46C2-A486-47D107A02E36}"/>
+                <a16:creationId xmlns="" xmlns:a16="http://schemas.microsoft.com/office/drawing/2014/main" id="{5B11DD0F-109E-46C2-A486-47D107A02E36}"/>
               </a:ext>
             </a:extLst>
           </p:cNvPr>
@@ -17970,7 +17970,7 @@
           <p:cNvPr id="5" name="Footer Placeholder 4">
             <a:extLst>
               <a:ext uri="{FF2B5EF4-FFF2-40B4-BE49-F238E27FC236}">
-                <a16:creationId xmlns:a16="http://schemas.microsoft.com/office/drawing/2014/main" xmlns="" id="{2F8E408F-E4B6-4443-9119-5286D2FBA56E}"/>
+                <a16:creationId xmlns="" xmlns:a16="http://schemas.microsoft.com/office/drawing/2014/main" id="{2F8E408F-E4B6-4443-9119-5286D2FBA56E}"/>
               </a:ext>
             </a:extLst>
           </p:cNvPr>
@@ -17999,7 +17999,7 @@
           <p:cNvPr id="6" name="Title 5">
             <a:extLst>
               <a:ext uri="{FF2B5EF4-FFF2-40B4-BE49-F238E27FC236}">
-                <a16:creationId xmlns:a16="http://schemas.microsoft.com/office/drawing/2014/main" xmlns="" id="{07F49BEE-8DB9-44C9-B1F4-9FE76BECF3E1}"/>
+                <a16:creationId xmlns="" xmlns:a16="http://schemas.microsoft.com/office/drawing/2014/main" id="{07F49BEE-8DB9-44C9-B1F4-9FE76BECF3E1}"/>
               </a:ext>
             </a:extLst>
           </p:cNvPr>
@@ -18010,15 +18010,21 @@
             <p:ph type="title"/>
           </p:nvPr>
         </p:nvSpPr>
-        <p:spPr/>
+        <p:spPr>
+          <a:xfrm>
+            <a:off x="550863" y="332656"/>
+            <a:ext cx="10051234" cy="921672"/>
+          </a:xfrm>
+        </p:spPr>
         <p:txBody>
           <a:bodyPr/>
           <a:lstStyle/>
           <a:p>
             <a:r>
-              <a:rPr lang="en-US" dirty="0"/>
-              <a:t>controlled_portability_principle.png</a:t>
-            </a:r>
+              <a:rPr lang="en-US" dirty="0" smtClean="0"/>
+              <a:t>feature_portability_control_principle.png</a:t>
+            </a:r>
+            <a:endParaRPr lang="en-US" dirty="0"/>
           </a:p>
         </p:txBody>
       </p:sp>
@@ -19042,18 +19048,7 @@
                 <a:ea typeface="Source Sans Pro Light" charset="0"/>
                 <a:cs typeface="Source Sans Pro Light" charset="0"/>
               </a:rPr>
-              <a:t>#</a:t>
-            </a:r>
-            <a:r>
-              <a:rPr lang="en-GB" sz="1000" dirty="0" smtClean="0">
-                <a:solidFill>
-                  <a:schemeClr val="bg1"/>
-                </a:solidFill>
-                <a:latin typeface="Source Sans Pro Light" charset="0"/>
-                <a:ea typeface="Source Sans Pro Light" charset="0"/>
-                <a:cs typeface="Source Sans Pro Light" charset="0"/>
-              </a:rPr>
-              <a:t>ABCD</a:t>
+              <a:t>#ABCD</a:t>
             </a:r>
           </a:p>
           <a:p>

</xml_diff>

<commit_message>
remove portability cycle in the overview schematic
</commit_message>
<xml_diff>
--- a/KernelDeveloperGuide/pptx/controlled_portability.pptx
+++ b/KernelDeveloperGuide/pptx/controlled_portability.pptx
@@ -219,7 +219,7 @@
               <a:rPr lang="fr-FR" smtClean="0">
                 <a:latin typeface="Calibri Regular" charset="0"/>
               </a:rPr>
-              <a:t>mercredi 9 mars 2022</a:t>
+              <a:t>vendredi 11 mars 2022</a:t>
             </a:fld>
             <a:endParaRPr lang="en-US" dirty="0">
               <a:latin typeface="Calibri Regular" charset="0"/>
@@ -397,7 +397,7 @@
           <a:p>
             <a:fld id="{885721CF-495B-2B41-A23A-4D3221F80235}" type="datetime2">
               <a:rPr lang="fr-FR" smtClean="0"/>
-              <a:t>mercredi 9 mars 2022</a:t>
+              <a:t>vendredi 11 mars 2022</a:t>
             </a:fld>
             <a:endParaRPr lang="en-US" dirty="0"/>
           </a:p>
@@ -1273,7 +1273,7 @@
           <p:cNvPr id="7" name="Text Placeholder 2">
             <a:extLst>
               <a:ext uri="{FF2B5EF4-FFF2-40B4-BE49-F238E27FC236}">
-                <a16:creationId xmlns:a16="http://schemas.microsoft.com/office/drawing/2014/main" xmlns="" id="{EE9EA528-AAC2-D34E-8538-0A0AAD80AD96}"/>
+                <a16:creationId xmlns="" xmlns:a16="http://schemas.microsoft.com/office/drawing/2014/main" id="{EE9EA528-AAC2-D34E-8538-0A0AAD80AD96}"/>
               </a:ext>
             </a:extLst>
           </p:cNvPr>
@@ -1359,7 +1359,7 @@
           <p:cNvPr id="10" name="Content Placeholder 3">
             <a:extLst>
               <a:ext uri="{FF2B5EF4-FFF2-40B4-BE49-F238E27FC236}">
-                <a16:creationId xmlns:a16="http://schemas.microsoft.com/office/drawing/2014/main" xmlns="" id="{DAF8326C-6710-4047-962C-1C0A0F78FFB5}"/>
+                <a16:creationId xmlns="" xmlns:a16="http://schemas.microsoft.com/office/drawing/2014/main" id="{DAF8326C-6710-4047-962C-1C0A0F78FFB5}"/>
               </a:ext>
             </a:extLst>
           </p:cNvPr>
@@ -2052,7 +2052,7 @@
           <p:cNvPr id="7" name="Text Placeholder 2">
             <a:extLst>
               <a:ext uri="{FF2B5EF4-FFF2-40B4-BE49-F238E27FC236}">
-                <a16:creationId xmlns:a16="http://schemas.microsoft.com/office/drawing/2014/main" xmlns="" id="{BADF2A12-0EA6-EC4F-864C-2E94AC36ADCE}"/>
+                <a16:creationId xmlns="" xmlns:a16="http://schemas.microsoft.com/office/drawing/2014/main" id="{BADF2A12-0EA6-EC4F-864C-2E94AC36ADCE}"/>
               </a:ext>
             </a:extLst>
           </p:cNvPr>
@@ -2877,7 +2877,7 @@
           <p:cNvPr id="7" name="Content Placeholder 3">
             <a:extLst>
               <a:ext uri="{FF2B5EF4-FFF2-40B4-BE49-F238E27FC236}">
-                <a16:creationId xmlns:a16="http://schemas.microsoft.com/office/drawing/2014/main" xmlns="" id="{2E4978A6-AF2C-644A-9245-7D0BA4E8B6CE}"/>
+                <a16:creationId xmlns="" xmlns:a16="http://schemas.microsoft.com/office/drawing/2014/main" id="{2E4978A6-AF2C-644A-9245-7D0BA4E8B6CE}"/>
               </a:ext>
             </a:extLst>
           </p:cNvPr>
@@ -3274,7 +3274,7 @@
           <p:cNvPr id="7" name="Text Placeholder 2">
             <a:extLst>
               <a:ext uri="{FF2B5EF4-FFF2-40B4-BE49-F238E27FC236}">
-                <a16:creationId xmlns:a16="http://schemas.microsoft.com/office/drawing/2014/main" xmlns="" id="{BADF2A12-0EA6-EC4F-864C-2E94AC36ADCE}"/>
+                <a16:creationId xmlns="" xmlns:a16="http://schemas.microsoft.com/office/drawing/2014/main" id="{BADF2A12-0EA6-EC4F-864C-2E94AC36ADCE}"/>
               </a:ext>
             </a:extLst>
           </p:cNvPr>
@@ -4226,7 +4226,7 @@
           <p:cNvPr id="13" name="Rectangle 12">
             <a:extLst>
               <a:ext uri="{FF2B5EF4-FFF2-40B4-BE49-F238E27FC236}">
-                <a16:creationId xmlns:a16="http://schemas.microsoft.com/office/drawing/2014/main" xmlns="" id="{200F2B4F-ED74-D84B-A5FF-644A79E13221}"/>
+                <a16:creationId xmlns="" xmlns:a16="http://schemas.microsoft.com/office/drawing/2014/main" id="{200F2B4F-ED74-D84B-A5FF-644A79E13221}"/>
               </a:ext>
             </a:extLst>
           </p:cNvPr>
@@ -4466,7 +4466,7 @@
           <p:cNvPr id="14" name="Footer Placeholder 5">
             <a:extLst>
               <a:ext uri="{FF2B5EF4-FFF2-40B4-BE49-F238E27FC236}">
-                <a16:creationId xmlns:a16="http://schemas.microsoft.com/office/drawing/2014/main" xmlns="" id="{9D0AEA00-A11E-E447-A27D-E3693067A9E6}"/>
+                <a16:creationId xmlns="" xmlns:a16="http://schemas.microsoft.com/office/drawing/2014/main" id="{9D0AEA00-A11E-E447-A27D-E3693067A9E6}"/>
               </a:ext>
             </a:extLst>
           </p:cNvPr>
@@ -4514,7 +4514,7 @@
           <p:cNvPr id="16" name="Picture 2" descr="C:\Users\cmorineau\Marketing-Private\Marcom\Graphics\Artwork_Corp\Logos\Logo-microej-grey-h50.png">
             <a:extLst>
               <a:ext uri="{FF2B5EF4-FFF2-40B4-BE49-F238E27FC236}">
-                <a16:creationId xmlns:a16="http://schemas.microsoft.com/office/drawing/2014/main" xmlns="" id="{75E7AEDB-C69E-AA4C-96BC-8D040A4C81DB}"/>
+                <a16:creationId xmlns="" xmlns:a16="http://schemas.microsoft.com/office/drawing/2014/main" id="{75E7AEDB-C69E-AA4C-96BC-8D040A4C81DB}"/>
               </a:ext>
             </a:extLst>
           </p:cNvPr>
@@ -4682,7 +4682,7 @@
           <p:cNvPr id="11" name="Picture 10">
             <a:extLst>
               <a:ext uri="{FF2B5EF4-FFF2-40B4-BE49-F238E27FC236}">
-                <a16:creationId xmlns:a16="http://schemas.microsoft.com/office/drawing/2014/main" xmlns="" id="{21EA2856-E9E7-8D44-8863-70888E0D7F19}"/>
+                <a16:creationId xmlns="" xmlns:a16="http://schemas.microsoft.com/office/drawing/2014/main" id="{21EA2856-E9E7-8D44-8863-70888E0D7F19}"/>
               </a:ext>
             </a:extLst>
           </p:cNvPr>
@@ -4718,7 +4718,7 @@
           <p:cNvPr id="15" name="Title Placeholder 1">
             <a:extLst>
               <a:ext uri="{FF2B5EF4-FFF2-40B4-BE49-F238E27FC236}">
-                <a16:creationId xmlns:a16="http://schemas.microsoft.com/office/drawing/2014/main" xmlns="" id="{ED4F756F-313C-9A45-AA9F-4637139720F4}"/>
+                <a16:creationId xmlns="" xmlns:a16="http://schemas.microsoft.com/office/drawing/2014/main" id="{ED4F756F-313C-9A45-AA9F-4637139720F4}"/>
               </a:ext>
             </a:extLst>
           </p:cNvPr>
@@ -4773,7 +4773,7 @@
           <p:cNvPr id="16" name="Picture 15">
             <a:extLst>
               <a:ext uri="{FF2B5EF4-FFF2-40B4-BE49-F238E27FC236}">
-                <a16:creationId xmlns:a16="http://schemas.microsoft.com/office/drawing/2014/main" xmlns="" id="{A9288502-3773-1F4B-A16F-58C59F5FD419}"/>
+                <a16:creationId xmlns="" xmlns:a16="http://schemas.microsoft.com/office/drawing/2014/main" id="{A9288502-3773-1F4B-A16F-58C59F5FD419}"/>
               </a:ext>
             </a:extLst>
           </p:cNvPr>
@@ -4809,7 +4809,7 @@
           <p:cNvPr id="32" name="Straight Connector 31">
             <a:extLst>
               <a:ext uri="{FF2B5EF4-FFF2-40B4-BE49-F238E27FC236}">
-                <a16:creationId xmlns:a16="http://schemas.microsoft.com/office/drawing/2014/main" xmlns="" id="{158023E0-65D2-F849-83D8-A55E2AC6BB63}"/>
+                <a16:creationId xmlns="" xmlns:a16="http://schemas.microsoft.com/office/drawing/2014/main" id="{158023E0-65D2-F849-83D8-A55E2AC6BB63}"/>
               </a:ext>
             </a:extLst>
           </p:cNvPr>
@@ -4847,7 +4847,7 @@
           <p:cNvPr id="36" name="Straight Connector 35">
             <a:extLst>
               <a:ext uri="{FF2B5EF4-FFF2-40B4-BE49-F238E27FC236}">
-                <a16:creationId xmlns:a16="http://schemas.microsoft.com/office/drawing/2014/main" xmlns="" id="{1C61BB10-90B1-A04F-AB02-727027D1950C}"/>
+                <a16:creationId xmlns="" xmlns:a16="http://schemas.microsoft.com/office/drawing/2014/main" id="{1C61BB10-90B1-A04F-AB02-727027D1950C}"/>
               </a:ext>
             </a:extLst>
           </p:cNvPr>
@@ -4890,7 +4890,7 @@
           <p:cNvPr id="37" name="Content Placeholder 3">
             <a:extLst>
               <a:ext uri="{FF2B5EF4-FFF2-40B4-BE49-F238E27FC236}">
-                <a16:creationId xmlns:a16="http://schemas.microsoft.com/office/drawing/2014/main" xmlns="" id="{E6FA2AB0-B1DC-CE4F-BA00-6F224EAE5B8E}"/>
+                <a16:creationId xmlns="" xmlns:a16="http://schemas.microsoft.com/office/drawing/2014/main" id="{E6FA2AB0-B1DC-CE4F-BA00-6F224EAE5B8E}"/>
               </a:ext>
             </a:extLst>
           </p:cNvPr>
@@ -4986,7 +4986,7 @@
           <p:cNvPr id="17" name="Content Placeholder 3">
             <a:extLst>
               <a:ext uri="{FF2B5EF4-FFF2-40B4-BE49-F238E27FC236}">
-                <a16:creationId xmlns:a16="http://schemas.microsoft.com/office/drawing/2014/main" xmlns="" id="{A143064D-45EC-0A4F-88C5-9640D09D7651}"/>
+                <a16:creationId xmlns="" xmlns:a16="http://schemas.microsoft.com/office/drawing/2014/main" id="{A143064D-45EC-0A4F-88C5-9640D09D7651}"/>
               </a:ext>
             </a:extLst>
           </p:cNvPr>
@@ -5587,7 +5587,7 @@
           <p:cNvPr id="8" name="Rectangle 7">
             <a:extLst>
               <a:ext uri="{FF2B5EF4-FFF2-40B4-BE49-F238E27FC236}">
-                <a16:creationId xmlns:a16="http://schemas.microsoft.com/office/drawing/2014/main" xmlns="" id="{6524FE37-B1D2-9A48-8EE1-B9816DBDEF3D}"/>
+                <a16:creationId xmlns="" xmlns:a16="http://schemas.microsoft.com/office/drawing/2014/main" id="{6524FE37-B1D2-9A48-8EE1-B9816DBDEF3D}"/>
               </a:ext>
             </a:extLst>
           </p:cNvPr>
@@ -5626,7 +5626,7 @@
           <p:cNvPr id="9" name="TextBox 8">
             <a:extLst>
               <a:ext uri="{FF2B5EF4-FFF2-40B4-BE49-F238E27FC236}">
-                <a16:creationId xmlns:a16="http://schemas.microsoft.com/office/drawing/2014/main" xmlns="" id="{46ADA988-EDE2-EB43-9964-F5CB85382BA1}"/>
+                <a16:creationId xmlns="" xmlns:a16="http://schemas.microsoft.com/office/drawing/2014/main" id="{46ADA988-EDE2-EB43-9964-F5CB85382BA1}"/>
               </a:ext>
             </a:extLst>
           </p:cNvPr>
@@ -5865,7 +5865,7 @@
           <p:cNvPr id="12" name="Straight Connector 11">
             <a:extLst>
               <a:ext uri="{FF2B5EF4-FFF2-40B4-BE49-F238E27FC236}">
-                <a16:creationId xmlns:a16="http://schemas.microsoft.com/office/drawing/2014/main" xmlns="" id="{80782101-745C-B64C-BF8C-0612C8A826F4}"/>
+                <a16:creationId xmlns="" xmlns:a16="http://schemas.microsoft.com/office/drawing/2014/main" id="{80782101-745C-B64C-BF8C-0612C8A826F4}"/>
               </a:ext>
             </a:extLst>
           </p:cNvPr>
@@ -6021,7 +6021,7 @@
           <p:cNvPr id="11" name="Rectangle 10">
             <a:extLst>
               <a:ext uri="{FF2B5EF4-FFF2-40B4-BE49-F238E27FC236}">
-                <a16:creationId xmlns:a16="http://schemas.microsoft.com/office/drawing/2014/main" xmlns="" id="{1A60FEF2-2730-8045-B797-AEA6DA2ED07B}"/>
+                <a16:creationId xmlns="" xmlns:a16="http://schemas.microsoft.com/office/drawing/2014/main" id="{1A60FEF2-2730-8045-B797-AEA6DA2ED07B}"/>
               </a:ext>
             </a:extLst>
           </p:cNvPr>
@@ -6057,7 +6057,7 @@
           <p:cNvPr id="12" name="Straight Connector 11">
             <a:extLst>
               <a:ext uri="{FF2B5EF4-FFF2-40B4-BE49-F238E27FC236}">
-                <a16:creationId xmlns:a16="http://schemas.microsoft.com/office/drawing/2014/main" xmlns="" id="{9FC44B9B-3ED3-CD4D-A4B4-670F9A0707A7}"/>
+                <a16:creationId xmlns="" xmlns:a16="http://schemas.microsoft.com/office/drawing/2014/main" id="{9FC44B9B-3ED3-CD4D-A4B4-670F9A0707A7}"/>
               </a:ext>
             </a:extLst>
           </p:cNvPr>
@@ -6093,7 +6093,7 @@
           <p:cNvPr id="13" name="Rectangle 12">
             <a:extLst>
               <a:ext uri="{FF2B5EF4-FFF2-40B4-BE49-F238E27FC236}">
-                <a16:creationId xmlns:a16="http://schemas.microsoft.com/office/drawing/2014/main" xmlns="" id="{A8E9047D-CEE7-1041-9CD2-438580517A8B}"/>
+                <a16:creationId xmlns="" xmlns:a16="http://schemas.microsoft.com/office/drawing/2014/main" id="{A8E9047D-CEE7-1041-9CD2-438580517A8B}"/>
               </a:ext>
             </a:extLst>
           </p:cNvPr>
@@ -6129,7 +6129,7 @@
           <p:cNvPr id="14" name="Straight Connector 13">
             <a:extLst>
               <a:ext uri="{FF2B5EF4-FFF2-40B4-BE49-F238E27FC236}">
-                <a16:creationId xmlns:a16="http://schemas.microsoft.com/office/drawing/2014/main" xmlns="" id="{A080B88E-5B35-9C42-B51A-25732C333881}"/>
+                <a16:creationId xmlns="" xmlns:a16="http://schemas.microsoft.com/office/drawing/2014/main" id="{A080B88E-5B35-9C42-B51A-25732C333881}"/>
               </a:ext>
             </a:extLst>
           </p:cNvPr>
@@ -6165,7 +6165,7 @@
           <p:cNvPr id="16" name="TextBox 15">
             <a:extLst>
               <a:ext uri="{FF2B5EF4-FFF2-40B4-BE49-F238E27FC236}">
-                <a16:creationId xmlns:a16="http://schemas.microsoft.com/office/drawing/2014/main" xmlns="" id="{B2BB3227-C774-FD42-B9A5-3508452E6A71}"/>
+                <a16:creationId xmlns="" xmlns:a16="http://schemas.microsoft.com/office/drawing/2014/main" id="{B2BB3227-C774-FD42-B9A5-3508452E6A71}"/>
               </a:ext>
             </a:extLst>
           </p:cNvPr>
@@ -6465,7 +6465,7 @@
           <p:cNvPr id="86" name="Rectangle 85">
             <a:extLst>
               <a:ext uri="{FF2B5EF4-FFF2-40B4-BE49-F238E27FC236}">
-                <a16:creationId xmlns:a16="http://schemas.microsoft.com/office/drawing/2014/main" xmlns="" id="{EDB109D6-5BF6-5E42-A1C1-45B238B41A7E}"/>
+                <a16:creationId xmlns="" xmlns:a16="http://schemas.microsoft.com/office/drawing/2014/main" id="{EDB109D6-5BF6-5E42-A1C1-45B238B41A7E}"/>
               </a:ext>
             </a:extLst>
           </p:cNvPr>
@@ -6527,7 +6527,7 @@
           <p:cNvPr id="45" name="Rectangle 1">
             <a:extLst>
               <a:ext uri="{FF2B5EF4-FFF2-40B4-BE49-F238E27FC236}">
-                <a16:creationId xmlns:a16="http://schemas.microsoft.com/office/drawing/2014/main" xmlns="" id="{7F24C5F6-F280-EE49-BEC1-D93D2617D356}"/>
+                <a16:creationId xmlns="" xmlns:a16="http://schemas.microsoft.com/office/drawing/2014/main" id="{7F24C5F6-F280-EE49-BEC1-D93D2617D356}"/>
               </a:ext>
             </a:extLst>
           </p:cNvPr>
@@ -6776,7 +6776,7 @@
           <p:cNvPr id="89" name="Rectangle 88">
             <a:extLst>
               <a:ext uri="{FF2B5EF4-FFF2-40B4-BE49-F238E27FC236}">
-                <a16:creationId xmlns:a16="http://schemas.microsoft.com/office/drawing/2014/main" xmlns="" id="{EFCB9C4D-5246-B743-853A-FA66CEE7DE4D}"/>
+                <a16:creationId xmlns="" xmlns:a16="http://schemas.microsoft.com/office/drawing/2014/main" id="{EFCB9C4D-5246-B743-853A-FA66CEE7DE4D}"/>
               </a:ext>
             </a:extLst>
           </p:cNvPr>
@@ -6828,7 +6828,7 @@
           <p:cNvPr id="93" name="Triangle 92">
             <a:extLst>
               <a:ext uri="{FF2B5EF4-FFF2-40B4-BE49-F238E27FC236}">
-                <a16:creationId xmlns:a16="http://schemas.microsoft.com/office/drawing/2014/main" xmlns="" id="{0D72A147-C32E-C540-8F80-59F865637BB1}"/>
+                <a16:creationId xmlns="" xmlns:a16="http://schemas.microsoft.com/office/drawing/2014/main" id="{0D72A147-C32E-C540-8F80-59F865637BB1}"/>
               </a:ext>
             </a:extLst>
           </p:cNvPr>
@@ -6883,7 +6883,7 @@
             <a:hlinkClick r:id="rId2"/>
             <a:extLst>
               <a:ext uri="{FF2B5EF4-FFF2-40B4-BE49-F238E27FC236}">
-                <a16:creationId xmlns:a16="http://schemas.microsoft.com/office/drawing/2014/main" xmlns="" id="{0A03D419-B4E4-A341-8258-BAF4FC5373B4}"/>
+                <a16:creationId xmlns="" xmlns:a16="http://schemas.microsoft.com/office/drawing/2014/main" id="{0A03D419-B4E4-A341-8258-BAF4FC5373B4}"/>
               </a:ext>
             </a:extLst>
           </p:cNvPr>
@@ -6946,7 +6946,7 @@
           <p:cNvPr id="95" name="Group 94">
             <a:extLst>
               <a:ext uri="{FF2B5EF4-FFF2-40B4-BE49-F238E27FC236}">
-                <a16:creationId xmlns:a16="http://schemas.microsoft.com/office/drawing/2014/main" xmlns="" id="{89E75E57-B1BB-1043-92B1-2837059A39CF}"/>
+                <a16:creationId xmlns="" xmlns:a16="http://schemas.microsoft.com/office/drawing/2014/main" id="{89E75E57-B1BB-1043-92B1-2837059A39CF}"/>
               </a:ext>
             </a:extLst>
           </p:cNvPr>
@@ -6966,7 +6966,7 @@
             <p:cNvPr id="96" name="Rounded Rectangle 95">
               <a:extLst>
                 <a:ext uri="{FF2B5EF4-FFF2-40B4-BE49-F238E27FC236}">
-                  <a16:creationId xmlns:a16="http://schemas.microsoft.com/office/drawing/2014/main" xmlns="" id="{C571F53C-F9A8-D34F-89E9-D59834F26F2A}"/>
+                  <a16:creationId xmlns="" xmlns:a16="http://schemas.microsoft.com/office/drawing/2014/main" id="{C571F53C-F9A8-D34F-89E9-D59834F26F2A}"/>
                 </a:ext>
               </a:extLst>
             </p:cNvPr>
@@ -7019,7 +7019,7 @@
               <a:hlinkClick r:id="rId3"/>
               <a:extLst>
                 <a:ext uri="{FF2B5EF4-FFF2-40B4-BE49-F238E27FC236}">
-                  <a16:creationId xmlns:a16="http://schemas.microsoft.com/office/drawing/2014/main" xmlns="" id="{BCCC18FD-7037-504F-B7DD-009E93D5CFC5}"/>
+                  <a16:creationId xmlns="" xmlns:a16="http://schemas.microsoft.com/office/drawing/2014/main" id="{BCCC18FD-7037-504F-B7DD-009E93D5CFC5}"/>
                 </a:ext>
               </a:extLst>
             </p:cNvPr>
@@ -7071,7 +7071,7 @@
             <a:hlinkClick r:id="rId3"/>
             <a:extLst>
               <a:ext uri="{FF2B5EF4-FFF2-40B4-BE49-F238E27FC236}">
-                <a16:creationId xmlns:a16="http://schemas.microsoft.com/office/drawing/2014/main" xmlns="" id="{31AA4A0D-C979-ED41-9053-191689A53F33}"/>
+                <a16:creationId xmlns="" xmlns:a16="http://schemas.microsoft.com/office/drawing/2014/main" id="{31AA4A0D-C979-ED41-9053-191689A53F33}"/>
               </a:ext>
             </a:extLst>
           </p:cNvPr>
@@ -7134,7 +7134,7 @@
           <p:cNvPr id="105" name="Group 104">
             <a:extLst>
               <a:ext uri="{FF2B5EF4-FFF2-40B4-BE49-F238E27FC236}">
-                <a16:creationId xmlns:a16="http://schemas.microsoft.com/office/drawing/2014/main" xmlns="" id="{7BF00640-0851-4A4E-8179-1BD384D8F525}"/>
+                <a16:creationId xmlns="" xmlns:a16="http://schemas.microsoft.com/office/drawing/2014/main" id="{7BF00640-0851-4A4E-8179-1BD384D8F525}"/>
               </a:ext>
             </a:extLst>
           </p:cNvPr>
@@ -7154,7 +7154,7 @@
             <p:cNvPr id="106" name="Rounded Rectangle 105">
               <a:extLst>
                 <a:ext uri="{FF2B5EF4-FFF2-40B4-BE49-F238E27FC236}">
-                  <a16:creationId xmlns:a16="http://schemas.microsoft.com/office/drawing/2014/main" xmlns="" id="{5AA2B150-5004-364C-910A-A392CD7A853A}"/>
+                  <a16:creationId xmlns="" xmlns:a16="http://schemas.microsoft.com/office/drawing/2014/main" id="{5AA2B150-5004-364C-910A-A392CD7A853A}"/>
                 </a:ext>
               </a:extLst>
             </p:cNvPr>
@@ -7207,7 +7207,7 @@
               <a:hlinkClick r:id="rId3"/>
               <a:extLst>
                 <a:ext uri="{FF2B5EF4-FFF2-40B4-BE49-F238E27FC236}">
-                  <a16:creationId xmlns:a16="http://schemas.microsoft.com/office/drawing/2014/main" xmlns="" id="{91AD4506-A6D6-124C-97E7-7D3DF0EBA900}"/>
+                  <a16:creationId xmlns="" xmlns:a16="http://schemas.microsoft.com/office/drawing/2014/main" id="{91AD4506-A6D6-124C-97E7-7D3DF0EBA900}"/>
                 </a:ext>
               </a:extLst>
             </p:cNvPr>
@@ -7266,7 +7266,7 @@
           <p:cNvPr id="122" name="Picture 121">
             <a:extLst>
               <a:ext uri="{FF2B5EF4-FFF2-40B4-BE49-F238E27FC236}">
-                <a16:creationId xmlns:a16="http://schemas.microsoft.com/office/drawing/2014/main" xmlns="" id="{B221A555-3C2F-E94D-96E4-6FC85564B891}"/>
+                <a16:creationId xmlns="" xmlns:a16="http://schemas.microsoft.com/office/drawing/2014/main" id="{B221A555-3C2F-E94D-96E4-6FC85564B891}"/>
               </a:ext>
             </a:extLst>
           </p:cNvPr>
@@ -7302,7 +7302,7 @@
           <p:cNvPr id="129" name="Title 24">
             <a:extLst>
               <a:ext uri="{FF2B5EF4-FFF2-40B4-BE49-F238E27FC236}">
-                <a16:creationId xmlns:a16="http://schemas.microsoft.com/office/drawing/2014/main" xmlns="" id="{C9C5C095-FA83-CE44-8BA2-FB0F4CF430D7}"/>
+                <a16:creationId xmlns="" xmlns:a16="http://schemas.microsoft.com/office/drawing/2014/main" id="{C9C5C095-FA83-CE44-8BA2-FB0F4CF430D7}"/>
               </a:ext>
             </a:extLst>
           </p:cNvPr>
@@ -7362,7 +7362,7 @@
           <p:cNvPr id="134" name="Picture 133">
             <a:extLst>
               <a:ext uri="{FF2B5EF4-FFF2-40B4-BE49-F238E27FC236}">
-                <a16:creationId xmlns:a16="http://schemas.microsoft.com/office/drawing/2014/main" xmlns="" id="{0E8E09F9-EF0B-4C47-B695-BE4EBAFCE677}"/>
+                <a16:creationId xmlns="" xmlns:a16="http://schemas.microsoft.com/office/drawing/2014/main" id="{0E8E09F9-EF0B-4C47-B695-BE4EBAFCE677}"/>
               </a:ext>
             </a:extLst>
           </p:cNvPr>
@@ -7397,7 +7397,7 @@
           <p:cNvPr id="135" name="Straight Connector 134">
             <a:extLst>
               <a:ext uri="{FF2B5EF4-FFF2-40B4-BE49-F238E27FC236}">
-                <a16:creationId xmlns:a16="http://schemas.microsoft.com/office/drawing/2014/main" xmlns="" id="{FF6AB179-2926-4D40-A4DD-8BB1E9EAEA7D}"/>
+                <a16:creationId xmlns="" xmlns:a16="http://schemas.microsoft.com/office/drawing/2014/main" id="{FF6AB179-2926-4D40-A4DD-8BB1E9EAEA7D}"/>
               </a:ext>
             </a:extLst>
           </p:cNvPr>
@@ -7438,7 +7438,7 @@
           <p:cNvPr id="41" name="Content Placeholder 52">
             <a:extLst>
               <a:ext uri="{FF2B5EF4-FFF2-40B4-BE49-F238E27FC236}">
-                <a16:creationId xmlns:a16="http://schemas.microsoft.com/office/drawing/2014/main" xmlns="" id="{03870E7E-5F8D-F64D-B6CF-AC70B18948A2}"/>
+                <a16:creationId xmlns="" xmlns:a16="http://schemas.microsoft.com/office/drawing/2014/main" id="{03870E7E-5F8D-F64D-B6CF-AC70B18948A2}"/>
               </a:ext>
             </a:extLst>
           </p:cNvPr>
@@ -7688,7 +7688,7 @@
           <p:cNvPr id="42" name="Content Placeholder 52">
             <a:extLst>
               <a:ext uri="{FF2B5EF4-FFF2-40B4-BE49-F238E27FC236}">
-                <a16:creationId xmlns:a16="http://schemas.microsoft.com/office/drawing/2014/main" xmlns="" id="{95FE5B9D-9272-3841-9EE5-9D5A046A1FF7}"/>
+                <a16:creationId xmlns="" xmlns:a16="http://schemas.microsoft.com/office/drawing/2014/main" id="{95FE5B9D-9272-3841-9EE5-9D5A046A1FF7}"/>
               </a:ext>
             </a:extLst>
           </p:cNvPr>
@@ -7924,7 +7924,7 @@
           <p:cNvPr id="43" name="Content Placeholder 52">
             <a:extLst>
               <a:ext uri="{FF2B5EF4-FFF2-40B4-BE49-F238E27FC236}">
-                <a16:creationId xmlns:a16="http://schemas.microsoft.com/office/drawing/2014/main" xmlns="" id="{8C3392A2-7BEC-C643-A397-ACB0C15BDDE1}"/>
+                <a16:creationId xmlns="" xmlns:a16="http://schemas.microsoft.com/office/drawing/2014/main" id="{8C3392A2-7BEC-C643-A397-ACB0C15BDDE1}"/>
               </a:ext>
             </a:extLst>
           </p:cNvPr>
@@ -8159,7 +8159,7 @@
           <p:cNvPr id="44" name="Content Placeholder 52">
             <a:extLst>
               <a:ext uri="{FF2B5EF4-FFF2-40B4-BE49-F238E27FC236}">
-                <a16:creationId xmlns:a16="http://schemas.microsoft.com/office/drawing/2014/main" xmlns="" id="{5BF202D4-4239-7E4F-93CD-8E57B0E44847}"/>
+                <a16:creationId xmlns="" xmlns:a16="http://schemas.microsoft.com/office/drawing/2014/main" id="{5BF202D4-4239-7E4F-93CD-8E57B0E44847}"/>
               </a:ext>
             </a:extLst>
           </p:cNvPr>
@@ -8403,7 +8403,7 @@
           <p:cNvPr id="46" name="Content Placeholder 52">
             <a:extLst>
               <a:ext uri="{FF2B5EF4-FFF2-40B4-BE49-F238E27FC236}">
-                <a16:creationId xmlns:a16="http://schemas.microsoft.com/office/drawing/2014/main" xmlns="" id="{16FDB233-B738-8D4E-B43F-750A1A983DE9}"/>
+                <a16:creationId xmlns="" xmlns:a16="http://schemas.microsoft.com/office/drawing/2014/main" id="{16FDB233-B738-8D4E-B43F-750A1A983DE9}"/>
               </a:ext>
             </a:extLst>
           </p:cNvPr>
@@ -8639,7 +8639,7 @@
           <p:cNvPr id="47" name="Picture 46">
             <a:extLst>
               <a:ext uri="{FF2B5EF4-FFF2-40B4-BE49-F238E27FC236}">
-                <a16:creationId xmlns:a16="http://schemas.microsoft.com/office/drawing/2014/main" xmlns="" id="{E394D0E0-025D-644F-82A2-ED215AC1B381}"/>
+                <a16:creationId xmlns="" xmlns:a16="http://schemas.microsoft.com/office/drawing/2014/main" id="{E394D0E0-025D-644F-82A2-ED215AC1B381}"/>
               </a:ext>
             </a:extLst>
           </p:cNvPr>
@@ -8675,7 +8675,7 @@
           <p:cNvPr id="48" name="Picture 47">
             <a:extLst>
               <a:ext uri="{FF2B5EF4-FFF2-40B4-BE49-F238E27FC236}">
-                <a16:creationId xmlns:a16="http://schemas.microsoft.com/office/drawing/2014/main" xmlns="" id="{35E0AA7F-0EA4-224A-92F8-C9A9D5B1B802}"/>
+                <a16:creationId xmlns="" xmlns:a16="http://schemas.microsoft.com/office/drawing/2014/main" id="{35E0AA7F-0EA4-224A-92F8-C9A9D5B1B802}"/>
               </a:ext>
             </a:extLst>
           </p:cNvPr>
@@ -8711,7 +8711,7 @@
           <p:cNvPr id="49" name="Picture 48">
             <a:extLst>
               <a:ext uri="{FF2B5EF4-FFF2-40B4-BE49-F238E27FC236}">
-                <a16:creationId xmlns:a16="http://schemas.microsoft.com/office/drawing/2014/main" xmlns="" id="{A48092AC-915B-524D-9672-FE0826E130E7}"/>
+                <a16:creationId xmlns="" xmlns:a16="http://schemas.microsoft.com/office/drawing/2014/main" id="{A48092AC-915B-524D-9672-FE0826E130E7}"/>
               </a:ext>
             </a:extLst>
           </p:cNvPr>
@@ -8747,7 +8747,7 @@
           <p:cNvPr id="51" name="Picture 50">
             <a:extLst>
               <a:ext uri="{FF2B5EF4-FFF2-40B4-BE49-F238E27FC236}">
-                <a16:creationId xmlns:a16="http://schemas.microsoft.com/office/drawing/2014/main" xmlns="" id="{27E440A9-1FB1-A44A-8917-F3A839BAF906}"/>
+                <a16:creationId xmlns="" xmlns:a16="http://schemas.microsoft.com/office/drawing/2014/main" id="{27E440A9-1FB1-A44A-8917-F3A839BAF906}"/>
               </a:ext>
             </a:extLst>
           </p:cNvPr>
@@ -8783,7 +8783,7 @@
           <p:cNvPr id="52" name="Picture 51">
             <a:extLst>
               <a:ext uri="{FF2B5EF4-FFF2-40B4-BE49-F238E27FC236}">
-                <a16:creationId xmlns:a16="http://schemas.microsoft.com/office/drawing/2014/main" xmlns="" id="{FFFF220F-F683-2F48-A73D-6A41401B0D05}"/>
+                <a16:creationId xmlns="" xmlns:a16="http://schemas.microsoft.com/office/drawing/2014/main" id="{FFFF220F-F683-2F48-A73D-6A41401B0D05}"/>
               </a:ext>
             </a:extLst>
           </p:cNvPr>
@@ -8819,7 +8819,7 @@
           <p:cNvPr id="53" name="Picture 52">
             <a:extLst>
               <a:ext uri="{FF2B5EF4-FFF2-40B4-BE49-F238E27FC236}">
-                <a16:creationId xmlns:a16="http://schemas.microsoft.com/office/drawing/2014/main" xmlns="" id="{FC96BF3C-2C18-7E4E-AADA-8075C799317A}"/>
+                <a16:creationId xmlns="" xmlns:a16="http://schemas.microsoft.com/office/drawing/2014/main" id="{FC96BF3C-2C18-7E4E-AADA-8075C799317A}"/>
               </a:ext>
             </a:extLst>
           </p:cNvPr>
@@ -8855,7 +8855,7 @@
           <p:cNvPr id="54" name="Content Placeholder 52">
             <a:extLst>
               <a:ext uri="{FF2B5EF4-FFF2-40B4-BE49-F238E27FC236}">
-                <a16:creationId xmlns:a16="http://schemas.microsoft.com/office/drawing/2014/main" xmlns="" id="{8184E9DC-A05F-994B-8D0E-6F0964DE93A1}"/>
+                <a16:creationId xmlns="" xmlns:a16="http://schemas.microsoft.com/office/drawing/2014/main" id="{8184E9DC-A05F-994B-8D0E-6F0964DE93A1}"/>
               </a:ext>
             </a:extLst>
           </p:cNvPr>
@@ -9120,7 +9120,7 @@
           <p:cNvPr id="37" name="Content Placeholder 52">
             <a:extLst>
               <a:ext uri="{FF2B5EF4-FFF2-40B4-BE49-F238E27FC236}">
-                <a16:creationId xmlns:a16="http://schemas.microsoft.com/office/drawing/2014/main" xmlns="" id="{A1F29D74-7F07-D84E-B102-930FD141E5B9}"/>
+                <a16:creationId xmlns="" xmlns:a16="http://schemas.microsoft.com/office/drawing/2014/main" id="{A1F29D74-7F07-D84E-B102-930FD141E5B9}"/>
               </a:ext>
             </a:extLst>
           </p:cNvPr>
@@ -9356,7 +9356,7 @@
           <p:cNvPr id="38" name="Picture 37">
             <a:extLst>
               <a:ext uri="{FF2B5EF4-FFF2-40B4-BE49-F238E27FC236}">
-                <a16:creationId xmlns:a16="http://schemas.microsoft.com/office/drawing/2014/main" xmlns="" id="{B4EE7BA3-3882-054B-9C71-4C6C9D45BBC3}"/>
+                <a16:creationId xmlns="" xmlns:a16="http://schemas.microsoft.com/office/drawing/2014/main" id="{B4EE7BA3-3882-054B-9C71-4C6C9D45BBC3}"/>
               </a:ext>
             </a:extLst>
           </p:cNvPr>
@@ -9393,7 +9393,7 @@
             <a:hlinkClick r:id="rId3"/>
             <a:extLst>
               <a:ext uri="{FF2B5EF4-FFF2-40B4-BE49-F238E27FC236}">
-                <a16:creationId xmlns:a16="http://schemas.microsoft.com/office/drawing/2014/main" xmlns="" id="{8ECC0D63-20D7-0343-86D0-A87AE2BB8F87}"/>
+                <a16:creationId xmlns="" xmlns:a16="http://schemas.microsoft.com/office/drawing/2014/main" id="{8ECC0D63-20D7-0343-86D0-A87AE2BB8F87}"/>
               </a:ext>
             </a:extLst>
           </p:cNvPr>
@@ -9452,7 +9452,7 @@
             <a:hlinkClick r:id="rId2"/>
             <a:extLst>
               <a:ext uri="{FF2B5EF4-FFF2-40B4-BE49-F238E27FC236}">
-                <a16:creationId xmlns:a16="http://schemas.microsoft.com/office/drawing/2014/main" xmlns="" id="{B01DB6F7-4A56-E648-8CE4-FB8C132141F4}"/>
+                <a16:creationId xmlns="" xmlns:a16="http://schemas.microsoft.com/office/drawing/2014/main" id="{B01DB6F7-4A56-E648-8CE4-FB8C132141F4}"/>
               </a:ext>
             </a:extLst>
           </p:cNvPr>
@@ -9540,7 +9540,7 @@
           <p:cNvPr id="86" name="Rectangle 85">
             <a:extLst>
               <a:ext uri="{FF2B5EF4-FFF2-40B4-BE49-F238E27FC236}">
-                <a16:creationId xmlns:a16="http://schemas.microsoft.com/office/drawing/2014/main" xmlns="" id="{EDB109D6-5BF6-5E42-A1C1-45B238B41A7E}"/>
+                <a16:creationId xmlns="" xmlns:a16="http://schemas.microsoft.com/office/drawing/2014/main" id="{EDB109D6-5BF6-5E42-A1C1-45B238B41A7E}"/>
               </a:ext>
             </a:extLst>
           </p:cNvPr>
@@ -9602,7 +9602,7 @@
           <p:cNvPr id="131" name="Rectangle 1">
             <a:extLst>
               <a:ext uri="{FF2B5EF4-FFF2-40B4-BE49-F238E27FC236}">
-                <a16:creationId xmlns:a16="http://schemas.microsoft.com/office/drawing/2014/main" xmlns="" id="{D03E41E1-380E-DF4A-8F15-AB2EAE2322B9}"/>
+                <a16:creationId xmlns="" xmlns:a16="http://schemas.microsoft.com/office/drawing/2014/main" id="{D03E41E1-380E-DF4A-8F15-AB2EAE2322B9}"/>
               </a:ext>
             </a:extLst>
           </p:cNvPr>
@@ -9851,7 +9851,7 @@
           <p:cNvPr id="89" name="Rectangle 88">
             <a:extLst>
               <a:ext uri="{FF2B5EF4-FFF2-40B4-BE49-F238E27FC236}">
-                <a16:creationId xmlns:a16="http://schemas.microsoft.com/office/drawing/2014/main" xmlns="" id="{EFCB9C4D-5246-B743-853A-FA66CEE7DE4D}"/>
+                <a16:creationId xmlns="" xmlns:a16="http://schemas.microsoft.com/office/drawing/2014/main" id="{EFCB9C4D-5246-B743-853A-FA66CEE7DE4D}"/>
               </a:ext>
             </a:extLst>
           </p:cNvPr>
@@ -9903,7 +9903,7 @@
           <p:cNvPr id="93" name="Triangle 92">
             <a:extLst>
               <a:ext uri="{FF2B5EF4-FFF2-40B4-BE49-F238E27FC236}">
-                <a16:creationId xmlns:a16="http://schemas.microsoft.com/office/drawing/2014/main" xmlns="" id="{0D72A147-C32E-C540-8F80-59F865637BB1}"/>
+                <a16:creationId xmlns="" xmlns:a16="http://schemas.microsoft.com/office/drawing/2014/main" id="{0D72A147-C32E-C540-8F80-59F865637BB1}"/>
               </a:ext>
             </a:extLst>
           </p:cNvPr>
@@ -9958,7 +9958,7 @@
             <a:hlinkClick r:id="rId2"/>
             <a:extLst>
               <a:ext uri="{FF2B5EF4-FFF2-40B4-BE49-F238E27FC236}">
-                <a16:creationId xmlns:a16="http://schemas.microsoft.com/office/drawing/2014/main" xmlns="" id="{0A03D419-B4E4-A341-8258-BAF4FC5373B4}"/>
+                <a16:creationId xmlns="" xmlns:a16="http://schemas.microsoft.com/office/drawing/2014/main" id="{0A03D419-B4E4-A341-8258-BAF4FC5373B4}"/>
               </a:ext>
             </a:extLst>
           </p:cNvPr>
@@ -10021,7 +10021,7 @@
           <p:cNvPr id="95" name="Group 94">
             <a:extLst>
               <a:ext uri="{FF2B5EF4-FFF2-40B4-BE49-F238E27FC236}">
-                <a16:creationId xmlns:a16="http://schemas.microsoft.com/office/drawing/2014/main" xmlns="" id="{89E75E57-B1BB-1043-92B1-2837059A39CF}"/>
+                <a16:creationId xmlns="" xmlns:a16="http://schemas.microsoft.com/office/drawing/2014/main" id="{89E75E57-B1BB-1043-92B1-2837059A39CF}"/>
               </a:ext>
             </a:extLst>
           </p:cNvPr>
@@ -10041,7 +10041,7 @@
             <p:cNvPr id="96" name="Rounded Rectangle 95">
               <a:extLst>
                 <a:ext uri="{FF2B5EF4-FFF2-40B4-BE49-F238E27FC236}">
-                  <a16:creationId xmlns:a16="http://schemas.microsoft.com/office/drawing/2014/main" xmlns="" id="{C571F53C-F9A8-D34F-89E9-D59834F26F2A}"/>
+                  <a16:creationId xmlns="" xmlns:a16="http://schemas.microsoft.com/office/drawing/2014/main" id="{C571F53C-F9A8-D34F-89E9-D59834F26F2A}"/>
                 </a:ext>
               </a:extLst>
             </p:cNvPr>
@@ -10094,7 +10094,7 @@
               <a:hlinkClick r:id="rId3"/>
               <a:extLst>
                 <a:ext uri="{FF2B5EF4-FFF2-40B4-BE49-F238E27FC236}">
-                  <a16:creationId xmlns:a16="http://schemas.microsoft.com/office/drawing/2014/main" xmlns="" id="{BCCC18FD-7037-504F-B7DD-009E93D5CFC5}"/>
+                  <a16:creationId xmlns="" xmlns:a16="http://schemas.microsoft.com/office/drawing/2014/main" id="{BCCC18FD-7037-504F-B7DD-009E93D5CFC5}"/>
                 </a:ext>
               </a:extLst>
             </p:cNvPr>
@@ -10146,7 +10146,7 @@
             <a:hlinkClick r:id="rId3"/>
             <a:extLst>
               <a:ext uri="{FF2B5EF4-FFF2-40B4-BE49-F238E27FC236}">
-                <a16:creationId xmlns:a16="http://schemas.microsoft.com/office/drawing/2014/main" xmlns="" id="{31AA4A0D-C979-ED41-9053-191689A53F33}"/>
+                <a16:creationId xmlns="" xmlns:a16="http://schemas.microsoft.com/office/drawing/2014/main" id="{31AA4A0D-C979-ED41-9053-191689A53F33}"/>
               </a:ext>
             </a:extLst>
           </p:cNvPr>
@@ -10209,7 +10209,7 @@
           <p:cNvPr id="105" name="Group 104">
             <a:extLst>
               <a:ext uri="{FF2B5EF4-FFF2-40B4-BE49-F238E27FC236}">
-                <a16:creationId xmlns:a16="http://schemas.microsoft.com/office/drawing/2014/main" xmlns="" id="{7BF00640-0851-4A4E-8179-1BD384D8F525}"/>
+                <a16:creationId xmlns="" xmlns:a16="http://schemas.microsoft.com/office/drawing/2014/main" id="{7BF00640-0851-4A4E-8179-1BD384D8F525}"/>
               </a:ext>
             </a:extLst>
           </p:cNvPr>
@@ -10229,7 +10229,7 @@
             <p:cNvPr id="106" name="Rounded Rectangle 105">
               <a:extLst>
                 <a:ext uri="{FF2B5EF4-FFF2-40B4-BE49-F238E27FC236}">
-                  <a16:creationId xmlns:a16="http://schemas.microsoft.com/office/drawing/2014/main" xmlns="" id="{5AA2B150-5004-364C-910A-A392CD7A853A}"/>
+                  <a16:creationId xmlns="" xmlns:a16="http://schemas.microsoft.com/office/drawing/2014/main" id="{5AA2B150-5004-364C-910A-A392CD7A853A}"/>
                 </a:ext>
               </a:extLst>
             </p:cNvPr>
@@ -10282,7 +10282,7 @@
               <a:hlinkClick r:id="rId3"/>
               <a:extLst>
                 <a:ext uri="{FF2B5EF4-FFF2-40B4-BE49-F238E27FC236}">
-                  <a16:creationId xmlns:a16="http://schemas.microsoft.com/office/drawing/2014/main" xmlns="" id="{91AD4506-A6D6-124C-97E7-7D3DF0EBA900}"/>
+                  <a16:creationId xmlns="" xmlns:a16="http://schemas.microsoft.com/office/drawing/2014/main" id="{91AD4506-A6D6-124C-97E7-7D3DF0EBA900}"/>
                 </a:ext>
               </a:extLst>
             </p:cNvPr>
@@ -10341,7 +10341,7 @@
           <p:cNvPr id="122" name="Picture 121">
             <a:extLst>
               <a:ext uri="{FF2B5EF4-FFF2-40B4-BE49-F238E27FC236}">
-                <a16:creationId xmlns:a16="http://schemas.microsoft.com/office/drawing/2014/main" xmlns="" id="{B221A555-3C2F-E94D-96E4-6FC85564B891}"/>
+                <a16:creationId xmlns="" xmlns:a16="http://schemas.microsoft.com/office/drawing/2014/main" id="{B221A555-3C2F-E94D-96E4-6FC85564B891}"/>
               </a:ext>
             </a:extLst>
           </p:cNvPr>
@@ -10377,7 +10377,7 @@
           <p:cNvPr id="129" name="Title 24">
             <a:extLst>
               <a:ext uri="{FF2B5EF4-FFF2-40B4-BE49-F238E27FC236}">
-                <a16:creationId xmlns:a16="http://schemas.microsoft.com/office/drawing/2014/main" xmlns="" id="{C9C5C095-FA83-CE44-8BA2-FB0F4CF430D7}"/>
+                <a16:creationId xmlns="" xmlns:a16="http://schemas.microsoft.com/office/drawing/2014/main" id="{C9C5C095-FA83-CE44-8BA2-FB0F4CF430D7}"/>
               </a:ext>
             </a:extLst>
           </p:cNvPr>
@@ -10437,7 +10437,7 @@
           <p:cNvPr id="135" name="Straight Connector 134">
             <a:extLst>
               <a:ext uri="{FF2B5EF4-FFF2-40B4-BE49-F238E27FC236}">
-                <a16:creationId xmlns:a16="http://schemas.microsoft.com/office/drawing/2014/main" xmlns="" id="{FF6AB179-2926-4D40-A4DD-8BB1E9EAEA7D}"/>
+                <a16:creationId xmlns="" xmlns:a16="http://schemas.microsoft.com/office/drawing/2014/main" id="{FF6AB179-2926-4D40-A4DD-8BB1E9EAEA7D}"/>
               </a:ext>
             </a:extLst>
           </p:cNvPr>
@@ -10478,7 +10478,7 @@
           <p:cNvPr id="41" name="Content Placeholder 52">
             <a:extLst>
               <a:ext uri="{FF2B5EF4-FFF2-40B4-BE49-F238E27FC236}">
-                <a16:creationId xmlns:a16="http://schemas.microsoft.com/office/drawing/2014/main" xmlns="" id="{03870E7E-5F8D-F64D-B6CF-AC70B18948A2}"/>
+                <a16:creationId xmlns="" xmlns:a16="http://schemas.microsoft.com/office/drawing/2014/main" id="{03870E7E-5F8D-F64D-B6CF-AC70B18948A2}"/>
               </a:ext>
             </a:extLst>
           </p:cNvPr>
@@ -10728,7 +10728,7 @@
           <p:cNvPr id="42" name="Content Placeholder 52">
             <a:extLst>
               <a:ext uri="{FF2B5EF4-FFF2-40B4-BE49-F238E27FC236}">
-                <a16:creationId xmlns:a16="http://schemas.microsoft.com/office/drawing/2014/main" xmlns="" id="{95FE5B9D-9272-3841-9EE5-9D5A046A1FF7}"/>
+                <a16:creationId xmlns="" xmlns:a16="http://schemas.microsoft.com/office/drawing/2014/main" id="{95FE5B9D-9272-3841-9EE5-9D5A046A1FF7}"/>
               </a:ext>
             </a:extLst>
           </p:cNvPr>
@@ -10964,7 +10964,7 @@
           <p:cNvPr id="43" name="Content Placeholder 52">
             <a:extLst>
               <a:ext uri="{FF2B5EF4-FFF2-40B4-BE49-F238E27FC236}">
-                <a16:creationId xmlns:a16="http://schemas.microsoft.com/office/drawing/2014/main" xmlns="" id="{8C3392A2-7BEC-C643-A397-ACB0C15BDDE1}"/>
+                <a16:creationId xmlns="" xmlns:a16="http://schemas.microsoft.com/office/drawing/2014/main" id="{8C3392A2-7BEC-C643-A397-ACB0C15BDDE1}"/>
               </a:ext>
             </a:extLst>
           </p:cNvPr>
@@ -11199,7 +11199,7 @@
           <p:cNvPr id="44" name="Content Placeholder 52">
             <a:extLst>
               <a:ext uri="{FF2B5EF4-FFF2-40B4-BE49-F238E27FC236}">
-                <a16:creationId xmlns:a16="http://schemas.microsoft.com/office/drawing/2014/main" xmlns="" id="{5BF202D4-4239-7E4F-93CD-8E57B0E44847}"/>
+                <a16:creationId xmlns="" xmlns:a16="http://schemas.microsoft.com/office/drawing/2014/main" id="{5BF202D4-4239-7E4F-93CD-8E57B0E44847}"/>
               </a:ext>
             </a:extLst>
           </p:cNvPr>
@@ -11443,7 +11443,7 @@
           <p:cNvPr id="46" name="Content Placeholder 52">
             <a:extLst>
               <a:ext uri="{FF2B5EF4-FFF2-40B4-BE49-F238E27FC236}">
-                <a16:creationId xmlns:a16="http://schemas.microsoft.com/office/drawing/2014/main" xmlns="" id="{16FDB233-B738-8D4E-B43F-750A1A983DE9}"/>
+                <a16:creationId xmlns="" xmlns:a16="http://schemas.microsoft.com/office/drawing/2014/main" id="{16FDB233-B738-8D4E-B43F-750A1A983DE9}"/>
               </a:ext>
             </a:extLst>
           </p:cNvPr>
@@ -11679,7 +11679,7 @@
           <p:cNvPr id="47" name="Picture 46">
             <a:extLst>
               <a:ext uri="{FF2B5EF4-FFF2-40B4-BE49-F238E27FC236}">
-                <a16:creationId xmlns:a16="http://schemas.microsoft.com/office/drawing/2014/main" xmlns="" id="{E394D0E0-025D-644F-82A2-ED215AC1B381}"/>
+                <a16:creationId xmlns="" xmlns:a16="http://schemas.microsoft.com/office/drawing/2014/main" id="{E394D0E0-025D-644F-82A2-ED215AC1B381}"/>
               </a:ext>
             </a:extLst>
           </p:cNvPr>
@@ -11715,7 +11715,7 @@
           <p:cNvPr id="48" name="Picture 47">
             <a:extLst>
               <a:ext uri="{FF2B5EF4-FFF2-40B4-BE49-F238E27FC236}">
-                <a16:creationId xmlns:a16="http://schemas.microsoft.com/office/drawing/2014/main" xmlns="" id="{35E0AA7F-0EA4-224A-92F8-C9A9D5B1B802}"/>
+                <a16:creationId xmlns="" xmlns:a16="http://schemas.microsoft.com/office/drawing/2014/main" id="{35E0AA7F-0EA4-224A-92F8-C9A9D5B1B802}"/>
               </a:ext>
             </a:extLst>
           </p:cNvPr>
@@ -11751,7 +11751,7 @@
           <p:cNvPr id="49" name="Picture 48">
             <a:extLst>
               <a:ext uri="{FF2B5EF4-FFF2-40B4-BE49-F238E27FC236}">
-                <a16:creationId xmlns:a16="http://schemas.microsoft.com/office/drawing/2014/main" xmlns="" id="{A48092AC-915B-524D-9672-FE0826E130E7}"/>
+                <a16:creationId xmlns="" xmlns:a16="http://schemas.microsoft.com/office/drawing/2014/main" id="{A48092AC-915B-524D-9672-FE0826E130E7}"/>
               </a:ext>
             </a:extLst>
           </p:cNvPr>
@@ -11787,7 +11787,7 @@
           <p:cNvPr id="51" name="Picture 50">
             <a:extLst>
               <a:ext uri="{FF2B5EF4-FFF2-40B4-BE49-F238E27FC236}">
-                <a16:creationId xmlns:a16="http://schemas.microsoft.com/office/drawing/2014/main" xmlns="" id="{27E440A9-1FB1-A44A-8917-F3A839BAF906}"/>
+                <a16:creationId xmlns="" xmlns:a16="http://schemas.microsoft.com/office/drawing/2014/main" id="{27E440A9-1FB1-A44A-8917-F3A839BAF906}"/>
               </a:ext>
             </a:extLst>
           </p:cNvPr>
@@ -11823,7 +11823,7 @@
           <p:cNvPr id="52" name="Picture 51">
             <a:extLst>
               <a:ext uri="{FF2B5EF4-FFF2-40B4-BE49-F238E27FC236}">
-                <a16:creationId xmlns:a16="http://schemas.microsoft.com/office/drawing/2014/main" xmlns="" id="{FFFF220F-F683-2F48-A73D-6A41401B0D05}"/>
+                <a16:creationId xmlns="" xmlns:a16="http://schemas.microsoft.com/office/drawing/2014/main" id="{FFFF220F-F683-2F48-A73D-6A41401B0D05}"/>
               </a:ext>
             </a:extLst>
           </p:cNvPr>
@@ -11859,7 +11859,7 @@
           <p:cNvPr id="53" name="Picture 52">
             <a:extLst>
               <a:ext uri="{FF2B5EF4-FFF2-40B4-BE49-F238E27FC236}">
-                <a16:creationId xmlns:a16="http://schemas.microsoft.com/office/drawing/2014/main" xmlns="" id="{FC96BF3C-2C18-7E4E-AADA-8075C799317A}"/>
+                <a16:creationId xmlns="" xmlns:a16="http://schemas.microsoft.com/office/drawing/2014/main" id="{FC96BF3C-2C18-7E4E-AADA-8075C799317A}"/>
               </a:ext>
             </a:extLst>
           </p:cNvPr>
@@ -11895,7 +11895,7 @@
           <p:cNvPr id="54" name="Content Placeholder 52">
             <a:extLst>
               <a:ext uri="{FF2B5EF4-FFF2-40B4-BE49-F238E27FC236}">
-                <a16:creationId xmlns:a16="http://schemas.microsoft.com/office/drawing/2014/main" xmlns="" id="{8184E9DC-A05F-994B-8D0E-6F0964DE93A1}"/>
+                <a16:creationId xmlns="" xmlns:a16="http://schemas.microsoft.com/office/drawing/2014/main" id="{8184E9DC-A05F-994B-8D0E-6F0964DE93A1}"/>
               </a:ext>
             </a:extLst>
           </p:cNvPr>
@@ -12160,7 +12160,7 @@
           <p:cNvPr id="37" name="Content Placeholder 52">
             <a:extLst>
               <a:ext uri="{FF2B5EF4-FFF2-40B4-BE49-F238E27FC236}">
-                <a16:creationId xmlns:a16="http://schemas.microsoft.com/office/drawing/2014/main" xmlns="" id="{A1F29D74-7F07-D84E-B102-930FD141E5B9}"/>
+                <a16:creationId xmlns="" xmlns:a16="http://schemas.microsoft.com/office/drawing/2014/main" id="{A1F29D74-7F07-D84E-B102-930FD141E5B9}"/>
               </a:ext>
             </a:extLst>
           </p:cNvPr>
@@ -12396,7 +12396,7 @@
           <p:cNvPr id="38" name="Picture 37">
             <a:extLst>
               <a:ext uri="{FF2B5EF4-FFF2-40B4-BE49-F238E27FC236}">
-                <a16:creationId xmlns:a16="http://schemas.microsoft.com/office/drawing/2014/main" xmlns="" id="{B4EE7BA3-3882-054B-9C71-4C6C9D45BBC3}"/>
+                <a16:creationId xmlns="" xmlns:a16="http://schemas.microsoft.com/office/drawing/2014/main" id="{B4EE7BA3-3882-054B-9C71-4C6C9D45BBC3}"/>
               </a:ext>
             </a:extLst>
           </p:cNvPr>
@@ -12432,7 +12432,7 @@
           <p:cNvPr id="63" name="Hexagon 5">
             <a:extLst>
               <a:ext uri="{FF2B5EF4-FFF2-40B4-BE49-F238E27FC236}">
-                <a16:creationId xmlns:a16="http://schemas.microsoft.com/office/drawing/2014/main" xmlns="" id="{364503C3-2EEB-304D-8F5A-656CAD26AC38}"/>
+                <a16:creationId xmlns="" xmlns:a16="http://schemas.microsoft.com/office/drawing/2014/main" id="{364503C3-2EEB-304D-8F5A-656CAD26AC38}"/>
               </a:ext>
             </a:extLst>
           </p:cNvPr>
@@ -12702,7 +12702,7 @@
           <p:cNvPr id="64" name="Picture 63">
             <a:extLst>
               <a:ext uri="{FF2B5EF4-FFF2-40B4-BE49-F238E27FC236}">
-                <a16:creationId xmlns:a16="http://schemas.microsoft.com/office/drawing/2014/main" xmlns="" id="{6241EA04-8B95-A04D-BFAA-ECA5355B2F83}"/>
+                <a16:creationId xmlns="" xmlns:a16="http://schemas.microsoft.com/office/drawing/2014/main" id="{6241EA04-8B95-A04D-BFAA-ECA5355B2F83}"/>
               </a:ext>
             </a:extLst>
           </p:cNvPr>
@@ -12739,7 +12739,7 @@
             <a:hlinkClick r:id="rId12"/>
             <a:extLst>
               <a:ext uri="{FF2B5EF4-FFF2-40B4-BE49-F238E27FC236}">
-                <a16:creationId xmlns:a16="http://schemas.microsoft.com/office/drawing/2014/main" xmlns="" id="{242972D4-E45D-4C48-98B1-E9B8928925A8}"/>
+                <a16:creationId xmlns="" xmlns:a16="http://schemas.microsoft.com/office/drawing/2014/main" id="{242972D4-E45D-4C48-98B1-E9B8928925A8}"/>
               </a:ext>
             </a:extLst>
           </p:cNvPr>
@@ -12802,7 +12802,7 @@
           <p:cNvPr id="68" name="Content Placeholder 52">
             <a:extLst>
               <a:ext uri="{FF2B5EF4-FFF2-40B4-BE49-F238E27FC236}">
-                <a16:creationId xmlns:a16="http://schemas.microsoft.com/office/drawing/2014/main" xmlns="" id="{B59D4673-E8B1-2C49-81BA-06195A220AB1}"/>
+                <a16:creationId xmlns="" xmlns:a16="http://schemas.microsoft.com/office/drawing/2014/main" id="{B59D4673-E8B1-2C49-81BA-06195A220AB1}"/>
               </a:ext>
             </a:extLst>
           </p:cNvPr>
@@ -13008,7 +13008,7 @@
             <a:hlinkClick r:id="rId12"/>
             <a:extLst>
               <a:ext uri="{FF2B5EF4-FFF2-40B4-BE49-F238E27FC236}">
-                <a16:creationId xmlns:a16="http://schemas.microsoft.com/office/drawing/2014/main" xmlns="" id="{E8323CE4-5234-8142-9DE4-A809DB291451}"/>
+                <a16:creationId xmlns="" xmlns:a16="http://schemas.microsoft.com/office/drawing/2014/main" id="{E8323CE4-5234-8142-9DE4-A809DB291451}"/>
               </a:ext>
             </a:extLst>
           </p:cNvPr>
@@ -13067,7 +13067,7 @@
             <a:hlinkClick r:id="rId3"/>
             <a:extLst>
               <a:ext uri="{FF2B5EF4-FFF2-40B4-BE49-F238E27FC236}">
-                <a16:creationId xmlns:a16="http://schemas.microsoft.com/office/drawing/2014/main" xmlns="" id="{6C78789D-668C-3346-9A82-AE9B686AF055}"/>
+                <a16:creationId xmlns="" xmlns:a16="http://schemas.microsoft.com/office/drawing/2014/main" id="{6C78789D-668C-3346-9A82-AE9B686AF055}"/>
               </a:ext>
             </a:extLst>
           </p:cNvPr>
@@ -13126,7 +13126,7 @@
             <a:hlinkClick r:id="rId2"/>
             <a:extLst>
               <a:ext uri="{FF2B5EF4-FFF2-40B4-BE49-F238E27FC236}">
-                <a16:creationId xmlns:a16="http://schemas.microsoft.com/office/drawing/2014/main" xmlns="" id="{B054C5B9-06BF-FE44-99FF-F2FA5C20AC60}"/>
+                <a16:creationId xmlns="" xmlns:a16="http://schemas.microsoft.com/office/drawing/2014/main" id="{B054C5B9-06BF-FE44-99FF-F2FA5C20AC60}"/>
               </a:ext>
             </a:extLst>
           </p:cNvPr>
@@ -15289,7 +15289,7 @@
           <p:cNvPr id="14" name="Slide Number Placeholder 5">
             <a:extLst>
               <a:ext uri="{FF2B5EF4-FFF2-40B4-BE49-F238E27FC236}">
-                <a16:creationId xmlns:a16="http://schemas.microsoft.com/office/drawing/2014/main" xmlns="" id="{D6A5EA0A-9DA9-564F-8F7D-CF263DB84C39}"/>
+                <a16:creationId xmlns="" xmlns:a16="http://schemas.microsoft.com/office/drawing/2014/main" id="{D6A5EA0A-9DA9-564F-8F7D-CF263DB84C39}"/>
               </a:ext>
             </a:extLst>
           </p:cNvPr>
@@ -15427,7 +15427,7 @@
           <p:cNvPr id="21" name="Straight Connector 20">
             <a:extLst>
               <a:ext uri="{FF2B5EF4-FFF2-40B4-BE49-F238E27FC236}">
-                <a16:creationId xmlns:a16="http://schemas.microsoft.com/office/drawing/2014/main" xmlns="" id="{F4443C96-B82D-F449-A71B-02134B6BB207}"/>
+                <a16:creationId xmlns="" xmlns:a16="http://schemas.microsoft.com/office/drawing/2014/main" id="{F4443C96-B82D-F449-A71B-02134B6BB207}"/>
               </a:ext>
             </a:extLst>
           </p:cNvPr>
@@ -15513,7 +15513,7 @@
           <p:cNvPr id="6" name="Picture 5">
             <a:extLst>
               <a:ext uri="{FF2B5EF4-FFF2-40B4-BE49-F238E27FC236}">
-                <a16:creationId xmlns:a16="http://schemas.microsoft.com/office/drawing/2014/main" xmlns="" id="{FFB611C2-DDCE-7F48-9E56-C0AF82F39DC1}"/>
+                <a16:creationId xmlns="" xmlns:a16="http://schemas.microsoft.com/office/drawing/2014/main" id="{FFB611C2-DDCE-7F48-9E56-C0AF82F39DC1}"/>
               </a:ext>
             </a:extLst>
           </p:cNvPr>
@@ -17432,8 +17432,8 @@
         </p:nvSpPr>
         <p:spPr>
           <a:xfrm>
-            <a:off x="2349033" y="4907566"/>
-            <a:ext cx="4918334" cy="800219"/>
+            <a:off x="2971616" y="4797942"/>
+            <a:ext cx="4629794" cy="307777"/>
           </a:xfrm>
           <a:prstGeom prst="rect">
             <a:avLst/>
@@ -17445,10 +17445,6 @@
           </a:bodyPr>
           <a:lstStyle/>
           <a:p>
-            <a:pPr marL="285750" indent="-285750">
-              <a:buFont typeface="Arial" panose="020B0604020202020204" pitchFamily="34" charset="0"/>
-              <a:buChar char="•"/>
-            </a:pPr>
             <a:r>
               <a:rPr lang="en-US" sz="1400" dirty="0">
                 <a:solidFill>
@@ -17480,16 +17476,10 @@
                 <a:ea typeface="Source Sans Pro" charset="0"/>
                 <a:cs typeface="Source Sans Pro" charset="0"/>
               </a:rPr>
-              <a:t> built on Kernel #1234 can be installed on Kernel  #4321</a:t>
-            </a:r>
-          </a:p>
-          <a:p>
-            <a:pPr marL="285750" indent="-285750">
-              <a:buFont typeface="Arial" panose="020B0604020202020204" pitchFamily="34" charset="0"/>
-              <a:buChar char="•"/>
-            </a:pPr>
-            <a:r>
-              <a:rPr lang="en-US" sz="1400" dirty="0">
+              <a:t> built on Kernel #1234 can be installed on Kernel  #</a:t>
+            </a:r>
+            <a:r>
+              <a:rPr lang="en-US" sz="1400" dirty="0" smtClean="0">
                 <a:solidFill>
                   <a:schemeClr val="tx2"/>
                 </a:solidFill>
@@ -17497,32 +17487,8 @@
                 <a:ea typeface="Source Sans Pro" charset="0"/>
                 <a:cs typeface="Source Sans Pro" charset="0"/>
               </a:rPr>
-              <a:t>A .</a:t>
-            </a:r>
-            <a:r>
-              <a:rPr lang="en-US" sz="1400" dirty="0" err="1">
-                <a:solidFill>
-                  <a:schemeClr val="tx2"/>
-                </a:solidFill>
-                <a:latin typeface="Source Sans Pro" charset="0"/>
-                <a:ea typeface="Source Sans Pro" charset="0"/>
-                <a:cs typeface="Source Sans Pro" charset="0"/>
-              </a:rPr>
-              <a:t>fo</a:t>
-            </a:r>
-            <a:r>
-              <a:rPr lang="en-US" sz="1400" dirty="0">
-                <a:solidFill>
-                  <a:schemeClr val="tx2"/>
-                </a:solidFill>
-                <a:latin typeface="Source Sans Pro" charset="0"/>
-                <a:ea typeface="Source Sans Pro" charset="0"/>
-                <a:cs typeface="Source Sans Pro" charset="0"/>
-              </a:rPr>
-              <a:t> built on Kernel #4321 can be installed on Kernel  #1234</a:t>
-            </a:r>
-          </a:p>
-          <a:p>
+              <a:t>4321</a:t>
+            </a:r>
             <a:endParaRPr lang="en-US" dirty="0">
               <a:solidFill>
                 <a:schemeClr val="tx2"/>
@@ -17933,7 +17899,7 @@
           <p:cNvPr id="4" name="Date Placeholder 3">
             <a:extLst>
               <a:ext uri="{FF2B5EF4-FFF2-40B4-BE49-F238E27FC236}">
-                <a16:creationId xmlns:a16="http://schemas.microsoft.com/office/drawing/2014/main" xmlns="" id="{5B11DD0F-109E-46C2-A486-47D107A02E36}"/>
+                <a16:creationId xmlns="" xmlns:a16="http://schemas.microsoft.com/office/drawing/2014/main" id="{5B11DD0F-109E-46C2-A486-47D107A02E36}"/>
               </a:ext>
             </a:extLst>
           </p:cNvPr>
@@ -17970,7 +17936,7 @@
           <p:cNvPr id="5" name="Footer Placeholder 4">
             <a:extLst>
               <a:ext uri="{FF2B5EF4-FFF2-40B4-BE49-F238E27FC236}">
-                <a16:creationId xmlns:a16="http://schemas.microsoft.com/office/drawing/2014/main" xmlns="" id="{2F8E408F-E4B6-4443-9119-5286D2FBA56E}"/>
+                <a16:creationId xmlns="" xmlns:a16="http://schemas.microsoft.com/office/drawing/2014/main" id="{2F8E408F-E4B6-4443-9119-5286D2FBA56E}"/>
               </a:ext>
             </a:extLst>
           </p:cNvPr>
@@ -17999,7 +17965,7 @@
           <p:cNvPr id="6" name="Title 5">
             <a:extLst>
               <a:ext uri="{FF2B5EF4-FFF2-40B4-BE49-F238E27FC236}">
-                <a16:creationId xmlns:a16="http://schemas.microsoft.com/office/drawing/2014/main" xmlns="" id="{07F49BEE-8DB9-44C9-B1F4-9FE76BECF3E1}"/>
+                <a16:creationId xmlns="" xmlns:a16="http://schemas.microsoft.com/office/drawing/2014/main" id="{07F49BEE-8DB9-44C9-B1F4-9FE76BECF3E1}"/>
               </a:ext>
             </a:extLst>
           </p:cNvPr>
@@ -18796,14 +18762,6 @@
               </a:rPr>
               <a:t>#5678</a:t>
             </a:r>
-            <a:endParaRPr lang="en-US" sz="1000" dirty="0">
-              <a:solidFill>
-                <a:schemeClr val="bg1"/>
-              </a:solidFill>
-              <a:latin typeface="Source Sans Pro Light" charset="0"/>
-              <a:ea typeface="Source Sans Pro Light" charset="0"/>
-              <a:cs typeface="Source Sans Pro Light" charset="0"/>
-            </a:endParaRPr>
           </a:p>
         </p:txBody>
       </p:sp>
@@ -18877,14 +18835,6 @@
               </a:rPr>
               <a:t>#ABCD</a:t>
             </a:r>
-            <a:endParaRPr lang="en-US" sz="1000" dirty="0">
-              <a:solidFill>
-                <a:schemeClr val="bg1"/>
-              </a:solidFill>
-              <a:latin typeface="Source Sans Pro Light" charset="0"/>
-              <a:ea typeface="Source Sans Pro Light" charset="0"/>
-              <a:cs typeface="Source Sans Pro Light" charset="0"/>
-            </a:endParaRPr>
           </a:p>
           <a:p>
             <a:pPr algn="ctr"/>
@@ -19308,14 +19258,6 @@
               </a:rPr>
               <a:t>Application</a:t>
             </a:r>
-            <a:endParaRPr lang="en-US" sz="1000" dirty="0" smtClean="0">
-              <a:solidFill>
-                <a:srgbClr val="FFFFFF"/>
-              </a:solidFill>
-              <a:latin typeface="Source Sans Pro Light" charset="0"/>
-              <a:ea typeface="Source Sans Pro Light" charset="0"/>
-              <a:cs typeface="Source Sans Pro Light" charset="0"/>
-            </a:endParaRPr>
           </a:p>
         </p:txBody>
       </p:sp>

</xml_diff>

<commit_message>
fix chained link of kdat files
</commit_message>
<xml_diff>
--- a/KernelDeveloperGuide/pptx/controlled_portability.pptx
+++ b/KernelDeveloperGuide/pptx/controlled_portability.pptx
@@ -219,7 +219,7 @@
               <a:rPr lang="fr-FR" smtClean="0">
                 <a:latin typeface="Calibri Regular" charset="0"/>
               </a:rPr>
-              <a:t>mercredi 4 mai 2022</a:t>
+              <a:t>mercredi 31 mai 2023</a:t>
             </a:fld>
             <a:endParaRPr lang="en-US" dirty="0">
               <a:latin typeface="Calibri Regular" charset="0"/>
@@ -397,7 +397,7 @@
           <a:p>
             <a:fld id="{885721CF-495B-2B41-A23A-4D3221F80235}" type="datetime2">
               <a:rPr lang="fr-FR" smtClean="0"/>
-              <a:t>mercredi 4 mai 2022</a:t>
+              <a:t>mercredi 31 mai 2023</a:t>
             </a:fld>
             <a:endParaRPr lang="en-US" dirty="0"/>
           </a:p>
@@ -1273,7 +1273,7 @@
           <p:cNvPr id="7" name="Text Placeholder 2">
             <a:extLst>
               <a:ext uri="{FF2B5EF4-FFF2-40B4-BE49-F238E27FC236}">
-                <a16:creationId xmlns:a16="http://schemas.microsoft.com/office/drawing/2014/main" xmlns="" id="{EE9EA528-AAC2-D34E-8538-0A0AAD80AD96}"/>
+                <a16:creationId xmlns="" xmlns:a16="http://schemas.microsoft.com/office/drawing/2014/main" id="{EE9EA528-AAC2-D34E-8538-0A0AAD80AD96}"/>
               </a:ext>
             </a:extLst>
           </p:cNvPr>
@@ -1359,7 +1359,7 @@
           <p:cNvPr id="10" name="Content Placeholder 3">
             <a:extLst>
               <a:ext uri="{FF2B5EF4-FFF2-40B4-BE49-F238E27FC236}">
-                <a16:creationId xmlns:a16="http://schemas.microsoft.com/office/drawing/2014/main" xmlns="" id="{DAF8326C-6710-4047-962C-1C0A0F78FFB5}"/>
+                <a16:creationId xmlns="" xmlns:a16="http://schemas.microsoft.com/office/drawing/2014/main" id="{DAF8326C-6710-4047-962C-1C0A0F78FFB5}"/>
               </a:ext>
             </a:extLst>
           </p:cNvPr>
@@ -2052,7 +2052,7 @@
           <p:cNvPr id="7" name="Text Placeholder 2">
             <a:extLst>
               <a:ext uri="{FF2B5EF4-FFF2-40B4-BE49-F238E27FC236}">
-                <a16:creationId xmlns:a16="http://schemas.microsoft.com/office/drawing/2014/main" xmlns="" id="{BADF2A12-0EA6-EC4F-864C-2E94AC36ADCE}"/>
+                <a16:creationId xmlns="" xmlns:a16="http://schemas.microsoft.com/office/drawing/2014/main" id="{BADF2A12-0EA6-EC4F-864C-2E94AC36ADCE}"/>
               </a:ext>
             </a:extLst>
           </p:cNvPr>
@@ -2877,7 +2877,7 @@
           <p:cNvPr id="7" name="Content Placeholder 3">
             <a:extLst>
               <a:ext uri="{FF2B5EF4-FFF2-40B4-BE49-F238E27FC236}">
-                <a16:creationId xmlns:a16="http://schemas.microsoft.com/office/drawing/2014/main" xmlns="" id="{2E4978A6-AF2C-644A-9245-7D0BA4E8B6CE}"/>
+                <a16:creationId xmlns="" xmlns:a16="http://schemas.microsoft.com/office/drawing/2014/main" id="{2E4978A6-AF2C-644A-9245-7D0BA4E8B6CE}"/>
               </a:ext>
             </a:extLst>
           </p:cNvPr>
@@ -3274,7 +3274,7 @@
           <p:cNvPr id="7" name="Text Placeholder 2">
             <a:extLst>
               <a:ext uri="{FF2B5EF4-FFF2-40B4-BE49-F238E27FC236}">
-                <a16:creationId xmlns:a16="http://schemas.microsoft.com/office/drawing/2014/main" xmlns="" id="{BADF2A12-0EA6-EC4F-864C-2E94AC36ADCE}"/>
+                <a16:creationId xmlns="" xmlns:a16="http://schemas.microsoft.com/office/drawing/2014/main" id="{BADF2A12-0EA6-EC4F-864C-2E94AC36ADCE}"/>
               </a:ext>
             </a:extLst>
           </p:cNvPr>
@@ -4226,7 +4226,7 @@
           <p:cNvPr id="13" name="Rectangle 12">
             <a:extLst>
               <a:ext uri="{FF2B5EF4-FFF2-40B4-BE49-F238E27FC236}">
-                <a16:creationId xmlns:a16="http://schemas.microsoft.com/office/drawing/2014/main" xmlns="" id="{200F2B4F-ED74-D84B-A5FF-644A79E13221}"/>
+                <a16:creationId xmlns="" xmlns:a16="http://schemas.microsoft.com/office/drawing/2014/main" id="{200F2B4F-ED74-D84B-A5FF-644A79E13221}"/>
               </a:ext>
             </a:extLst>
           </p:cNvPr>
@@ -4466,7 +4466,7 @@
           <p:cNvPr id="14" name="Footer Placeholder 5">
             <a:extLst>
               <a:ext uri="{FF2B5EF4-FFF2-40B4-BE49-F238E27FC236}">
-                <a16:creationId xmlns:a16="http://schemas.microsoft.com/office/drawing/2014/main" xmlns="" id="{9D0AEA00-A11E-E447-A27D-E3693067A9E6}"/>
+                <a16:creationId xmlns="" xmlns:a16="http://schemas.microsoft.com/office/drawing/2014/main" id="{9D0AEA00-A11E-E447-A27D-E3693067A9E6}"/>
               </a:ext>
             </a:extLst>
           </p:cNvPr>
@@ -4514,7 +4514,7 @@
           <p:cNvPr id="16" name="Picture 2" descr="C:\Users\cmorineau\Marketing-Private\Marcom\Graphics\Artwork_Corp\Logos\Logo-microej-grey-h50.png">
             <a:extLst>
               <a:ext uri="{FF2B5EF4-FFF2-40B4-BE49-F238E27FC236}">
-                <a16:creationId xmlns:a16="http://schemas.microsoft.com/office/drawing/2014/main" xmlns="" id="{75E7AEDB-C69E-AA4C-96BC-8D040A4C81DB}"/>
+                <a16:creationId xmlns="" xmlns:a16="http://schemas.microsoft.com/office/drawing/2014/main" id="{75E7AEDB-C69E-AA4C-96BC-8D040A4C81DB}"/>
               </a:ext>
             </a:extLst>
           </p:cNvPr>
@@ -4682,7 +4682,7 @@
           <p:cNvPr id="11" name="Picture 10">
             <a:extLst>
               <a:ext uri="{FF2B5EF4-FFF2-40B4-BE49-F238E27FC236}">
-                <a16:creationId xmlns:a16="http://schemas.microsoft.com/office/drawing/2014/main" xmlns="" id="{21EA2856-E9E7-8D44-8863-70888E0D7F19}"/>
+                <a16:creationId xmlns="" xmlns:a16="http://schemas.microsoft.com/office/drawing/2014/main" id="{21EA2856-E9E7-8D44-8863-70888E0D7F19}"/>
               </a:ext>
             </a:extLst>
           </p:cNvPr>
@@ -4718,7 +4718,7 @@
           <p:cNvPr id="15" name="Title Placeholder 1">
             <a:extLst>
               <a:ext uri="{FF2B5EF4-FFF2-40B4-BE49-F238E27FC236}">
-                <a16:creationId xmlns:a16="http://schemas.microsoft.com/office/drawing/2014/main" xmlns="" id="{ED4F756F-313C-9A45-AA9F-4637139720F4}"/>
+                <a16:creationId xmlns="" xmlns:a16="http://schemas.microsoft.com/office/drawing/2014/main" id="{ED4F756F-313C-9A45-AA9F-4637139720F4}"/>
               </a:ext>
             </a:extLst>
           </p:cNvPr>
@@ -4773,7 +4773,7 @@
           <p:cNvPr id="16" name="Picture 15">
             <a:extLst>
               <a:ext uri="{FF2B5EF4-FFF2-40B4-BE49-F238E27FC236}">
-                <a16:creationId xmlns:a16="http://schemas.microsoft.com/office/drawing/2014/main" xmlns="" id="{A9288502-3773-1F4B-A16F-58C59F5FD419}"/>
+                <a16:creationId xmlns="" xmlns:a16="http://schemas.microsoft.com/office/drawing/2014/main" id="{A9288502-3773-1F4B-A16F-58C59F5FD419}"/>
               </a:ext>
             </a:extLst>
           </p:cNvPr>
@@ -4809,7 +4809,7 @@
           <p:cNvPr id="32" name="Straight Connector 31">
             <a:extLst>
               <a:ext uri="{FF2B5EF4-FFF2-40B4-BE49-F238E27FC236}">
-                <a16:creationId xmlns:a16="http://schemas.microsoft.com/office/drawing/2014/main" xmlns="" id="{158023E0-65D2-F849-83D8-A55E2AC6BB63}"/>
+                <a16:creationId xmlns="" xmlns:a16="http://schemas.microsoft.com/office/drawing/2014/main" id="{158023E0-65D2-F849-83D8-A55E2AC6BB63}"/>
               </a:ext>
             </a:extLst>
           </p:cNvPr>
@@ -4847,7 +4847,7 @@
           <p:cNvPr id="36" name="Straight Connector 35">
             <a:extLst>
               <a:ext uri="{FF2B5EF4-FFF2-40B4-BE49-F238E27FC236}">
-                <a16:creationId xmlns:a16="http://schemas.microsoft.com/office/drawing/2014/main" xmlns="" id="{1C61BB10-90B1-A04F-AB02-727027D1950C}"/>
+                <a16:creationId xmlns="" xmlns:a16="http://schemas.microsoft.com/office/drawing/2014/main" id="{1C61BB10-90B1-A04F-AB02-727027D1950C}"/>
               </a:ext>
             </a:extLst>
           </p:cNvPr>
@@ -4890,7 +4890,7 @@
           <p:cNvPr id="37" name="Content Placeholder 3">
             <a:extLst>
               <a:ext uri="{FF2B5EF4-FFF2-40B4-BE49-F238E27FC236}">
-                <a16:creationId xmlns:a16="http://schemas.microsoft.com/office/drawing/2014/main" xmlns="" id="{E6FA2AB0-B1DC-CE4F-BA00-6F224EAE5B8E}"/>
+                <a16:creationId xmlns="" xmlns:a16="http://schemas.microsoft.com/office/drawing/2014/main" id="{E6FA2AB0-B1DC-CE4F-BA00-6F224EAE5B8E}"/>
               </a:ext>
             </a:extLst>
           </p:cNvPr>
@@ -4986,7 +4986,7 @@
           <p:cNvPr id="17" name="Content Placeholder 3">
             <a:extLst>
               <a:ext uri="{FF2B5EF4-FFF2-40B4-BE49-F238E27FC236}">
-                <a16:creationId xmlns:a16="http://schemas.microsoft.com/office/drawing/2014/main" xmlns="" id="{A143064D-45EC-0A4F-88C5-9640D09D7651}"/>
+                <a16:creationId xmlns="" xmlns:a16="http://schemas.microsoft.com/office/drawing/2014/main" id="{A143064D-45EC-0A4F-88C5-9640D09D7651}"/>
               </a:ext>
             </a:extLst>
           </p:cNvPr>
@@ -5587,7 +5587,7 @@
           <p:cNvPr id="8" name="Rectangle 7">
             <a:extLst>
               <a:ext uri="{FF2B5EF4-FFF2-40B4-BE49-F238E27FC236}">
-                <a16:creationId xmlns:a16="http://schemas.microsoft.com/office/drawing/2014/main" xmlns="" id="{6524FE37-B1D2-9A48-8EE1-B9816DBDEF3D}"/>
+                <a16:creationId xmlns="" xmlns:a16="http://schemas.microsoft.com/office/drawing/2014/main" id="{6524FE37-B1D2-9A48-8EE1-B9816DBDEF3D}"/>
               </a:ext>
             </a:extLst>
           </p:cNvPr>
@@ -5626,7 +5626,7 @@
           <p:cNvPr id="9" name="TextBox 8">
             <a:extLst>
               <a:ext uri="{FF2B5EF4-FFF2-40B4-BE49-F238E27FC236}">
-                <a16:creationId xmlns:a16="http://schemas.microsoft.com/office/drawing/2014/main" xmlns="" id="{46ADA988-EDE2-EB43-9964-F5CB85382BA1}"/>
+                <a16:creationId xmlns="" xmlns:a16="http://schemas.microsoft.com/office/drawing/2014/main" id="{46ADA988-EDE2-EB43-9964-F5CB85382BA1}"/>
               </a:ext>
             </a:extLst>
           </p:cNvPr>
@@ -5865,7 +5865,7 @@
           <p:cNvPr id="12" name="Straight Connector 11">
             <a:extLst>
               <a:ext uri="{FF2B5EF4-FFF2-40B4-BE49-F238E27FC236}">
-                <a16:creationId xmlns:a16="http://schemas.microsoft.com/office/drawing/2014/main" xmlns="" id="{80782101-745C-B64C-BF8C-0612C8A826F4}"/>
+                <a16:creationId xmlns="" xmlns:a16="http://schemas.microsoft.com/office/drawing/2014/main" id="{80782101-745C-B64C-BF8C-0612C8A826F4}"/>
               </a:ext>
             </a:extLst>
           </p:cNvPr>
@@ -6021,7 +6021,7 @@
           <p:cNvPr id="11" name="Rectangle 10">
             <a:extLst>
               <a:ext uri="{FF2B5EF4-FFF2-40B4-BE49-F238E27FC236}">
-                <a16:creationId xmlns:a16="http://schemas.microsoft.com/office/drawing/2014/main" xmlns="" id="{1A60FEF2-2730-8045-B797-AEA6DA2ED07B}"/>
+                <a16:creationId xmlns="" xmlns:a16="http://schemas.microsoft.com/office/drawing/2014/main" id="{1A60FEF2-2730-8045-B797-AEA6DA2ED07B}"/>
               </a:ext>
             </a:extLst>
           </p:cNvPr>
@@ -6057,7 +6057,7 @@
           <p:cNvPr id="12" name="Straight Connector 11">
             <a:extLst>
               <a:ext uri="{FF2B5EF4-FFF2-40B4-BE49-F238E27FC236}">
-                <a16:creationId xmlns:a16="http://schemas.microsoft.com/office/drawing/2014/main" xmlns="" id="{9FC44B9B-3ED3-CD4D-A4B4-670F9A0707A7}"/>
+                <a16:creationId xmlns="" xmlns:a16="http://schemas.microsoft.com/office/drawing/2014/main" id="{9FC44B9B-3ED3-CD4D-A4B4-670F9A0707A7}"/>
               </a:ext>
             </a:extLst>
           </p:cNvPr>
@@ -6093,7 +6093,7 @@
           <p:cNvPr id="13" name="Rectangle 12">
             <a:extLst>
               <a:ext uri="{FF2B5EF4-FFF2-40B4-BE49-F238E27FC236}">
-                <a16:creationId xmlns:a16="http://schemas.microsoft.com/office/drawing/2014/main" xmlns="" id="{A8E9047D-CEE7-1041-9CD2-438580517A8B}"/>
+                <a16:creationId xmlns="" xmlns:a16="http://schemas.microsoft.com/office/drawing/2014/main" id="{A8E9047D-CEE7-1041-9CD2-438580517A8B}"/>
               </a:ext>
             </a:extLst>
           </p:cNvPr>
@@ -6129,7 +6129,7 @@
           <p:cNvPr id="14" name="Straight Connector 13">
             <a:extLst>
               <a:ext uri="{FF2B5EF4-FFF2-40B4-BE49-F238E27FC236}">
-                <a16:creationId xmlns:a16="http://schemas.microsoft.com/office/drawing/2014/main" xmlns="" id="{A080B88E-5B35-9C42-B51A-25732C333881}"/>
+                <a16:creationId xmlns="" xmlns:a16="http://schemas.microsoft.com/office/drawing/2014/main" id="{A080B88E-5B35-9C42-B51A-25732C333881}"/>
               </a:ext>
             </a:extLst>
           </p:cNvPr>
@@ -6165,7 +6165,7 @@
           <p:cNvPr id="16" name="TextBox 15">
             <a:extLst>
               <a:ext uri="{FF2B5EF4-FFF2-40B4-BE49-F238E27FC236}">
-                <a16:creationId xmlns:a16="http://schemas.microsoft.com/office/drawing/2014/main" xmlns="" id="{B2BB3227-C774-FD42-B9A5-3508452E6A71}"/>
+                <a16:creationId xmlns="" xmlns:a16="http://schemas.microsoft.com/office/drawing/2014/main" id="{B2BB3227-C774-FD42-B9A5-3508452E6A71}"/>
               </a:ext>
             </a:extLst>
           </p:cNvPr>
@@ -6465,7 +6465,7 @@
           <p:cNvPr id="86" name="Rectangle 85">
             <a:extLst>
               <a:ext uri="{FF2B5EF4-FFF2-40B4-BE49-F238E27FC236}">
-                <a16:creationId xmlns:a16="http://schemas.microsoft.com/office/drawing/2014/main" xmlns="" id="{EDB109D6-5BF6-5E42-A1C1-45B238B41A7E}"/>
+                <a16:creationId xmlns="" xmlns:a16="http://schemas.microsoft.com/office/drawing/2014/main" id="{EDB109D6-5BF6-5E42-A1C1-45B238B41A7E}"/>
               </a:ext>
             </a:extLst>
           </p:cNvPr>
@@ -6527,7 +6527,7 @@
           <p:cNvPr id="45" name="Rectangle 1">
             <a:extLst>
               <a:ext uri="{FF2B5EF4-FFF2-40B4-BE49-F238E27FC236}">
-                <a16:creationId xmlns:a16="http://schemas.microsoft.com/office/drawing/2014/main" xmlns="" id="{7F24C5F6-F280-EE49-BEC1-D93D2617D356}"/>
+                <a16:creationId xmlns="" xmlns:a16="http://schemas.microsoft.com/office/drawing/2014/main" id="{7F24C5F6-F280-EE49-BEC1-D93D2617D356}"/>
               </a:ext>
             </a:extLst>
           </p:cNvPr>
@@ -6776,7 +6776,7 @@
           <p:cNvPr id="89" name="Rectangle 88">
             <a:extLst>
               <a:ext uri="{FF2B5EF4-FFF2-40B4-BE49-F238E27FC236}">
-                <a16:creationId xmlns:a16="http://schemas.microsoft.com/office/drawing/2014/main" xmlns="" id="{EFCB9C4D-5246-B743-853A-FA66CEE7DE4D}"/>
+                <a16:creationId xmlns="" xmlns:a16="http://schemas.microsoft.com/office/drawing/2014/main" id="{EFCB9C4D-5246-B743-853A-FA66CEE7DE4D}"/>
               </a:ext>
             </a:extLst>
           </p:cNvPr>
@@ -6828,7 +6828,7 @@
           <p:cNvPr id="93" name="Triangle 92">
             <a:extLst>
               <a:ext uri="{FF2B5EF4-FFF2-40B4-BE49-F238E27FC236}">
-                <a16:creationId xmlns:a16="http://schemas.microsoft.com/office/drawing/2014/main" xmlns="" id="{0D72A147-C32E-C540-8F80-59F865637BB1}"/>
+                <a16:creationId xmlns="" xmlns:a16="http://schemas.microsoft.com/office/drawing/2014/main" id="{0D72A147-C32E-C540-8F80-59F865637BB1}"/>
               </a:ext>
             </a:extLst>
           </p:cNvPr>
@@ -6883,7 +6883,7 @@
             <a:hlinkClick r:id="rId2"/>
             <a:extLst>
               <a:ext uri="{FF2B5EF4-FFF2-40B4-BE49-F238E27FC236}">
-                <a16:creationId xmlns:a16="http://schemas.microsoft.com/office/drawing/2014/main" xmlns="" id="{0A03D419-B4E4-A341-8258-BAF4FC5373B4}"/>
+                <a16:creationId xmlns="" xmlns:a16="http://schemas.microsoft.com/office/drawing/2014/main" id="{0A03D419-B4E4-A341-8258-BAF4FC5373B4}"/>
               </a:ext>
             </a:extLst>
           </p:cNvPr>
@@ -6946,7 +6946,7 @@
           <p:cNvPr id="95" name="Group 94">
             <a:extLst>
               <a:ext uri="{FF2B5EF4-FFF2-40B4-BE49-F238E27FC236}">
-                <a16:creationId xmlns:a16="http://schemas.microsoft.com/office/drawing/2014/main" xmlns="" id="{89E75E57-B1BB-1043-92B1-2837059A39CF}"/>
+                <a16:creationId xmlns="" xmlns:a16="http://schemas.microsoft.com/office/drawing/2014/main" id="{89E75E57-B1BB-1043-92B1-2837059A39CF}"/>
               </a:ext>
             </a:extLst>
           </p:cNvPr>
@@ -6966,7 +6966,7 @@
             <p:cNvPr id="96" name="Rounded Rectangle 95">
               <a:extLst>
                 <a:ext uri="{FF2B5EF4-FFF2-40B4-BE49-F238E27FC236}">
-                  <a16:creationId xmlns:a16="http://schemas.microsoft.com/office/drawing/2014/main" xmlns="" id="{C571F53C-F9A8-D34F-89E9-D59834F26F2A}"/>
+                  <a16:creationId xmlns="" xmlns:a16="http://schemas.microsoft.com/office/drawing/2014/main" id="{C571F53C-F9A8-D34F-89E9-D59834F26F2A}"/>
                 </a:ext>
               </a:extLst>
             </p:cNvPr>
@@ -7019,7 +7019,7 @@
               <a:hlinkClick r:id="rId3"/>
               <a:extLst>
                 <a:ext uri="{FF2B5EF4-FFF2-40B4-BE49-F238E27FC236}">
-                  <a16:creationId xmlns:a16="http://schemas.microsoft.com/office/drawing/2014/main" xmlns="" id="{BCCC18FD-7037-504F-B7DD-009E93D5CFC5}"/>
+                  <a16:creationId xmlns="" xmlns:a16="http://schemas.microsoft.com/office/drawing/2014/main" id="{BCCC18FD-7037-504F-B7DD-009E93D5CFC5}"/>
                 </a:ext>
               </a:extLst>
             </p:cNvPr>
@@ -7071,7 +7071,7 @@
             <a:hlinkClick r:id="rId3"/>
             <a:extLst>
               <a:ext uri="{FF2B5EF4-FFF2-40B4-BE49-F238E27FC236}">
-                <a16:creationId xmlns:a16="http://schemas.microsoft.com/office/drawing/2014/main" xmlns="" id="{31AA4A0D-C979-ED41-9053-191689A53F33}"/>
+                <a16:creationId xmlns="" xmlns:a16="http://schemas.microsoft.com/office/drawing/2014/main" id="{31AA4A0D-C979-ED41-9053-191689A53F33}"/>
               </a:ext>
             </a:extLst>
           </p:cNvPr>
@@ -7134,7 +7134,7 @@
           <p:cNvPr id="105" name="Group 104">
             <a:extLst>
               <a:ext uri="{FF2B5EF4-FFF2-40B4-BE49-F238E27FC236}">
-                <a16:creationId xmlns:a16="http://schemas.microsoft.com/office/drawing/2014/main" xmlns="" id="{7BF00640-0851-4A4E-8179-1BD384D8F525}"/>
+                <a16:creationId xmlns="" xmlns:a16="http://schemas.microsoft.com/office/drawing/2014/main" id="{7BF00640-0851-4A4E-8179-1BD384D8F525}"/>
               </a:ext>
             </a:extLst>
           </p:cNvPr>
@@ -7154,7 +7154,7 @@
             <p:cNvPr id="106" name="Rounded Rectangle 105">
               <a:extLst>
                 <a:ext uri="{FF2B5EF4-FFF2-40B4-BE49-F238E27FC236}">
-                  <a16:creationId xmlns:a16="http://schemas.microsoft.com/office/drawing/2014/main" xmlns="" id="{5AA2B150-5004-364C-910A-A392CD7A853A}"/>
+                  <a16:creationId xmlns="" xmlns:a16="http://schemas.microsoft.com/office/drawing/2014/main" id="{5AA2B150-5004-364C-910A-A392CD7A853A}"/>
                 </a:ext>
               </a:extLst>
             </p:cNvPr>
@@ -7207,7 +7207,7 @@
               <a:hlinkClick r:id="rId3"/>
               <a:extLst>
                 <a:ext uri="{FF2B5EF4-FFF2-40B4-BE49-F238E27FC236}">
-                  <a16:creationId xmlns:a16="http://schemas.microsoft.com/office/drawing/2014/main" xmlns="" id="{91AD4506-A6D6-124C-97E7-7D3DF0EBA900}"/>
+                  <a16:creationId xmlns="" xmlns:a16="http://schemas.microsoft.com/office/drawing/2014/main" id="{91AD4506-A6D6-124C-97E7-7D3DF0EBA900}"/>
                 </a:ext>
               </a:extLst>
             </p:cNvPr>
@@ -7266,7 +7266,7 @@
           <p:cNvPr id="122" name="Picture 121">
             <a:extLst>
               <a:ext uri="{FF2B5EF4-FFF2-40B4-BE49-F238E27FC236}">
-                <a16:creationId xmlns:a16="http://schemas.microsoft.com/office/drawing/2014/main" xmlns="" id="{B221A555-3C2F-E94D-96E4-6FC85564B891}"/>
+                <a16:creationId xmlns="" xmlns:a16="http://schemas.microsoft.com/office/drawing/2014/main" id="{B221A555-3C2F-E94D-96E4-6FC85564B891}"/>
               </a:ext>
             </a:extLst>
           </p:cNvPr>
@@ -7302,7 +7302,7 @@
           <p:cNvPr id="129" name="Title 24">
             <a:extLst>
               <a:ext uri="{FF2B5EF4-FFF2-40B4-BE49-F238E27FC236}">
-                <a16:creationId xmlns:a16="http://schemas.microsoft.com/office/drawing/2014/main" xmlns="" id="{C9C5C095-FA83-CE44-8BA2-FB0F4CF430D7}"/>
+                <a16:creationId xmlns="" xmlns:a16="http://schemas.microsoft.com/office/drawing/2014/main" id="{C9C5C095-FA83-CE44-8BA2-FB0F4CF430D7}"/>
               </a:ext>
             </a:extLst>
           </p:cNvPr>
@@ -7362,7 +7362,7 @@
           <p:cNvPr id="134" name="Picture 133">
             <a:extLst>
               <a:ext uri="{FF2B5EF4-FFF2-40B4-BE49-F238E27FC236}">
-                <a16:creationId xmlns:a16="http://schemas.microsoft.com/office/drawing/2014/main" xmlns="" id="{0E8E09F9-EF0B-4C47-B695-BE4EBAFCE677}"/>
+                <a16:creationId xmlns="" xmlns:a16="http://schemas.microsoft.com/office/drawing/2014/main" id="{0E8E09F9-EF0B-4C47-B695-BE4EBAFCE677}"/>
               </a:ext>
             </a:extLst>
           </p:cNvPr>
@@ -7397,7 +7397,7 @@
           <p:cNvPr id="135" name="Straight Connector 134">
             <a:extLst>
               <a:ext uri="{FF2B5EF4-FFF2-40B4-BE49-F238E27FC236}">
-                <a16:creationId xmlns:a16="http://schemas.microsoft.com/office/drawing/2014/main" xmlns="" id="{FF6AB179-2926-4D40-A4DD-8BB1E9EAEA7D}"/>
+                <a16:creationId xmlns="" xmlns:a16="http://schemas.microsoft.com/office/drawing/2014/main" id="{FF6AB179-2926-4D40-A4DD-8BB1E9EAEA7D}"/>
               </a:ext>
             </a:extLst>
           </p:cNvPr>
@@ -7438,7 +7438,7 @@
           <p:cNvPr id="41" name="Content Placeholder 52">
             <a:extLst>
               <a:ext uri="{FF2B5EF4-FFF2-40B4-BE49-F238E27FC236}">
-                <a16:creationId xmlns:a16="http://schemas.microsoft.com/office/drawing/2014/main" xmlns="" id="{03870E7E-5F8D-F64D-B6CF-AC70B18948A2}"/>
+                <a16:creationId xmlns="" xmlns:a16="http://schemas.microsoft.com/office/drawing/2014/main" id="{03870E7E-5F8D-F64D-B6CF-AC70B18948A2}"/>
               </a:ext>
             </a:extLst>
           </p:cNvPr>
@@ -7688,7 +7688,7 @@
           <p:cNvPr id="42" name="Content Placeholder 52">
             <a:extLst>
               <a:ext uri="{FF2B5EF4-FFF2-40B4-BE49-F238E27FC236}">
-                <a16:creationId xmlns:a16="http://schemas.microsoft.com/office/drawing/2014/main" xmlns="" id="{95FE5B9D-9272-3841-9EE5-9D5A046A1FF7}"/>
+                <a16:creationId xmlns="" xmlns:a16="http://schemas.microsoft.com/office/drawing/2014/main" id="{95FE5B9D-9272-3841-9EE5-9D5A046A1FF7}"/>
               </a:ext>
             </a:extLst>
           </p:cNvPr>
@@ -7924,7 +7924,7 @@
           <p:cNvPr id="43" name="Content Placeholder 52">
             <a:extLst>
               <a:ext uri="{FF2B5EF4-FFF2-40B4-BE49-F238E27FC236}">
-                <a16:creationId xmlns:a16="http://schemas.microsoft.com/office/drawing/2014/main" xmlns="" id="{8C3392A2-7BEC-C643-A397-ACB0C15BDDE1}"/>
+                <a16:creationId xmlns="" xmlns:a16="http://schemas.microsoft.com/office/drawing/2014/main" id="{8C3392A2-7BEC-C643-A397-ACB0C15BDDE1}"/>
               </a:ext>
             </a:extLst>
           </p:cNvPr>
@@ -8159,7 +8159,7 @@
           <p:cNvPr id="44" name="Content Placeholder 52">
             <a:extLst>
               <a:ext uri="{FF2B5EF4-FFF2-40B4-BE49-F238E27FC236}">
-                <a16:creationId xmlns:a16="http://schemas.microsoft.com/office/drawing/2014/main" xmlns="" id="{5BF202D4-4239-7E4F-93CD-8E57B0E44847}"/>
+                <a16:creationId xmlns="" xmlns:a16="http://schemas.microsoft.com/office/drawing/2014/main" id="{5BF202D4-4239-7E4F-93CD-8E57B0E44847}"/>
               </a:ext>
             </a:extLst>
           </p:cNvPr>
@@ -8403,7 +8403,7 @@
           <p:cNvPr id="46" name="Content Placeholder 52">
             <a:extLst>
               <a:ext uri="{FF2B5EF4-FFF2-40B4-BE49-F238E27FC236}">
-                <a16:creationId xmlns:a16="http://schemas.microsoft.com/office/drawing/2014/main" xmlns="" id="{16FDB233-B738-8D4E-B43F-750A1A983DE9}"/>
+                <a16:creationId xmlns="" xmlns:a16="http://schemas.microsoft.com/office/drawing/2014/main" id="{16FDB233-B738-8D4E-B43F-750A1A983DE9}"/>
               </a:ext>
             </a:extLst>
           </p:cNvPr>
@@ -8639,7 +8639,7 @@
           <p:cNvPr id="47" name="Picture 46">
             <a:extLst>
               <a:ext uri="{FF2B5EF4-FFF2-40B4-BE49-F238E27FC236}">
-                <a16:creationId xmlns:a16="http://schemas.microsoft.com/office/drawing/2014/main" xmlns="" id="{E394D0E0-025D-644F-82A2-ED215AC1B381}"/>
+                <a16:creationId xmlns="" xmlns:a16="http://schemas.microsoft.com/office/drawing/2014/main" id="{E394D0E0-025D-644F-82A2-ED215AC1B381}"/>
               </a:ext>
             </a:extLst>
           </p:cNvPr>
@@ -8675,7 +8675,7 @@
           <p:cNvPr id="48" name="Picture 47">
             <a:extLst>
               <a:ext uri="{FF2B5EF4-FFF2-40B4-BE49-F238E27FC236}">
-                <a16:creationId xmlns:a16="http://schemas.microsoft.com/office/drawing/2014/main" xmlns="" id="{35E0AA7F-0EA4-224A-92F8-C9A9D5B1B802}"/>
+                <a16:creationId xmlns="" xmlns:a16="http://schemas.microsoft.com/office/drawing/2014/main" id="{35E0AA7F-0EA4-224A-92F8-C9A9D5B1B802}"/>
               </a:ext>
             </a:extLst>
           </p:cNvPr>
@@ -8711,7 +8711,7 @@
           <p:cNvPr id="49" name="Picture 48">
             <a:extLst>
               <a:ext uri="{FF2B5EF4-FFF2-40B4-BE49-F238E27FC236}">
-                <a16:creationId xmlns:a16="http://schemas.microsoft.com/office/drawing/2014/main" xmlns="" id="{A48092AC-915B-524D-9672-FE0826E130E7}"/>
+                <a16:creationId xmlns="" xmlns:a16="http://schemas.microsoft.com/office/drawing/2014/main" id="{A48092AC-915B-524D-9672-FE0826E130E7}"/>
               </a:ext>
             </a:extLst>
           </p:cNvPr>
@@ -8747,7 +8747,7 @@
           <p:cNvPr id="51" name="Picture 50">
             <a:extLst>
               <a:ext uri="{FF2B5EF4-FFF2-40B4-BE49-F238E27FC236}">
-                <a16:creationId xmlns:a16="http://schemas.microsoft.com/office/drawing/2014/main" xmlns="" id="{27E440A9-1FB1-A44A-8917-F3A839BAF906}"/>
+                <a16:creationId xmlns="" xmlns:a16="http://schemas.microsoft.com/office/drawing/2014/main" id="{27E440A9-1FB1-A44A-8917-F3A839BAF906}"/>
               </a:ext>
             </a:extLst>
           </p:cNvPr>
@@ -8783,7 +8783,7 @@
           <p:cNvPr id="52" name="Picture 51">
             <a:extLst>
               <a:ext uri="{FF2B5EF4-FFF2-40B4-BE49-F238E27FC236}">
-                <a16:creationId xmlns:a16="http://schemas.microsoft.com/office/drawing/2014/main" xmlns="" id="{FFFF220F-F683-2F48-A73D-6A41401B0D05}"/>
+                <a16:creationId xmlns="" xmlns:a16="http://schemas.microsoft.com/office/drawing/2014/main" id="{FFFF220F-F683-2F48-A73D-6A41401B0D05}"/>
               </a:ext>
             </a:extLst>
           </p:cNvPr>
@@ -8819,7 +8819,7 @@
           <p:cNvPr id="53" name="Picture 52">
             <a:extLst>
               <a:ext uri="{FF2B5EF4-FFF2-40B4-BE49-F238E27FC236}">
-                <a16:creationId xmlns:a16="http://schemas.microsoft.com/office/drawing/2014/main" xmlns="" id="{FC96BF3C-2C18-7E4E-AADA-8075C799317A}"/>
+                <a16:creationId xmlns="" xmlns:a16="http://schemas.microsoft.com/office/drawing/2014/main" id="{FC96BF3C-2C18-7E4E-AADA-8075C799317A}"/>
               </a:ext>
             </a:extLst>
           </p:cNvPr>
@@ -8855,7 +8855,7 @@
           <p:cNvPr id="54" name="Content Placeholder 52">
             <a:extLst>
               <a:ext uri="{FF2B5EF4-FFF2-40B4-BE49-F238E27FC236}">
-                <a16:creationId xmlns:a16="http://schemas.microsoft.com/office/drawing/2014/main" xmlns="" id="{8184E9DC-A05F-994B-8D0E-6F0964DE93A1}"/>
+                <a16:creationId xmlns="" xmlns:a16="http://schemas.microsoft.com/office/drawing/2014/main" id="{8184E9DC-A05F-994B-8D0E-6F0964DE93A1}"/>
               </a:ext>
             </a:extLst>
           </p:cNvPr>
@@ -9120,7 +9120,7 @@
           <p:cNvPr id="37" name="Content Placeholder 52">
             <a:extLst>
               <a:ext uri="{FF2B5EF4-FFF2-40B4-BE49-F238E27FC236}">
-                <a16:creationId xmlns:a16="http://schemas.microsoft.com/office/drawing/2014/main" xmlns="" id="{A1F29D74-7F07-D84E-B102-930FD141E5B9}"/>
+                <a16:creationId xmlns="" xmlns:a16="http://schemas.microsoft.com/office/drawing/2014/main" id="{A1F29D74-7F07-D84E-B102-930FD141E5B9}"/>
               </a:ext>
             </a:extLst>
           </p:cNvPr>
@@ -9356,7 +9356,7 @@
           <p:cNvPr id="38" name="Picture 37">
             <a:extLst>
               <a:ext uri="{FF2B5EF4-FFF2-40B4-BE49-F238E27FC236}">
-                <a16:creationId xmlns:a16="http://schemas.microsoft.com/office/drawing/2014/main" xmlns="" id="{B4EE7BA3-3882-054B-9C71-4C6C9D45BBC3}"/>
+                <a16:creationId xmlns="" xmlns:a16="http://schemas.microsoft.com/office/drawing/2014/main" id="{B4EE7BA3-3882-054B-9C71-4C6C9D45BBC3}"/>
               </a:ext>
             </a:extLst>
           </p:cNvPr>
@@ -9393,7 +9393,7 @@
             <a:hlinkClick r:id="rId3"/>
             <a:extLst>
               <a:ext uri="{FF2B5EF4-FFF2-40B4-BE49-F238E27FC236}">
-                <a16:creationId xmlns:a16="http://schemas.microsoft.com/office/drawing/2014/main" xmlns="" id="{8ECC0D63-20D7-0343-86D0-A87AE2BB8F87}"/>
+                <a16:creationId xmlns="" xmlns:a16="http://schemas.microsoft.com/office/drawing/2014/main" id="{8ECC0D63-20D7-0343-86D0-A87AE2BB8F87}"/>
               </a:ext>
             </a:extLst>
           </p:cNvPr>
@@ -9452,7 +9452,7 @@
             <a:hlinkClick r:id="rId2"/>
             <a:extLst>
               <a:ext uri="{FF2B5EF4-FFF2-40B4-BE49-F238E27FC236}">
-                <a16:creationId xmlns:a16="http://schemas.microsoft.com/office/drawing/2014/main" xmlns="" id="{B01DB6F7-4A56-E648-8CE4-FB8C132141F4}"/>
+                <a16:creationId xmlns="" xmlns:a16="http://schemas.microsoft.com/office/drawing/2014/main" id="{B01DB6F7-4A56-E648-8CE4-FB8C132141F4}"/>
               </a:ext>
             </a:extLst>
           </p:cNvPr>
@@ -9540,7 +9540,7 @@
           <p:cNvPr id="86" name="Rectangle 85">
             <a:extLst>
               <a:ext uri="{FF2B5EF4-FFF2-40B4-BE49-F238E27FC236}">
-                <a16:creationId xmlns:a16="http://schemas.microsoft.com/office/drawing/2014/main" xmlns="" id="{EDB109D6-5BF6-5E42-A1C1-45B238B41A7E}"/>
+                <a16:creationId xmlns="" xmlns:a16="http://schemas.microsoft.com/office/drawing/2014/main" id="{EDB109D6-5BF6-5E42-A1C1-45B238B41A7E}"/>
               </a:ext>
             </a:extLst>
           </p:cNvPr>
@@ -9602,7 +9602,7 @@
           <p:cNvPr id="131" name="Rectangle 1">
             <a:extLst>
               <a:ext uri="{FF2B5EF4-FFF2-40B4-BE49-F238E27FC236}">
-                <a16:creationId xmlns:a16="http://schemas.microsoft.com/office/drawing/2014/main" xmlns="" id="{D03E41E1-380E-DF4A-8F15-AB2EAE2322B9}"/>
+                <a16:creationId xmlns="" xmlns:a16="http://schemas.microsoft.com/office/drawing/2014/main" id="{D03E41E1-380E-DF4A-8F15-AB2EAE2322B9}"/>
               </a:ext>
             </a:extLst>
           </p:cNvPr>
@@ -9851,7 +9851,7 @@
           <p:cNvPr id="89" name="Rectangle 88">
             <a:extLst>
               <a:ext uri="{FF2B5EF4-FFF2-40B4-BE49-F238E27FC236}">
-                <a16:creationId xmlns:a16="http://schemas.microsoft.com/office/drawing/2014/main" xmlns="" id="{EFCB9C4D-5246-B743-853A-FA66CEE7DE4D}"/>
+                <a16:creationId xmlns="" xmlns:a16="http://schemas.microsoft.com/office/drawing/2014/main" id="{EFCB9C4D-5246-B743-853A-FA66CEE7DE4D}"/>
               </a:ext>
             </a:extLst>
           </p:cNvPr>
@@ -9903,7 +9903,7 @@
           <p:cNvPr id="93" name="Triangle 92">
             <a:extLst>
               <a:ext uri="{FF2B5EF4-FFF2-40B4-BE49-F238E27FC236}">
-                <a16:creationId xmlns:a16="http://schemas.microsoft.com/office/drawing/2014/main" xmlns="" id="{0D72A147-C32E-C540-8F80-59F865637BB1}"/>
+                <a16:creationId xmlns="" xmlns:a16="http://schemas.microsoft.com/office/drawing/2014/main" id="{0D72A147-C32E-C540-8F80-59F865637BB1}"/>
               </a:ext>
             </a:extLst>
           </p:cNvPr>
@@ -9958,7 +9958,7 @@
             <a:hlinkClick r:id="rId2"/>
             <a:extLst>
               <a:ext uri="{FF2B5EF4-FFF2-40B4-BE49-F238E27FC236}">
-                <a16:creationId xmlns:a16="http://schemas.microsoft.com/office/drawing/2014/main" xmlns="" id="{0A03D419-B4E4-A341-8258-BAF4FC5373B4}"/>
+                <a16:creationId xmlns="" xmlns:a16="http://schemas.microsoft.com/office/drawing/2014/main" id="{0A03D419-B4E4-A341-8258-BAF4FC5373B4}"/>
               </a:ext>
             </a:extLst>
           </p:cNvPr>
@@ -10021,7 +10021,7 @@
           <p:cNvPr id="95" name="Group 94">
             <a:extLst>
               <a:ext uri="{FF2B5EF4-FFF2-40B4-BE49-F238E27FC236}">
-                <a16:creationId xmlns:a16="http://schemas.microsoft.com/office/drawing/2014/main" xmlns="" id="{89E75E57-B1BB-1043-92B1-2837059A39CF}"/>
+                <a16:creationId xmlns="" xmlns:a16="http://schemas.microsoft.com/office/drawing/2014/main" id="{89E75E57-B1BB-1043-92B1-2837059A39CF}"/>
               </a:ext>
             </a:extLst>
           </p:cNvPr>
@@ -10041,7 +10041,7 @@
             <p:cNvPr id="96" name="Rounded Rectangle 95">
               <a:extLst>
                 <a:ext uri="{FF2B5EF4-FFF2-40B4-BE49-F238E27FC236}">
-                  <a16:creationId xmlns:a16="http://schemas.microsoft.com/office/drawing/2014/main" xmlns="" id="{C571F53C-F9A8-D34F-89E9-D59834F26F2A}"/>
+                  <a16:creationId xmlns="" xmlns:a16="http://schemas.microsoft.com/office/drawing/2014/main" id="{C571F53C-F9A8-D34F-89E9-D59834F26F2A}"/>
                 </a:ext>
               </a:extLst>
             </p:cNvPr>
@@ -10094,7 +10094,7 @@
               <a:hlinkClick r:id="rId3"/>
               <a:extLst>
                 <a:ext uri="{FF2B5EF4-FFF2-40B4-BE49-F238E27FC236}">
-                  <a16:creationId xmlns:a16="http://schemas.microsoft.com/office/drawing/2014/main" xmlns="" id="{BCCC18FD-7037-504F-B7DD-009E93D5CFC5}"/>
+                  <a16:creationId xmlns="" xmlns:a16="http://schemas.microsoft.com/office/drawing/2014/main" id="{BCCC18FD-7037-504F-B7DD-009E93D5CFC5}"/>
                 </a:ext>
               </a:extLst>
             </p:cNvPr>
@@ -10146,7 +10146,7 @@
             <a:hlinkClick r:id="rId3"/>
             <a:extLst>
               <a:ext uri="{FF2B5EF4-FFF2-40B4-BE49-F238E27FC236}">
-                <a16:creationId xmlns:a16="http://schemas.microsoft.com/office/drawing/2014/main" xmlns="" id="{31AA4A0D-C979-ED41-9053-191689A53F33}"/>
+                <a16:creationId xmlns="" xmlns:a16="http://schemas.microsoft.com/office/drawing/2014/main" id="{31AA4A0D-C979-ED41-9053-191689A53F33}"/>
               </a:ext>
             </a:extLst>
           </p:cNvPr>
@@ -10209,7 +10209,7 @@
           <p:cNvPr id="105" name="Group 104">
             <a:extLst>
               <a:ext uri="{FF2B5EF4-FFF2-40B4-BE49-F238E27FC236}">
-                <a16:creationId xmlns:a16="http://schemas.microsoft.com/office/drawing/2014/main" xmlns="" id="{7BF00640-0851-4A4E-8179-1BD384D8F525}"/>
+                <a16:creationId xmlns="" xmlns:a16="http://schemas.microsoft.com/office/drawing/2014/main" id="{7BF00640-0851-4A4E-8179-1BD384D8F525}"/>
               </a:ext>
             </a:extLst>
           </p:cNvPr>
@@ -10229,7 +10229,7 @@
             <p:cNvPr id="106" name="Rounded Rectangle 105">
               <a:extLst>
                 <a:ext uri="{FF2B5EF4-FFF2-40B4-BE49-F238E27FC236}">
-                  <a16:creationId xmlns:a16="http://schemas.microsoft.com/office/drawing/2014/main" xmlns="" id="{5AA2B150-5004-364C-910A-A392CD7A853A}"/>
+                  <a16:creationId xmlns="" xmlns:a16="http://schemas.microsoft.com/office/drawing/2014/main" id="{5AA2B150-5004-364C-910A-A392CD7A853A}"/>
                 </a:ext>
               </a:extLst>
             </p:cNvPr>
@@ -10282,7 +10282,7 @@
               <a:hlinkClick r:id="rId3"/>
               <a:extLst>
                 <a:ext uri="{FF2B5EF4-FFF2-40B4-BE49-F238E27FC236}">
-                  <a16:creationId xmlns:a16="http://schemas.microsoft.com/office/drawing/2014/main" xmlns="" id="{91AD4506-A6D6-124C-97E7-7D3DF0EBA900}"/>
+                  <a16:creationId xmlns="" xmlns:a16="http://schemas.microsoft.com/office/drawing/2014/main" id="{91AD4506-A6D6-124C-97E7-7D3DF0EBA900}"/>
                 </a:ext>
               </a:extLst>
             </p:cNvPr>
@@ -10341,7 +10341,7 @@
           <p:cNvPr id="122" name="Picture 121">
             <a:extLst>
               <a:ext uri="{FF2B5EF4-FFF2-40B4-BE49-F238E27FC236}">
-                <a16:creationId xmlns:a16="http://schemas.microsoft.com/office/drawing/2014/main" xmlns="" id="{B221A555-3C2F-E94D-96E4-6FC85564B891}"/>
+                <a16:creationId xmlns="" xmlns:a16="http://schemas.microsoft.com/office/drawing/2014/main" id="{B221A555-3C2F-E94D-96E4-6FC85564B891}"/>
               </a:ext>
             </a:extLst>
           </p:cNvPr>
@@ -10377,7 +10377,7 @@
           <p:cNvPr id="129" name="Title 24">
             <a:extLst>
               <a:ext uri="{FF2B5EF4-FFF2-40B4-BE49-F238E27FC236}">
-                <a16:creationId xmlns:a16="http://schemas.microsoft.com/office/drawing/2014/main" xmlns="" id="{C9C5C095-FA83-CE44-8BA2-FB0F4CF430D7}"/>
+                <a16:creationId xmlns="" xmlns:a16="http://schemas.microsoft.com/office/drawing/2014/main" id="{C9C5C095-FA83-CE44-8BA2-FB0F4CF430D7}"/>
               </a:ext>
             </a:extLst>
           </p:cNvPr>
@@ -10437,7 +10437,7 @@
           <p:cNvPr id="135" name="Straight Connector 134">
             <a:extLst>
               <a:ext uri="{FF2B5EF4-FFF2-40B4-BE49-F238E27FC236}">
-                <a16:creationId xmlns:a16="http://schemas.microsoft.com/office/drawing/2014/main" xmlns="" id="{FF6AB179-2926-4D40-A4DD-8BB1E9EAEA7D}"/>
+                <a16:creationId xmlns="" xmlns:a16="http://schemas.microsoft.com/office/drawing/2014/main" id="{FF6AB179-2926-4D40-A4DD-8BB1E9EAEA7D}"/>
               </a:ext>
             </a:extLst>
           </p:cNvPr>
@@ -10478,7 +10478,7 @@
           <p:cNvPr id="41" name="Content Placeholder 52">
             <a:extLst>
               <a:ext uri="{FF2B5EF4-FFF2-40B4-BE49-F238E27FC236}">
-                <a16:creationId xmlns:a16="http://schemas.microsoft.com/office/drawing/2014/main" xmlns="" id="{03870E7E-5F8D-F64D-B6CF-AC70B18948A2}"/>
+                <a16:creationId xmlns="" xmlns:a16="http://schemas.microsoft.com/office/drawing/2014/main" id="{03870E7E-5F8D-F64D-B6CF-AC70B18948A2}"/>
               </a:ext>
             </a:extLst>
           </p:cNvPr>
@@ -10728,7 +10728,7 @@
           <p:cNvPr id="42" name="Content Placeholder 52">
             <a:extLst>
               <a:ext uri="{FF2B5EF4-FFF2-40B4-BE49-F238E27FC236}">
-                <a16:creationId xmlns:a16="http://schemas.microsoft.com/office/drawing/2014/main" xmlns="" id="{95FE5B9D-9272-3841-9EE5-9D5A046A1FF7}"/>
+                <a16:creationId xmlns="" xmlns:a16="http://schemas.microsoft.com/office/drawing/2014/main" id="{95FE5B9D-9272-3841-9EE5-9D5A046A1FF7}"/>
               </a:ext>
             </a:extLst>
           </p:cNvPr>
@@ -10964,7 +10964,7 @@
           <p:cNvPr id="43" name="Content Placeholder 52">
             <a:extLst>
               <a:ext uri="{FF2B5EF4-FFF2-40B4-BE49-F238E27FC236}">
-                <a16:creationId xmlns:a16="http://schemas.microsoft.com/office/drawing/2014/main" xmlns="" id="{8C3392A2-7BEC-C643-A397-ACB0C15BDDE1}"/>
+                <a16:creationId xmlns="" xmlns:a16="http://schemas.microsoft.com/office/drawing/2014/main" id="{8C3392A2-7BEC-C643-A397-ACB0C15BDDE1}"/>
               </a:ext>
             </a:extLst>
           </p:cNvPr>
@@ -11199,7 +11199,7 @@
           <p:cNvPr id="44" name="Content Placeholder 52">
             <a:extLst>
               <a:ext uri="{FF2B5EF4-FFF2-40B4-BE49-F238E27FC236}">
-                <a16:creationId xmlns:a16="http://schemas.microsoft.com/office/drawing/2014/main" xmlns="" id="{5BF202D4-4239-7E4F-93CD-8E57B0E44847}"/>
+                <a16:creationId xmlns="" xmlns:a16="http://schemas.microsoft.com/office/drawing/2014/main" id="{5BF202D4-4239-7E4F-93CD-8E57B0E44847}"/>
               </a:ext>
             </a:extLst>
           </p:cNvPr>
@@ -11443,7 +11443,7 @@
           <p:cNvPr id="46" name="Content Placeholder 52">
             <a:extLst>
               <a:ext uri="{FF2B5EF4-FFF2-40B4-BE49-F238E27FC236}">
-                <a16:creationId xmlns:a16="http://schemas.microsoft.com/office/drawing/2014/main" xmlns="" id="{16FDB233-B738-8D4E-B43F-750A1A983DE9}"/>
+                <a16:creationId xmlns="" xmlns:a16="http://schemas.microsoft.com/office/drawing/2014/main" id="{16FDB233-B738-8D4E-B43F-750A1A983DE9}"/>
               </a:ext>
             </a:extLst>
           </p:cNvPr>
@@ -11679,7 +11679,7 @@
           <p:cNvPr id="47" name="Picture 46">
             <a:extLst>
               <a:ext uri="{FF2B5EF4-FFF2-40B4-BE49-F238E27FC236}">
-                <a16:creationId xmlns:a16="http://schemas.microsoft.com/office/drawing/2014/main" xmlns="" id="{E394D0E0-025D-644F-82A2-ED215AC1B381}"/>
+                <a16:creationId xmlns="" xmlns:a16="http://schemas.microsoft.com/office/drawing/2014/main" id="{E394D0E0-025D-644F-82A2-ED215AC1B381}"/>
               </a:ext>
             </a:extLst>
           </p:cNvPr>
@@ -11715,7 +11715,7 @@
           <p:cNvPr id="48" name="Picture 47">
             <a:extLst>
               <a:ext uri="{FF2B5EF4-FFF2-40B4-BE49-F238E27FC236}">
-                <a16:creationId xmlns:a16="http://schemas.microsoft.com/office/drawing/2014/main" xmlns="" id="{35E0AA7F-0EA4-224A-92F8-C9A9D5B1B802}"/>
+                <a16:creationId xmlns="" xmlns:a16="http://schemas.microsoft.com/office/drawing/2014/main" id="{35E0AA7F-0EA4-224A-92F8-C9A9D5B1B802}"/>
               </a:ext>
             </a:extLst>
           </p:cNvPr>
@@ -11751,7 +11751,7 @@
           <p:cNvPr id="49" name="Picture 48">
             <a:extLst>
               <a:ext uri="{FF2B5EF4-FFF2-40B4-BE49-F238E27FC236}">
-                <a16:creationId xmlns:a16="http://schemas.microsoft.com/office/drawing/2014/main" xmlns="" id="{A48092AC-915B-524D-9672-FE0826E130E7}"/>
+                <a16:creationId xmlns="" xmlns:a16="http://schemas.microsoft.com/office/drawing/2014/main" id="{A48092AC-915B-524D-9672-FE0826E130E7}"/>
               </a:ext>
             </a:extLst>
           </p:cNvPr>
@@ -11787,7 +11787,7 @@
           <p:cNvPr id="51" name="Picture 50">
             <a:extLst>
               <a:ext uri="{FF2B5EF4-FFF2-40B4-BE49-F238E27FC236}">
-                <a16:creationId xmlns:a16="http://schemas.microsoft.com/office/drawing/2014/main" xmlns="" id="{27E440A9-1FB1-A44A-8917-F3A839BAF906}"/>
+                <a16:creationId xmlns="" xmlns:a16="http://schemas.microsoft.com/office/drawing/2014/main" id="{27E440A9-1FB1-A44A-8917-F3A839BAF906}"/>
               </a:ext>
             </a:extLst>
           </p:cNvPr>
@@ -11823,7 +11823,7 @@
           <p:cNvPr id="52" name="Picture 51">
             <a:extLst>
               <a:ext uri="{FF2B5EF4-FFF2-40B4-BE49-F238E27FC236}">
-                <a16:creationId xmlns:a16="http://schemas.microsoft.com/office/drawing/2014/main" xmlns="" id="{FFFF220F-F683-2F48-A73D-6A41401B0D05}"/>
+                <a16:creationId xmlns="" xmlns:a16="http://schemas.microsoft.com/office/drawing/2014/main" id="{FFFF220F-F683-2F48-A73D-6A41401B0D05}"/>
               </a:ext>
             </a:extLst>
           </p:cNvPr>
@@ -11859,7 +11859,7 @@
           <p:cNvPr id="53" name="Picture 52">
             <a:extLst>
               <a:ext uri="{FF2B5EF4-FFF2-40B4-BE49-F238E27FC236}">
-                <a16:creationId xmlns:a16="http://schemas.microsoft.com/office/drawing/2014/main" xmlns="" id="{FC96BF3C-2C18-7E4E-AADA-8075C799317A}"/>
+                <a16:creationId xmlns="" xmlns:a16="http://schemas.microsoft.com/office/drawing/2014/main" id="{FC96BF3C-2C18-7E4E-AADA-8075C799317A}"/>
               </a:ext>
             </a:extLst>
           </p:cNvPr>
@@ -11895,7 +11895,7 @@
           <p:cNvPr id="54" name="Content Placeholder 52">
             <a:extLst>
               <a:ext uri="{FF2B5EF4-FFF2-40B4-BE49-F238E27FC236}">
-                <a16:creationId xmlns:a16="http://schemas.microsoft.com/office/drawing/2014/main" xmlns="" id="{8184E9DC-A05F-994B-8D0E-6F0964DE93A1}"/>
+                <a16:creationId xmlns="" xmlns:a16="http://schemas.microsoft.com/office/drawing/2014/main" id="{8184E9DC-A05F-994B-8D0E-6F0964DE93A1}"/>
               </a:ext>
             </a:extLst>
           </p:cNvPr>
@@ -12160,7 +12160,7 @@
           <p:cNvPr id="37" name="Content Placeholder 52">
             <a:extLst>
               <a:ext uri="{FF2B5EF4-FFF2-40B4-BE49-F238E27FC236}">
-                <a16:creationId xmlns:a16="http://schemas.microsoft.com/office/drawing/2014/main" xmlns="" id="{A1F29D74-7F07-D84E-B102-930FD141E5B9}"/>
+                <a16:creationId xmlns="" xmlns:a16="http://schemas.microsoft.com/office/drawing/2014/main" id="{A1F29D74-7F07-D84E-B102-930FD141E5B9}"/>
               </a:ext>
             </a:extLst>
           </p:cNvPr>
@@ -12396,7 +12396,7 @@
           <p:cNvPr id="38" name="Picture 37">
             <a:extLst>
               <a:ext uri="{FF2B5EF4-FFF2-40B4-BE49-F238E27FC236}">
-                <a16:creationId xmlns:a16="http://schemas.microsoft.com/office/drawing/2014/main" xmlns="" id="{B4EE7BA3-3882-054B-9C71-4C6C9D45BBC3}"/>
+                <a16:creationId xmlns="" xmlns:a16="http://schemas.microsoft.com/office/drawing/2014/main" id="{B4EE7BA3-3882-054B-9C71-4C6C9D45BBC3}"/>
               </a:ext>
             </a:extLst>
           </p:cNvPr>
@@ -12432,7 +12432,7 @@
           <p:cNvPr id="63" name="Hexagon 5">
             <a:extLst>
               <a:ext uri="{FF2B5EF4-FFF2-40B4-BE49-F238E27FC236}">
-                <a16:creationId xmlns:a16="http://schemas.microsoft.com/office/drawing/2014/main" xmlns="" id="{364503C3-2EEB-304D-8F5A-656CAD26AC38}"/>
+                <a16:creationId xmlns="" xmlns:a16="http://schemas.microsoft.com/office/drawing/2014/main" id="{364503C3-2EEB-304D-8F5A-656CAD26AC38}"/>
               </a:ext>
             </a:extLst>
           </p:cNvPr>
@@ -12702,7 +12702,7 @@
           <p:cNvPr id="64" name="Picture 63">
             <a:extLst>
               <a:ext uri="{FF2B5EF4-FFF2-40B4-BE49-F238E27FC236}">
-                <a16:creationId xmlns:a16="http://schemas.microsoft.com/office/drawing/2014/main" xmlns="" id="{6241EA04-8B95-A04D-BFAA-ECA5355B2F83}"/>
+                <a16:creationId xmlns="" xmlns:a16="http://schemas.microsoft.com/office/drawing/2014/main" id="{6241EA04-8B95-A04D-BFAA-ECA5355B2F83}"/>
               </a:ext>
             </a:extLst>
           </p:cNvPr>
@@ -12739,7 +12739,7 @@
             <a:hlinkClick r:id="rId12"/>
             <a:extLst>
               <a:ext uri="{FF2B5EF4-FFF2-40B4-BE49-F238E27FC236}">
-                <a16:creationId xmlns:a16="http://schemas.microsoft.com/office/drawing/2014/main" xmlns="" id="{242972D4-E45D-4C48-98B1-E9B8928925A8}"/>
+                <a16:creationId xmlns="" xmlns:a16="http://schemas.microsoft.com/office/drawing/2014/main" id="{242972D4-E45D-4C48-98B1-E9B8928925A8}"/>
               </a:ext>
             </a:extLst>
           </p:cNvPr>
@@ -12802,7 +12802,7 @@
           <p:cNvPr id="68" name="Content Placeholder 52">
             <a:extLst>
               <a:ext uri="{FF2B5EF4-FFF2-40B4-BE49-F238E27FC236}">
-                <a16:creationId xmlns:a16="http://schemas.microsoft.com/office/drawing/2014/main" xmlns="" id="{B59D4673-E8B1-2C49-81BA-06195A220AB1}"/>
+                <a16:creationId xmlns="" xmlns:a16="http://schemas.microsoft.com/office/drawing/2014/main" id="{B59D4673-E8B1-2C49-81BA-06195A220AB1}"/>
               </a:ext>
             </a:extLst>
           </p:cNvPr>
@@ -13008,7 +13008,7 @@
             <a:hlinkClick r:id="rId12"/>
             <a:extLst>
               <a:ext uri="{FF2B5EF4-FFF2-40B4-BE49-F238E27FC236}">
-                <a16:creationId xmlns:a16="http://schemas.microsoft.com/office/drawing/2014/main" xmlns="" id="{E8323CE4-5234-8142-9DE4-A809DB291451}"/>
+                <a16:creationId xmlns="" xmlns:a16="http://schemas.microsoft.com/office/drawing/2014/main" id="{E8323CE4-5234-8142-9DE4-A809DB291451}"/>
               </a:ext>
             </a:extLst>
           </p:cNvPr>
@@ -13067,7 +13067,7 @@
             <a:hlinkClick r:id="rId3"/>
             <a:extLst>
               <a:ext uri="{FF2B5EF4-FFF2-40B4-BE49-F238E27FC236}">
-                <a16:creationId xmlns:a16="http://schemas.microsoft.com/office/drawing/2014/main" xmlns="" id="{6C78789D-668C-3346-9A82-AE9B686AF055}"/>
+                <a16:creationId xmlns="" xmlns:a16="http://schemas.microsoft.com/office/drawing/2014/main" id="{6C78789D-668C-3346-9A82-AE9B686AF055}"/>
               </a:ext>
             </a:extLst>
           </p:cNvPr>
@@ -13126,7 +13126,7 @@
             <a:hlinkClick r:id="rId2"/>
             <a:extLst>
               <a:ext uri="{FF2B5EF4-FFF2-40B4-BE49-F238E27FC236}">
-                <a16:creationId xmlns:a16="http://schemas.microsoft.com/office/drawing/2014/main" xmlns="" id="{B054C5B9-06BF-FE44-99FF-F2FA5C20AC60}"/>
+                <a16:creationId xmlns="" xmlns:a16="http://schemas.microsoft.com/office/drawing/2014/main" id="{B054C5B9-06BF-FE44-99FF-F2FA5C20AC60}"/>
               </a:ext>
             </a:extLst>
           </p:cNvPr>
@@ -15289,7 +15289,7 @@
           <p:cNvPr id="14" name="Slide Number Placeholder 5">
             <a:extLst>
               <a:ext uri="{FF2B5EF4-FFF2-40B4-BE49-F238E27FC236}">
-                <a16:creationId xmlns:a16="http://schemas.microsoft.com/office/drawing/2014/main" xmlns="" id="{D6A5EA0A-9DA9-564F-8F7D-CF263DB84C39}"/>
+                <a16:creationId xmlns="" xmlns:a16="http://schemas.microsoft.com/office/drawing/2014/main" id="{D6A5EA0A-9DA9-564F-8F7D-CF263DB84C39}"/>
               </a:ext>
             </a:extLst>
           </p:cNvPr>
@@ -15427,7 +15427,7 @@
           <p:cNvPr id="21" name="Straight Connector 20">
             <a:extLst>
               <a:ext uri="{FF2B5EF4-FFF2-40B4-BE49-F238E27FC236}">
-                <a16:creationId xmlns:a16="http://schemas.microsoft.com/office/drawing/2014/main" xmlns="" id="{F4443C96-B82D-F449-A71B-02134B6BB207}"/>
+                <a16:creationId xmlns="" xmlns:a16="http://schemas.microsoft.com/office/drawing/2014/main" id="{F4443C96-B82D-F449-A71B-02134B6BB207}"/>
               </a:ext>
             </a:extLst>
           </p:cNvPr>
@@ -15513,7 +15513,7 @@
           <p:cNvPr id="6" name="Picture 5">
             <a:extLst>
               <a:ext uri="{FF2B5EF4-FFF2-40B4-BE49-F238E27FC236}">
-                <a16:creationId xmlns:a16="http://schemas.microsoft.com/office/drawing/2014/main" xmlns="" id="{FFB611C2-DDCE-7F48-9E56-C0AF82F39DC1}"/>
+                <a16:creationId xmlns="" xmlns:a16="http://schemas.microsoft.com/office/drawing/2014/main" id="{FFB611C2-DDCE-7F48-9E56-C0AF82F39DC1}"/>
               </a:ext>
             </a:extLst>
           </p:cNvPr>
@@ -17899,7 +17899,7 @@
           <p:cNvPr id="4" name="Date Placeholder 3">
             <a:extLst>
               <a:ext uri="{FF2B5EF4-FFF2-40B4-BE49-F238E27FC236}">
-                <a16:creationId xmlns:a16="http://schemas.microsoft.com/office/drawing/2014/main" xmlns="" id="{5B11DD0F-109E-46C2-A486-47D107A02E36}"/>
+                <a16:creationId xmlns="" xmlns:a16="http://schemas.microsoft.com/office/drawing/2014/main" id="{5B11DD0F-109E-46C2-A486-47D107A02E36}"/>
               </a:ext>
             </a:extLst>
           </p:cNvPr>
@@ -17936,7 +17936,7 @@
           <p:cNvPr id="5" name="Footer Placeholder 4">
             <a:extLst>
               <a:ext uri="{FF2B5EF4-FFF2-40B4-BE49-F238E27FC236}">
-                <a16:creationId xmlns:a16="http://schemas.microsoft.com/office/drawing/2014/main" xmlns="" id="{2F8E408F-E4B6-4443-9119-5286D2FBA56E}"/>
+                <a16:creationId xmlns="" xmlns:a16="http://schemas.microsoft.com/office/drawing/2014/main" id="{2F8E408F-E4B6-4443-9119-5286D2FBA56E}"/>
               </a:ext>
             </a:extLst>
           </p:cNvPr>
@@ -17965,7 +17965,7 @@
           <p:cNvPr id="6" name="Title 5">
             <a:extLst>
               <a:ext uri="{FF2B5EF4-FFF2-40B4-BE49-F238E27FC236}">
-                <a16:creationId xmlns:a16="http://schemas.microsoft.com/office/drawing/2014/main" xmlns="" id="{07F49BEE-8DB9-44C9-B1F4-9FE76BECF3E1}"/>
+                <a16:creationId xmlns="" xmlns:a16="http://schemas.microsoft.com/office/drawing/2014/main" id="{07F49BEE-8DB9-44C9-B1F4-9FE76BECF3E1}"/>
               </a:ext>
             </a:extLst>
           </p:cNvPr>
@@ -18325,13 +18325,14 @@
           <p:cNvPr id="43" name="Connecteur droit avec flèche 148"/>
           <p:cNvCxnSpPr>
             <a:stCxn id="44" idx="2"/>
+            <a:endCxn id="40" idx="0"/>
           </p:cNvCxnSpPr>
           <p:nvPr/>
         </p:nvCxnSpPr>
         <p:spPr>
-          <a:xfrm flipH="1">
-            <a:off x="4903716" y="2653140"/>
-            <a:ext cx="1" cy="559984"/>
+          <a:xfrm>
+            <a:off x="5160472" y="2631597"/>
+            <a:ext cx="6386" cy="581527"/>
           </a:xfrm>
           <a:prstGeom prst="straightConnector1">
             <a:avLst/>
@@ -18366,8 +18367,8 @@
         </p:nvSpPr>
         <p:spPr>
           <a:xfrm>
-            <a:off x="4266832" y="1534282"/>
-            <a:ext cx="1273769" cy="1118858"/>
+            <a:off x="4485841" y="1512739"/>
+            <a:ext cx="1349262" cy="1118858"/>
           </a:xfrm>
           <a:prstGeom prst="roundRect">
             <a:avLst>
@@ -18538,7 +18539,7 @@
         </p:nvSpPr>
         <p:spPr>
           <a:xfrm>
-            <a:off x="4841371" y="2899361"/>
+            <a:off x="5135873" y="2915812"/>
             <a:ext cx="699230" cy="246221"/>
           </a:xfrm>
           <a:prstGeom prst="rect">
@@ -18623,8 +18624,8 @@
         </p:nvSpPr>
         <p:spPr>
           <a:xfrm>
-            <a:off x="6892386" y="2933132"/>
-            <a:ext cx="583814" cy="246221"/>
+            <a:off x="6790417" y="2922788"/>
+            <a:ext cx="768159" cy="246221"/>
           </a:xfrm>
           <a:prstGeom prst="rect">
             <a:avLst/>
@@ -18641,28 +18642,12 @@
               <a:defRPr/>
             </a:pPr>
             <a:r>
-              <a:rPr lang="en-US" sz="1000" dirty="0" smtClean="0">
+              <a:rPr lang="en-US" sz="1000" dirty="0" err="1" smtClean="0">
                 <a:solidFill>
                   <a:srgbClr val="97A7AF"/>
                 </a:solidFill>
               </a:rPr>
-              <a:t>(*.</a:t>
-            </a:r>
-            <a:r>
-              <a:rPr lang="en-US" sz="1000" dirty="0" err="1" smtClean="0">
-                <a:solidFill>
-                  <a:srgbClr val="97A7AF"/>
-                </a:solidFill>
-              </a:rPr>
-              <a:t>kdat</a:t>
-            </a:r>
-            <a:r>
-              <a:rPr lang="en-US" sz="1000" dirty="0" smtClean="0">
-                <a:solidFill>
-                  <a:srgbClr val="97A7AF"/>
-                </a:solidFill>
-              </a:rPr>
-              <a:t>)</a:t>
+              <a:t>kernel.kdat</a:t>
             </a:r>
             <a:endParaRPr lang="en-US" sz="1000" dirty="0">
               <a:solidFill>
@@ -18680,8 +18665,8 @@
         </p:nvSpPr>
         <p:spPr>
           <a:xfrm>
-            <a:off x="5920458" y="1534282"/>
-            <a:ext cx="1231775" cy="947291"/>
+            <a:off x="6258249" y="1524066"/>
+            <a:ext cx="1341291" cy="1118858"/>
           </a:xfrm>
           <a:prstGeom prst="roundRect">
             <a:avLst>
@@ -18729,6 +18714,27 @@
             </a:r>
           </a:p>
           <a:p>
+            <a:endParaRPr lang="en-US" sz="1000" dirty="0" smtClean="0">
+              <a:solidFill>
+                <a:schemeClr val="bg1"/>
+              </a:solidFill>
+              <a:latin typeface="Source Sans Pro Light" charset="0"/>
+              <a:ea typeface="Source Sans Pro Light" charset="0"/>
+              <a:cs typeface="Source Sans Pro Light" charset="0"/>
+            </a:endParaRPr>
+          </a:p>
+          <a:p>
+            <a:r>
+              <a:rPr lang="en-US" sz="1000" dirty="0" smtClean="0">
+                <a:solidFill>
+                  <a:schemeClr val="bg1"/>
+                </a:solidFill>
+                <a:latin typeface="Source Sans Pro Light" charset="0"/>
+                <a:ea typeface="Source Sans Pro Light" charset="0"/>
+                <a:cs typeface="Source Sans Pro Light" charset="0"/>
+              </a:rPr>
+              <a:t>Kernel UID: </a:t>
+            </a:r>
             <a:r>
               <a:rPr lang="en-US" sz="1000" dirty="0">
                 <a:solidFill>
@@ -18741,18 +18747,106 @@
               <a:t>#5678</a:t>
             </a:r>
           </a:p>
+          <a:p>
+            <a:r>
+              <a:rPr lang="en-GB" sz="1000" dirty="0">
+                <a:solidFill>
+                  <a:schemeClr val="bg1"/>
+                </a:solidFill>
+                <a:latin typeface="Source Sans Pro Light" charset="0"/>
+                <a:ea typeface="Source Sans Pro Light" charset="0"/>
+                <a:cs typeface="Source Sans Pro Light" charset="0"/>
+              </a:rPr>
+              <a:t>Compatible UIDs:</a:t>
+            </a:r>
+          </a:p>
+          <a:p>
+            <a:r>
+              <a:rPr lang="en-GB" sz="1000" dirty="0" smtClean="0">
+                <a:solidFill>
+                  <a:schemeClr val="bg1"/>
+                </a:solidFill>
+                <a:latin typeface="Source Sans Pro Light" charset="0"/>
+                <a:ea typeface="Source Sans Pro Light" charset="0"/>
+                <a:cs typeface="Source Sans Pro Light" charset="0"/>
+              </a:rPr>
+              <a:t>#</a:t>
+            </a:r>
+            <a:r>
+              <a:rPr lang="en-GB" sz="1000" dirty="0">
+                <a:solidFill>
+                  <a:schemeClr val="bg1"/>
+                </a:solidFill>
+                <a:latin typeface="Source Sans Pro Light" charset="0"/>
+                <a:ea typeface="Source Sans Pro Light" charset="0"/>
+                <a:cs typeface="Source Sans Pro Light" charset="0"/>
+              </a:rPr>
+              <a:t>ABCD</a:t>
+            </a:r>
+          </a:p>
+          <a:p>
+            <a:endParaRPr lang="en-US" sz="1000" dirty="0">
+              <a:solidFill>
+                <a:schemeClr val="bg1"/>
+              </a:solidFill>
+              <a:latin typeface="Source Sans Pro Light" charset="0"/>
+              <a:ea typeface="Source Sans Pro Light" charset="0"/>
+              <a:cs typeface="Source Sans Pro Light" charset="0"/>
+            </a:endParaRPr>
+          </a:p>
         </p:txBody>
       </p:sp>
       <p:sp>
         <p:nvSpPr>
-          <p:cNvPr id="49" name="Rounded Rectangle 48"/>
+          <p:cNvPr id="50" name="ZoneTexte 152"/>
+          <p:cNvSpPr txBox="1"/>
+          <p:nvPr/>
+        </p:nvSpPr>
+        <p:spPr>
+          <a:xfrm>
+            <a:off x="6085303" y="2444246"/>
+            <a:ext cx="280846" cy="246221"/>
+          </a:xfrm>
+          <a:prstGeom prst="rect">
+            <a:avLst/>
+          </a:prstGeom>
+          <a:noFill/>
+        </p:spPr>
+        <p:txBody>
+          <a:bodyPr wrap="none" rtlCol="0">
+            <a:spAutoFit/>
+          </a:bodyPr>
+          <a:lstStyle/>
+          <a:p>
+            <a:pPr>
+              <a:defRPr/>
+            </a:pPr>
+            <a:r>
+              <a:rPr lang="en-US" sz="1000" dirty="0" smtClean="0">
+                <a:solidFill>
+                  <a:srgbClr val="97A7AF"/>
+                </a:solidFill>
+              </a:rPr>
+              <a:t>…</a:t>
+            </a:r>
+            <a:endParaRPr lang="en-US" sz="1000" dirty="0">
+              <a:solidFill>
+                <a:srgbClr val="97A7AF"/>
+              </a:solidFill>
+            </a:endParaRPr>
+          </a:p>
+        </p:txBody>
+      </p:sp>
+      <p:sp>
+        <p:nvSpPr>
+          <p:cNvPr id="51" name="Rounded Rectangle 50"/>
           <p:cNvSpPr/>
           <p:nvPr/>
         </p:nvSpPr>
         <p:spPr>
           <a:xfrm>
-            <a:off x="6388429" y="1769793"/>
-            <a:ext cx="1231775" cy="947291"/>
+            <a:off x="5700122" y="4413325"/>
+            <a:ext cx="1273769" cy="972131"/>
           </a:xfrm>
           <a:prstGeom prst="roundRect">
             <a:avLst>
@@ -18763,9 +18857,7 @@
             <a:schemeClr val="accent2"/>
           </a:solidFill>
           <a:ln w="12700">
-            <a:solidFill>
-              <a:schemeClr val="bg1"/>
-            </a:solidFill>
+            <a:noFill/>
           </a:ln>
           <a:effectLst/>
         </p:spPr>
@@ -18789,8 +18881,9 @@
           </a:bodyPr>
           <a:lstStyle/>
           <a:p>
-            <a:r>
-              <a:rPr lang="en-US" sz="1000" dirty="0">
+            <a:pPr algn="ctr"/>
+            <a:r>
+              <a:rPr lang="en-US" sz="1000" dirty="0" smtClean="0">
                 <a:solidFill>
                   <a:schemeClr val="bg1"/>
                 </a:solidFill>
@@ -18798,20 +18891,7 @@
                 <a:ea typeface="Source Sans Pro Light" charset="0"/>
                 <a:cs typeface="Source Sans Pro Light" charset="0"/>
               </a:rPr>
-              <a:t>Kernel Metadata</a:t>
-            </a:r>
-          </a:p>
-          <a:p>
-            <a:r>
-              <a:rPr lang="en-US" sz="1000" dirty="0">
-                <a:solidFill>
-                  <a:schemeClr val="bg1"/>
-                </a:solidFill>
-                <a:latin typeface="Source Sans Pro Light" charset="0"/>
-                <a:ea typeface="Source Sans Pro Light" charset="0"/>
-                <a:cs typeface="Source Sans Pro Light" charset="0"/>
-              </a:rPr>
-              <a:t>#ABCD</a:t>
+              <a:t>Debug Section</a:t>
             </a:r>
           </a:p>
           <a:p>
@@ -18825,94 +18905,7 @@
               <a:cs typeface="Source Sans Pro Light" charset="0"/>
             </a:endParaRPr>
           </a:p>
-        </p:txBody>
-      </p:sp>
-      <p:sp>
-        <p:nvSpPr>
-          <p:cNvPr id="50" name="ZoneTexte 152"/>
-          <p:cNvSpPr txBox="1"/>
-          <p:nvPr/>
-        </p:nvSpPr>
-        <p:spPr>
-          <a:xfrm>
-            <a:off x="6085303" y="2444246"/>
-            <a:ext cx="280846" cy="246221"/>
-          </a:xfrm>
-          <a:prstGeom prst="rect">
-            <a:avLst/>
-          </a:prstGeom>
-          <a:noFill/>
-        </p:spPr>
-        <p:txBody>
-          <a:bodyPr wrap="none" rtlCol="0">
-            <a:spAutoFit/>
-          </a:bodyPr>
-          <a:lstStyle/>
-          <a:p>
-            <a:pPr>
-              <a:defRPr/>
-            </a:pPr>
-            <a:r>
-              <a:rPr lang="en-US" sz="1000" dirty="0" smtClean="0">
-                <a:solidFill>
-                  <a:srgbClr val="97A7AF"/>
-                </a:solidFill>
-              </a:rPr>
-              <a:t>…</a:t>
-            </a:r>
-            <a:endParaRPr lang="en-US" sz="1000" dirty="0">
-              <a:solidFill>
-                <a:srgbClr val="97A7AF"/>
-              </a:solidFill>
-            </a:endParaRPr>
-          </a:p>
-        </p:txBody>
-      </p:sp>
-      <p:sp>
-        <p:nvSpPr>
-          <p:cNvPr id="51" name="Rounded Rectangle 50"/>
-          <p:cNvSpPr/>
-          <p:nvPr/>
-        </p:nvSpPr>
-        <p:spPr>
-          <a:xfrm>
-            <a:off x="5700122" y="4413325"/>
-            <a:ext cx="1273769" cy="972131"/>
-          </a:xfrm>
-          <a:prstGeom prst="roundRect">
-            <a:avLst>
-              <a:gd name="adj" fmla="val 7525"/>
-            </a:avLst>
-          </a:prstGeom>
-          <a:solidFill>
-            <a:schemeClr val="accent2"/>
-          </a:solidFill>
-          <a:ln w="12700">
-            <a:noFill/>
-          </a:ln>
-          <a:effectLst/>
-        </p:spPr>
-        <p:style>
-          <a:lnRef idx="2">
-            <a:schemeClr val="dk1"/>
-          </a:lnRef>
-          <a:fillRef idx="1">
-            <a:schemeClr val="lt1"/>
-          </a:fillRef>
-          <a:effectRef idx="0">
-            <a:schemeClr val="dk1"/>
-          </a:effectRef>
-          <a:fontRef idx="minor">
-            <a:schemeClr val="dk1"/>
-          </a:fontRef>
-        </p:style>
-        <p:txBody>
-          <a:bodyPr wrap="square" tIns="36000" bIns="36000" rtlCol="0" anchor="t" anchorCtr="0">
-            <a:noAutofit/>
-          </a:bodyPr>
-          <a:lstStyle/>
-          <a:p>
-            <a:pPr algn="ctr"/>
+          <a:p>
             <a:r>
               <a:rPr lang="en-US" sz="1000" dirty="0" smtClean="0">
                 <a:solidFill>
@@ -18922,21 +18915,8 @@
                 <a:ea typeface="Source Sans Pro Light" charset="0"/>
                 <a:cs typeface="Source Sans Pro Light" charset="0"/>
               </a:rPr>
-              <a:t>Debug Section</a:t>
-            </a:r>
-          </a:p>
-          <a:p>
-            <a:pPr algn="ctr"/>
-            <a:endParaRPr lang="en-US" sz="1000" dirty="0">
-              <a:solidFill>
-                <a:schemeClr val="bg1"/>
-              </a:solidFill>
-              <a:latin typeface="Source Sans Pro Light" charset="0"/>
-              <a:ea typeface="Source Sans Pro Light" charset="0"/>
-              <a:cs typeface="Source Sans Pro Light" charset="0"/>
-            </a:endParaRPr>
-          </a:p>
-          <a:p>
+              <a:t>Kernel </a:t>
+            </a:r>
             <a:r>
               <a:rPr lang="en-US" sz="1000" dirty="0" smtClean="0">
                 <a:solidFill>
@@ -18946,7 +18926,18 @@
                 <a:ea typeface="Source Sans Pro Light" charset="0"/>
                 <a:cs typeface="Source Sans Pro Light" charset="0"/>
               </a:rPr>
-              <a:t>Kernel UID  #1234</a:t>
+              <a:t>UID:  </a:t>
+            </a:r>
+            <a:r>
+              <a:rPr lang="en-US" sz="1000" dirty="0" smtClean="0">
+                <a:solidFill>
+                  <a:schemeClr val="bg1"/>
+                </a:solidFill>
+                <a:latin typeface="Source Sans Pro Light" charset="0"/>
+                <a:ea typeface="Source Sans Pro Light" charset="0"/>
+                <a:cs typeface="Source Sans Pro Light" charset="0"/>
+              </a:rPr>
+              <a:t>#1234</a:t>
             </a:r>
           </a:p>
           <a:p>

</xml_diff>